<commit_message>
Updates intro to presentation with world maps
</commit_message>
<xml_diff>
--- a/presentation/gtdb-final-presentation.pptx
+++ b/presentation/gtdb-final-presentation.pptx
@@ -4,18 +4,22 @@
   <p:sldMasterIdLst>
     <p:sldMasterId id="2147483803" r:id="rId1"/>
   </p:sldMasterIdLst>
+  <p:notesMasterIdLst>
+    <p:notesMasterId r:id="rId14"/>
+  </p:notesMasterIdLst>
   <p:sldIdLst>
     <p:sldId id="256" r:id="rId2"/>
     <p:sldId id="261" r:id="rId3"/>
     <p:sldId id="262" r:id="rId4"/>
     <p:sldId id="266" r:id="rId5"/>
     <p:sldId id="267" r:id="rId6"/>
-    <p:sldId id="263" r:id="rId7"/>
-    <p:sldId id="264" r:id="rId8"/>
-    <p:sldId id="257" r:id="rId9"/>
-    <p:sldId id="258" r:id="rId10"/>
-    <p:sldId id="259" r:id="rId11"/>
-    <p:sldId id="265" r:id="rId12"/>
+    <p:sldId id="268" r:id="rId7"/>
+    <p:sldId id="263" r:id="rId8"/>
+    <p:sldId id="264" r:id="rId9"/>
+    <p:sldId id="257" r:id="rId10"/>
+    <p:sldId id="258" r:id="rId11"/>
+    <p:sldId id="259" r:id="rId12"/>
+    <p:sldId id="265" r:id="rId13"/>
   </p:sldIdLst>
   <p:sldSz cx="9144000" cy="6858000" type="screen4x3"/>
   <p:notesSz cx="6858000" cy="9144000"/>
@@ -124,6 +128,7 @@
             <p14:sldId id="262"/>
             <p14:sldId id="266"/>
             <p14:sldId id="267"/>
+            <p14:sldId id="268"/>
             <p14:sldId id="263"/>
             <p14:sldId id="264"/>
           </p14:sldIdLst>
@@ -166,6 +171,529 @@
     </p:ext>
   </p:extLst>
 </p:presentation>
+</file>
+
+<file path=ppt/notesMasters/notesMaster1.xml><?xml version="1.0" encoding="utf-8"?>
+<p:notesMaster xmlns:a="http://schemas.openxmlformats.org/drawingml/2006/main" xmlns:r="http://schemas.openxmlformats.org/officeDocument/2006/relationships" xmlns:p="http://schemas.openxmlformats.org/presentationml/2006/main">
+  <p:cSld>
+    <p:bg>
+      <p:bgRef idx="1001">
+        <a:schemeClr val="bg1"/>
+      </p:bgRef>
+    </p:bg>
+    <p:spTree>
+      <p:nvGrpSpPr>
+        <p:cNvPr id="1" name=""/>
+        <p:cNvGrpSpPr/>
+        <p:nvPr/>
+      </p:nvGrpSpPr>
+      <p:grpSpPr>
+        <a:xfrm>
+          <a:off x="0" y="0"/>
+          <a:ext cx="0" cy="0"/>
+          <a:chOff x="0" y="0"/>
+          <a:chExt cx="0" cy="0"/>
+        </a:xfrm>
+      </p:grpSpPr>
+      <p:sp>
+        <p:nvSpPr>
+          <p:cNvPr id="2" name="Header Placeholder 1"/>
+          <p:cNvSpPr>
+            <a:spLocks noGrp="1"/>
+          </p:cNvSpPr>
+          <p:nvPr>
+            <p:ph type="hdr" sz="quarter"/>
+          </p:nvPr>
+        </p:nvSpPr>
+        <p:spPr>
+          <a:xfrm>
+            <a:off x="0" y="0"/>
+            <a:ext cx="2971800" cy="458788"/>
+          </a:xfrm>
+          <a:prstGeom prst="rect">
+            <a:avLst/>
+          </a:prstGeom>
+        </p:spPr>
+        <p:txBody>
+          <a:bodyPr vert="horz" lIns="91440" tIns="45720" rIns="91440" bIns="45720" rtlCol="0"/>
+          <a:lstStyle>
+            <a:lvl1pPr algn="l">
+              <a:defRPr sz="1200"/>
+            </a:lvl1pPr>
+          </a:lstStyle>
+          <a:p>
+            <a:endParaRPr lang="en-US"/>
+          </a:p>
+        </p:txBody>
+      </p:sp>
+      <p:sp>
+        <p:nvSpPr>
+          <p:cNvPr id="3" name="Date Placeholder 2"/>
+          <p:cNvSpPr>
+            <a:spLocks noGrp="1"/>
+          </p:cNvSpPr>
+          <p:nvPr>
+            <p:ph type="dt" idx="1"/>
+          </p:nvPr>
+        </p:nvSpPr>
+        <p:spPr>
+          <a:xfrm>
+            <a:off x="3884613" y="0"/>
+            <a:ext cx="2971800" cy="458788"/>
+          </a:xfrm>
+          <a:prstGeom prst="rect">
+            <a:avLst/>
+          </a:prstGeom>
+        </p:spPr>
+        <p:txBody>
+          <a:bodyPr vert="horz" lIns="91440" tIns="45720" rIns="91440" bIns="45720" rtlCol="0"/>
+          <a:lstStyle>
+            <a:lvl1pPr algn="r">
+              <a:defRPr sz="1200"/>
+            </a:lvl1pPr>
+          </a:lstStyle>
+          <a:p>
+            <a:fld id="{5FFFC3A9-8065-47C2-8225-E4C63BB2D22D}" type="datetimeFigureOut">
+              <a:rPr lang="en-US" smtClean="0"/>
+              <a:t>11/16/2019</a:t>
+            </a:fld>
+            <a:endParaRPr lang="en-US"/>
+          </a:p>
+        </p:txBody>
+      </p:sp>
+      <p:sp>
+        <p:nvSpPr>
+          <p:cNvPr id="4" name="Slide Image Placeholder 3"/>
+          <p:cNvSpPr>
+            <a:spLocks noGrp="1" noRot="1" noChangeAspect="1"/>
+          </p:cNvSpPr>
+          <p:nvPr>
+            <p:ph type="sldImg" idx="2"/>
+          </p:nvPr>
+        </p:nvSpPr>
+        <p:spPr>
+          <a:xfrm>
+            <a:off x="1371600" y="1143000"/>
+            <a:ext cx="4114800" cy="3086100"/>
+          </a:xfrm>
+          <a:prstGeom prst="rect">
+            <a:avLst/>
+          </a:prstGeom>
+          <a:noFill/>
+          <a:ln w="12700">
+            <a:solidFill>
+              <a:prstClr val="black"/>
+            </a:solidFill>
+          </a:ln>
+        </p:spPr>
+        <p:txBody>
+          <a:bodyPr vert="horz" lIns="91440" tIns="45720" rIns="91440" bIns="45720" rtlCol="0" anchor="ctr"/>
+          <a:lstStyle/>
+          <a:p>
+            <a:endParaRPr lang="en-US"/>
+          </a:p>
+        </p:txBody>
+      </p:sp>
+      <p:sp>
+        <p:nvSpPr>
+          <p:cNvPr id="5" name="Notes Placeholder 4"/>
+          <p:cNvSpPr>
+            <a:spLocks noGrp="1"/>
+          </p:cNvSpPr>
+          <p:nvPr>
+            <p:ph type="body" sz="quarter" idx="3"/>
+          </p:nvPr>
+        </p:nvSpPr>
+        <p:spPr>
+          <a:xfrm>
+            <a:off x="685800" y="4400550"/>
+            <a:ext cx="5486400" cy="3600450"/>
+          </a:xfrm>
+          <a:prstGeom prst="rect">
+            <a:avLst/>
+          </a:prstGeom>
+        </p:spPr>
+        <p:txBody>
+          <a:bodyPr vert="horz" lIns="91440" tIns="45720" rIns="91440" bIns="45720" rtlCol="0"/>
+          <a:lstStyle/>
+          <a:p>
+            <a:pPr lvl="0"/>
+            <a:r>
+              <a:rPr lang="en-US"/>
+              <a:t>Click to edit Master text styles</a:t>
+            </a:r>
+          </a:p>
+          <a:p>
+            <a:pPr lvl="1"/>
+            <a:r>
+              <a:rPr lang="en-US"/>
+              <a:t>Second level</a:t>
+            </a:r>
+          </a:p>
+          <a:p>
+            <a:pPr lvl="2"/>
+            <a:r>
+              <a:rPr lang="en-US"/>
+              <a:t>Third level</a:t>
+            </a:r>
+          </a:p>
+          <a:p>
+            <a:pPr lvl="3"/>
+            <a:r>
+              <a:rPr lang="en-US"/>
+              <a:t>Fourth level</a:t>
+            </a:r>
+          </a:p>
+          <a:p>
+            <a:pPr lvl="4"/>
+            <a:r>
+              <a:rPr lang="en-US"/>
+              <a:t>Fifth level</a:t>
+            </a:r>
+          </a:p>
+        </p:txBody>
+      </p:sp>
+      <p:sp>
+        <p:nvSpPr>
+          <p:cNvPr id="6" name="Footer Placeholder 5"/>
+          <p:cNvSpPr>
+            <a:spLocks noGrp="1"/>
+          </p:cNvSpPr>
+          <p:nvPr>
+            <p:ph type="ftr" sz="quarter" idx="4"/>
+          </p:nvPr>
+        </p:nvSpPr>
+        <p:spPr>
+          <a:xfrm>
+            <a:off x="0" y="8685213"/>
+            <a:ext cx="2971800" cy="458787"/>
+          </a:xfrm>
+          <a:prstGeom prst="rect">
+            <a:avLst/>
+          </a:prstGeom>
+        </p:spPr>
+        <p:txBody>
+          <a:bodyPr vert="horz" lIns="91440" tIns="45720" rIns="91440" bIns="45720" rtlCol="0" anchor="b"/>
+          <a:lstStyle>
+            <a:lvl1pPr algn="l">
+              <a:defRPr sz="1200"/>
+            </a:lvl1pPr>
+          </a:lstStyle>
+          <a:p>
+            <a:endParaRPr lang="en-US"/>
+          </a:p>
+        </p:txBody>
+      </p:sp>
+      <p:sp>
+        <p:nvSpPr>
+          <p:cNvPr id="7" name="Slide Number Placeholder 6"/>
+          <p:cNvSpPr>
+            <a:spLocks noGrp="1"/>
+          </p:cNvSpPr>
+          <p:nvPr>
+            <p:ph type="sldNum" sz="quarter" idx="5"/>
+          </p:nvPr>
+        </p:nvSpPr>
+        <p:spPr>
+          <a:xfrm>
+            <a:off x="3884613" y="8685213"/>
+            <a:ext cx="2971800" cy="458787"/>
+          </a:xfrm>
+          <a:prstGeom prst="rect">
+            <a:avLst/>
+          </a:prstGeom>
+        </p:spPr>
+        <p:txBody>
+          <a:bodyPr vert="horz" lIns="91440" tIns="45720" rIns="91440" bIns="45720" rtlCol="0" anchor="b"/>
+          <a:lstStyle>
+            <a:lvl1pPr algn="r">
+              <a:defRPr sz="1200"/>
+            </a:lvl1pPr>
+          </a:lstStyle>
+          <a:p>
+            <a:fld id="{58F5E0F1-AB47-4A7A-BA35-9463FCF91331}" type="slidenum">
+              <a:rPr lang="en-US" smtClean="0"/>
+              <a:t>‹#›</a:t>
+            </a:fld>
+            <a:endParaRPr lang="en-US"/>
+          </a:p>
+        </p:txBody>
+      </p:sp>
+    </p:spTree>
+    <p:extLst>
+      <p:ext uri="{BB962C8B-B14F-4D97-AF65-F5344CB8AC3E}">
+        <p14:creationId xmlns:p14="http://schemas.microsoft.com/office/powerpoint/2010/main" val="3324263584"/>
+      </p:ext>
+    </p:extLst>
+  </p:cSld>
+  <p:clrMap bg1="lt1" tx1="dk1" bg2="lt2" tx2="dk2" accent1="accent1" accent2="accent2" accent3="accent3" accent4="accent4" accent5="accent5" accent6="accent6" hlink="hlink" folHlink="folHlink"/>
+  <p:notesStyle>
+    <a:lvl1pPr marL="0" algn="l" defTabSz="914400" rtl="0" eaLnBrk="1" latinLnBrk="0" hangingPunct="1">
+      <a:defRPr sz="1200" kern="1200">
+        <a:solidFill>
+          <a:schemeClr val="tx1"/>
+        </a:solidFill>
+        <a:latin typeface="+mn-lt"/>
+        <a:ea typeface="+mn-ea"/>
+        <a:cs typeface="+mn-cs"/>
+      </a:defRPr>
+    </a:lvl1pPr>
+    <a:lvl2pPr marL="457200" algn="l" defTabSz="914400" rtl="0" eaLnBrk="1" latinLnBrk="0" hangingPunct="1">
+      <a:defRPr sz="1200" kern="1200">
+        <a:solidFill>
+          <a:schemeClr val="tx1"/>
+        </a:solidFill>
+        <a:latin typeface="+mn-lt"/>
+        <a:ea typeface="+mn-ea"/>
+        <a:cs typeface="+mn-cs"/>
+      </a:defRPr>
+    </a:lvl2pPr>
+    <a:lvl3pPr marL="914400" algn="l" defTabSz="914400" rtl="0" eaLnBrk="1" latinLnBrk="0" hangingPunct="1">
+      <a:defRPr sz="1200" kern="1200">
+        <a:solidFill>
+          <a:schemeClr val="tx1"/>
+        </a:solidFill>
+        <a:latin typeface="+mn-lt"/>
+        <a:ea typeface="+mn-ea"/>
+        <a:cs typeface="+mn-cs"/>
+      </a:defRPr>
+    </a:lvl3pPr>
+    <a:lvl4pPr marL="1371600" algn="l" defTabSz="914400" rtl="0" eaLnBrk="1" latinLnBrk="0" hangingPunct="1">
+      <a:defRPr sz="1200" kern="1200">
+        <a:solidFill>
+          <a:schemeClr val="tx1"/>
+        </a:solidFill>
+        <a:latin typeface="+mn-lt"/>
+        <a:ea typeface="+mn-ea"/>
+        <a:cs typeface="+mn-cs"/>
+      </a:defRPr>
+    </a:lvl4pPr>
+    <a:lvl5pPr marL="1828800" algn="l" defTabSz="914400" rtl="0" eaLnBrk="1" latinLnBrk="0" hangingPunct="1">
+      <a:defRPr sz="1200" kern="1200">
+        <a:solidFill>
+          <a:schemeClr val="tx1"/>
+        </a:solidFill>
+        <a:latin typeface="+mn-lt"/>
+        <a:ea typeface="+mn-ea"/>
+        <a:cs typeface="+mn-cs"/>
+      </a:defRPr>
+    </a:lvl5pPr>
+    <a:lvl6pPr marL="2286000" algn="l" defTabSz="914400" rtl="0" eaLnBrk="1" latinLnBrk="0" hangingPunct="1">
+      <a:defRPr sz="1200" kern="1200">
+        <a:solidFill>
+          <a:schemeClr val="tx1"/>
+        </a:solidFill>
+        <a:latin typeface="+mn-lt"/>
+        <a:ea typeface="+mn-ea"/>
+        <a:cs typeface="+mn-cs"/>
+      </a:defRPr>
+    </a:lvl6pPr>
+    <a:lvl7pPr marL="2743200" algn="l" defTabSz="914400" rtl="0" eaLnBrk="1" latinLnBrk="0" hangingPunct="1">
+      <a:defRPr sz="1200" kern="1200">
+        <a:solidFill>
+          <a:schemeClr val="tx1"/>
+        </a:solidFill>
+        <a:latin typeface="+mn-lt"/>
+        <a:ea typeface="+mn-ea"/>
+        <a:cs typeface="+mn-cs"/>
+      </a:defRPr>
+    </a:lvl7pPr>
+    <a:lvl8pPr marL="3200400" algn="l" defTabSz="914400" rtl="0" eaLnBrk="1" latinLnBrk="0" hangingPunct="1">
+      <a:defRPr sz="1200" kern="1200">
+        <a:solidFill>
+          <a:schemeClr val="tx1"/>
+        </a:solidFill>
+        <a:latin typeface="+mn-lt"/>
+        <a:ea typeface="+mn-ea"/>
+        <a:cs typeface="+mn-cs"/>
+      </a:defRPr>
+    </a:lvl8pPr>
+    <a:lvl9pPr marL="3657600" algn="l" defTabSz="914400" rtl="0" eaLnBrk="1" latinLnBrk="0" hangingPunct="1">
+      <a:defRPr sz="1200" kern="1200">
+        <a:solidFill>
+          <a:schemeClr val="tx1"/>
+        </a:solidFill>
+        <a:latin typeface="+mn-lt"/>
+        <a:ea typeface="+mn-ea"/>
+        <a:cs typeface="+mn-cs"/>
+      </a:defRPr>
+    </a:lvl9pPr>
+  </p:notesStyle>
+</p:notesMaster>
+</file>
+
+<file path=ppt/notesSlides/notesSlide1.xml><?xml version="1.0" encoding="utf-8"?>
+<p:notes xmlns:a="http://schemas.openxmlformats.org/drawingml/2006/main" xmlns:r="http://schemas.openxmlformats.org/officeDocument/2006/relationships" xmlns:p="http://schemas.openxmlformats.org/presentationml/2006/main">
+  <p:cSld>
+    <p:spTree>
+      <p:nvGrpSpPr>
+        <p:cNvPr id="1" name=""/>
+        <p:cNvGrpSpPr/>
+        <p:nvPr/>
+      </p:nvGrpSpPr>
+      <p:grpSpPr>
+        <a:xfrm>
+          <a:off x="0" y="0"/>
+          <a:ext cx="0" cy="0"/>
+          <a:chOff x="0" y="0"/>
+          <a:chExt cx="0" cy="0"/>
+        </a:xfrm>
+      </p:grpSpPr>
+      <p:sp>
+        <p:nvSpPr>
+          <p:cNvPr id="2" name="Slide Image Placeholder 1"/>
+          <p:cNvSpPr>
+            <a:spLocks noGrp="1" noRot="1" noChangeAspect="1"/>
+          </p:cNvSpPr>
+          <p:nvPr>
+            <p:ph type="sldImg"/>
+          </p:nvPr>
+        </p:nvSpPr>
+        <p:spPr/>
+      </p:sp>
+      <p:sp>
+        <p:nvSpPr>
+          <p:cNvPr id="3" name="Notes Placeholder 2"/>
+          <p:cNvSpPr>
+            <a:spLocks noGrp="1"/>
+          </p:cNvSpPr>
+          <p:nvPr>
+            <p:ph type="body" idx="1"/>
+          </p:nvPr>
+        </p:nvSpPr>
+        <p:spPr/>
+        <p:txBody>
+          <a:bodyPr/>
+          <a:lstStyle/>
+          <a:p>
+            <a:r>
+              <a:rPr lang="en-US" dirty="0"/>
+              <a:t>Random plot of 20,000 incidents</a:t>
+            </a:r>
+          </a:p>
+        </p:txBody>
+      </p:sp>
+      <p:sp>
+        <p:nvSpPr>
+          <p:cNvPr id="4" name="Slide Number Placeholder 3"/>
+          <p:cNvSpPr>
+            <a:spLocks noGrp="1"/>
+          </p:cNvSpPr>
+          <p:nvPr>
+            <p:ph type="sldNum" sz="quarter" idx="5"/>
+          </p:nvPr>
+        </p:nvSpPr>
+        <p:spPr/>
+        <p:txBody>
+          <a:bodyPr/>
+          <a:lstStyle/>
+          <a:p>
+            <a:fld id="{58F5E0F1-AB47-4A7A-BA35-9463FCF91331}" type="slidenum">
+              <a:rPr lang="en-US" smtClean="0"/>
+              <a:t>5</a:t>
+            </a:fld>
+            <a:endParaRPr lang="en-US"/>
+          </a:p>
+        </p:txBody>
+      </p:sp>
+    </p:spTree>
+    <p:extLst>
+      <p:ext uri="{BB962C8B-B14F-4D97-AF65-F5344CB8AC3E}">
+        <p14:creationId xmlns:p14="http://schemas.microsoft.com/office/powerpoint/2010/main" val="4054851122"/>
+      </p:ext>
+    </p:extLst>
+  </p:cSld>
+  <p:clrMapOvr>
+    <a:masterClrMapping/>
+  </p:clrMapOvr>
+</p:notes>
+</file>
+
+<file path=ppt/notesSlides/notesSlide2.xml><?xml version="1.0" encoding="utf-8"?>
+<p:notes xmlns:a="http://schemas.openxmlformats.org/drawingml/2006/main" xmlns:r="http://schemas.openxmlformats.org/officeDocument/2006/relationships" xmlns:p="http://schemas.openxmlformats.org/presentationml/2006/main">
+  <p:cSld>
+    <p:spTree>
+      <p:nvGrpSpPr>
+        <p:cNvPr id="1" name=""/>
+        <p:cNvGrpSpPr/>
+        <p:nvPr/>
+      </p:nvGrpSpPr>
+      <p:grpSpPr>
+        <a:xfrm>
+          <a:off x="0" y="0"/>
+          <a:ext cx="0" cy="0"/>
+          <a:chOff x="0" y="0"/>
+          <a:chExt cx="0" cy="0"/>
+        </a:xfrm>
+      </p:grpSpPr>
+      <p:sp>
+        <p:nvSpPr>
+          <p:cNvPr id="2" name="Slide Image Placeholder 1"/>
+          <p:cNvSpPr>
+            <a:spLocks noGrp="1" noRot="1" noChangeAspect="1"/>
+          </p:cNvSpPr>
+          <p:nvPr>
+            <p:ph type="sldImg"/>
+          </p:nvPr>
+        </p:nvSpPr>
+        <p:spPr/>
+      </p:sp>
+      <p:sp>
+        <p:nvSpPr>
+          <p:cNvPr id="3" name="Notes Placeholder 2"/>
+          <p:cNvSpPr>
+            <a:spLocks noGrp="1"/>
+          </p:cNvSpPr>
+          <p:nvPr>
+            <p:ph type="body" idx="1"/>
+          </p:nvPr>
+        </p:nvSpPr>
+        <p:spPr/>
+        <p:txBody>
+          <a:bodyPr/>
+          <a:lstStyle/>
+          <a:p>
+            <a:r>
+              <a:rPr lang="en-US" dirty="0"/>
+              <a:t>Densities based on random plot of 20,000 incidents</a:t>
+            </a:r>
+          </a:p>
+        </p:txBody>
+      </p:sp>
+      <p:sp>
+        <p:nvSpPr>
+          <p:cNvPr id="4" name="Slide Number Placeholder 3"/>
+          <p:cNvSpPr>
+            <a:spLocks noGrp="1"/>
+          </p:cNvSpPr>
+          <p:nvPr>
+            <p:ph type="sldNum" sz="quarter" idx="5"/>
+          </p:nvPr>
+        </p:nvSpPr>
+        <p:spPr/>
+        <p:txBody>
+          <a:bodyPr/>
+          <a:lstStyle/>
+          <a:p>
+            <a:fld id="{58F5E0F1-AB47-4A7A-BA35-9463FCF91331}" type="slidenum">
+              <a:rPr lang="en-US" smtClean="0"/>
+              <a:t>6</a:t>
+            </a:fld>
+            <a:endParaRPr lang="en-US"/>
+          </a:p>
+        </p:txBody>
+      </p:sp>
+    </p:spTree>
+    <p:extLst>
+      <p:ext uri="{BB962C8B-B14F-4D97-AF65-F5344CB8AC3E}">
+        <p14:creationId xmlns:p14="http://schemas.microsoft.com/office/powerpoint/2010/main" val="2759362589"/>
+      </p:ext>
+    </p:extLst>
+  </p:cSld>
+  <p:clrMapOvr>
+    <a:masterClrMapping/>
+  </p:clrMapOvr>
+</p:notes>
 </file>
 
 <file path=ppt/slideLayouts/slideLayout1.xml><?xml version="1.0" encoding="utf-8"?>
@@ -4302,6 +4830,86 @@
     </p:spTree>
     <p:extLst>
       <p:ext uri="{BB962C8B-B14F-4D97-AF65-F5344CB8AC3E}">
+        <p14:creationId xmlns:p14="http://schemas.microsoft.com/office/powerpoint/2010/main" val="1956369432"/>
+      </p:ext>
+    </p:extLst>
+  </p:cSld>
+  <p:clrMapOvr>
+    <a:masterClrMapping/>
+  </p:clrMapOvr>
+</p:sld>
+</file>
+
+<file path=ppt/slides/slide11.xml><?xml version="1.0" encoding="utf-8"?>
+<p:sld xmlns:a="http://schemas.openxmlformats.org/drawingml/2006/main" xmlns:r="http://schemas.openxmlformats.org/officeDocument/2006/relationships" xmlns:p="http://schemas.openxmlformats.org/presentationml/2006/main">
+  <p:cSld>
+    <p:spTree>
+      <p:nvGrpSpPr>
+        <p:cNvPr id="1" name=""/>
+        <p:cNvGrpSpPr/>
+        <p:nvPr/>
+      </p:nvGrpSpPr>
+      <p:grpSpPr>
+        <a:xfrm>
+          <a:off x="0" y="0"/>
+          <a:ext cx="0" cy="0"/>
+          <a:chOff x="0" y="0"/>
+          <a:chExt cx="0" cy="0"/>
+        </a:xfrm>
+      </p:grpSpPr>
+      <p:sp>
+        <p:nvSpPr>
+          <p:cNvPr id="2" name="Title 1">
+            <a:extLst>
+              <a:ext uri="{FF2B5EF4-FFF2-40B4-BE49-F238E27FC236}">
+                <a16:creationId xmlns:a16="http://schemas.microsoft.com/office/drawing/2014/main" id="{68036183-F8B1-4928-A184-069233BF2AE7}"/>
+              </a:ext>
+            </a:extLst>
+          </p:cNvPr>
+          <p:cNvSpPr>
+            <a:spLocks noGrp="1"/>
+          </p:cNvSpPr>
+          <p:nvPr>
+            <p:ph type="title"/>
+          </p:nvPr>
+        </p:nvSpPr>
+        <p:spPr/>
+        <p:txBody>
+          <a:bodyPr/>
+          <a:lstStyle/>
+          <a:p>
+            <a:endParaRPr lang="en-US"/>
+          </a:p>
+        </p:txBody>
+      </p:sp>
+      <p:sp>
+        <p:nvSpPr>
+          <p:cNvPr id="3" name="Content Placeholder 2">
+            <a:extLst>
+              <a:ext uri="{FF2B5EF4-FFF2-40B4-BE49-F238E27FC236}">
+                <a16:creationId xmlns:a16="http://schemas.microsoft.com/office/drawing/2014/main" id="{7CA6673B-21BE-406F-BE8D-8A7E80804C8F}"/>
+              </a:ext>
+            </a:extLst>
+          </p:cNvPr>
+          <p:cNvSpPr>
+            <a:spLocks noGrp="1"/>
+          </p:cNvSpPr>
+          <p:nvPr>
+            <p:ph idx="1"/>
+          </p:nvPr>
+        </p:nvSpPr>
+        <p:spPr/>
+        <p:txBody>
+          <a:bodyPr/>
+          <a:lstStyle/>
+          <a:p>
+            <a:endParaRPr lang="en-US"/>
+          </a:p>
+        </p:txBody>
+      </p:sp>
+    </p:spTree>
+    <p:extLst>
+      <p:ext uri="{BB962C8B-B14F-4D97-AF65-F5344CB8AC3E}">
         <p14:creationId xmlns:p14="http://schemas.microsoft.com/office/powerpoint/2010/main" val="3123317090"/>
       </p:ext>
     </p:extLst>
@@ -4312,7 +4920,7 @@
 </p:sld>
 </file>
 
-<file path=ppt/slides/slide11.xml><?xml version="1.0" encoding="utf-8"?>
+<file path=ppt/slides/slide12.xml><?xml version="1.0" encoding="utf-8"?>
 <p:sld xmlns:a="http://schemas.openxmlformats.org/drawingml/2006/main" xmlns:r="http://schemas.openxmlformats.org/officeDocument/2006/relationships" xmlns:p="http://schemas.openxmlformats.org/presentationml/2006/main">
   <p:cSld>
     <p:spTree>
@@ -4444,8 +5052,8 @@
           </a:p>
         </p:txBody>
       </p:sp>
-      <mc:AlternateContent xmlns:mc="http://schemas.openxmlformats.org/markup-compatibility/2006">
-        <mc:Choice xmlns:a14="http://schemas.microsoft.com/office/drawing/2010/main" Requires="a14">
+      <mc:AlternateContent xmlns:mc="http://schemas.openxmlformats.org/markup-compatibility/2006" xmlns:a14="http://schemas.microsoft.com/office/drawing/2010/main">
+        <mc:Choice Requires="a14">
           <p:sp>
             <p:nvSpPr>
               <p:cNvPr id="3" name="Content Placeholder 2">
@@ -4635,7 +5243,7 @@
             </p:txBody>
           </p:sp>
         </mc:Choice>
-        <mc:Fallback>
+        <mc:Fallback xmlns="">
           <p:sp>
             <p:nvSpPr>
               <p:cNvPr id="3" name="Content Placeholder 2">
@@ -4949,7 +5557,11 @@
               <a:buNone/>
             </a:pPr>
             <a:r>
-              <a:rPr lang="en-US" sz="2400" b="1" dirty="0"/>
+              <a:rPr lang="en-US" sz="2400" b="1" dirty="0">
+                <a:solidFill>
+                  <a:schemeClr val="tx1"/>
+                </a:solidFill>
+              </a:rPr>
               <a:t>Date Variables </a:t>
             </a:r>
             <a:r>
@@ -4980,7 +5592,11 @@
               <a:buNone/>
             </a:pPr>
             <a:r>
-              <a:rPr lang="en-US" sz="2400" b="1" dirty="0"/>
+              <a:rPr lang="en-US" sz="2400" b="1" dirty="0">
+                <a:solidFill>
+                  <a:schemeClr val="tx1"/>
+                </a:solidFill>
+              </a:rPr>
               <a:t>Geospatial/Geopolitical Variables </a:t>
             </a:r>
             <a:r>
@@ -5011,7 +5627,11 @@
               <a:buNone/>
             </a:pPr>
             <a:r>
-              <a:rPr lang="en-US" sz="2400" b="1" dirty="0"/>
+              <a:rPr lang="en-US" sz="2400" b="1" dirty="0">
+                <a:solidFill>
+                  <a:schemeClr val="tx1"/>
+                </a:solidFill>
+              </a:rPr>
               <a:t>Incident Descriptive Variables </a:t>
             </a:r>
             <a:r>
@@ -5042,7 +5662,11 @@
               <a:buNone/>
             </a:pPr>
             <a:r>
-              <a:rPr lang="en-US" sz="2400" b="1" dirty="0"/>
+              <a:rPr lang="en-US" sz="2400" b="1" dirty="0">
+                <a:solidFill>
+                  <a:schemeClr val="tx1"/>
+                </a:solidFill>
+              </a:rPr>
               <a:t>Perpetrator Descriptive Variables </a:t>
             </a:r>
             <a:r>
@@ -5060,7 +5684,11 @@
               </a:spcBef>
               <a:buNone/>
             </a:pPr>
-            <a:endParaRPr lang="en-US" sz="1100" dirty="0"/>
+            <a:endParaRPr lang="en-US" sz="1100" dirty="0">
+              <a:solidFill>
+                <a:schemeClr val="tx1"/>
+              </a:solidFill>
+            </a:endParaRPr>
           </a:p>
           <a:p>
             <a:pPr marL="0" indent="0">
@@ -5073,7 +5701,11 @@
               <a:buNone/>
             </a:pPr>
             <a:r>
-              <a:rPr lang="en-US" sz="2400" b="1" dirty="0"/>
+              <a:rPr lang="en-US" sz="2400" b="1" dirty="0">
+                <a:solidFill>
+                  <a:schemeClr val="tx1"/>
+                </a:solidFill>
+              </a:rPr>
               <a:t>Casualty and Damage Variables </a:t>
             </a:r>
             <a:r>
@@ -5342,7 +5974,7 @@
         <p:spPr>
           <a:xfrm>
             <a:off x="1219200" y="1524000"/>
-            <a:ext cx="4495800" cy="461665"/>
+            <a:ext cx="5867400" cy="461665"/>
           </a:xfrm>
           <a:prstGeom prst="rect">
             <a:avLst/>
@@ -5357,107 +5989,53 @@
           <a:p>
             <a:r>
               <a:rPr lang="en-US" sz="2400" b="1" dirty="0"/>
-              <a:t>Incidents by Latitude / Longitude</a:t>
-            </a:r>
-          </a:p>
-        </p:txBody>
-      </p:sp>
-      <p:sp>
-        <p:nvSpPr>
-          <p:cNvPr id="4" name="Content Placeholder 3">
+              <a:t>Incidents / Density by Location (Lat. Long.)</a:t>
+            </a:r>
+          </a:p>
+        </p:txBody>
+      </p:sp>
+      <p:pic>
+        <p:nvPicPr>
+          <p:cNvPr id="5" name="Picture 4" descr="A close up of a map&#10;&#10;Description automatically generated">
             <a:extLst>
               <a:ext uri="{FF2B5EF4-FFF2-40B4-BE49-F238E27FC236}">
-                <a16:creationId xmlns:a16="http://schemas.microsoft.com/office/drawing/2014/main" id="{88967A9D-B22F-4B70-AA20-42A3AE98B6F1}"/>
+                <a16:creationId xmlns:a16="http://schemas.microsoft.com/office/drawing/2014/main" id="{B7F05EA4-ECAF-4F3F-8F9C-735CA0550607}"/>
               </a:ext>
             </a:extLst>
           </p:cNvPr>
-          <p:cNvSpPr>
-            <a:spLocks noGrp="1"/>
-          </p:cNvSpPr>
-          <p:nvPr>
-            <p:ph idx="1"/>
-          </p:nvPr>
-        </p:nvSpPr>
-        <p:spPr/>
-        <p:txBody>
-          <a:bodyPr/>
-          <a:lstStyle/>
-          <a:p>
-            <a:endParaRPr lang="en-US"/>
-          </a:p>
-        </p:txBody>
-      </p:sp>
-    </p:spTree>
-    <p:extLst>
-      <p:ext uri="{BB962C8B-B14F-4D97-AF65-F5344CB8AC3E}">
-        <p14:creationId xmlns:p14="http://schemas.microsoft.com/office/powerpoint/2010/main" val="2730196593"/>
-      </p:ext>
-    </p:extLst>
-  </p:cSld>
-  <p:clrMapOvr>
-    <a:masterClrMapping/>
-  </p:clrMapOvr>
-</p:sld>
-</file>
-
-<file path=ppt/slides/slide6.xml><?xml version="1.0" encoding="utf-8"?>
-<p:sld xmlns:a="http://schemas.openxmlformats.org/drawingml/2006/main" xmlns:r="http://schemas.openxmlformats.org/officeDocument/2006/relationships" xmlns:p="http://schemas.openxmlformats.org/presentationml/2006/main">
-  <p:cSld>
-    <p:spTree>
-      <p:nvGrpSpPr>
-        <p:cNvPr id="1" name=""/>
-        <p:cNvGrpSpPr/>
-        <p:nvPr/>
-      </p:nvGrpSpPr>
-      <p:grpSpPr>
-        <a:xfrm>
-          <a:off x="0" y="0"/>
-          <a:ext cx="0" cy="0"/>
-          <a:chOff x="0" y="0"/>
-          <a:chExt cx="0" cy="0"/>
-        </a:xfrm>
-      </p:grpSpPr>
-      <p:sp>
-        <p:nvSpPr>
-          <p:cNvPr id="2" name="Title 1">
+          <p:cNvPicPr>
+            <a:picLocks noChangeAspect="1"/>
+          </p:cNvPicPr>
+          <p:nvPr/>
+        </p:nvPicPr>
+        <p:blipFill>
+          <a:blip r:embed="rId3">
+            <a:extLst>
+              <a:ext uri="{28A0092B-C50C-407E-A947-70E740481C1C}">
+                <a14:useLocalDpi xmlns:a14="http://schemas.microsoft.com/office/drawing/2010/main" val="0"/>
+              </a:ext>
+            </a:extLst>
+          </a:blip>
+          <a:stretch>
+            <a:fillRect/>
+          </a:stretch>
+        </p:blipFill>
+        <p:spPr>
+          <a:xfrm>
+            <a:off x="2590800" y="3200400"/>
+            <a:ext cx="4419598" cy="2651759"/>
+          </a:xfrm>
+          <a:prstGeom prst="rect">
+            <a:avLst/>
+          </a:prstGeom>
+        </p:spPr>
+      </p:pic>
+      <p:pic>
+        <p:nvPicPr>
+          <p:cNvPr id="7" name="Picture 6" descr="A close up of a map&#10;&#10;Description automatically generated">
             <a:extLst>
               <a:ext uri="{FF2B5EF4-FFF2-40B4-BE49-F238E27FC236}">
-                <a16:creationId xmlns:a16="http://schemas.microsoft.com/office/drawing/2014/main" id="{9BB04737-5B5E-4061-9F4E-F1DEB1C647DE}"/>
-              </a:ext>
-            </a:extLst>
-          </p:cNvPr>
-          <p:cNvSpPr>
-            <a:spLocks noGrp="1"/>
-          </p:cNvSpPr>
-          <p:nvPr>
-            <p:ph type="title"/>
-          </p:nvPr>
-        </p:nvSpPr>
-        <p:spPr>
-          <a:xfrm>
-            <a:off x="1028700" y="685800"/>
-            <a:ext cx="7200900" cy="685800"/>
-          </a:xfrm>
-        </p:spPr>
-        <p:txBody>
-          <a:bodyPr>
-            <a:normAutofit/>
-          </a:bodyPr>
-          <a:lstStyle/>
-          <a:p>
-            <a:r>
-              <a:rPr lang="en-US" sz="3600" dirty="0"/>
-              <a:t>Observations (Summary)</a:t>
-            </a:r>
-          </a:p>
-        </p:txBody>
-      </p:sp>
-      <p:pic>
-        <p:nvPicPr>
-          <p:cNvPr id="10" name="Picture 9" descr="A close up of a map&#10;&#10;Description automatically generated">
-            <a:extLst>
-              <a:ext uri="{FF2B5EF4-FFF2-40B4-BE49-F238E27FC236}">
-                <a16:creationId xmlns:a16="http://schemas.microsoft.com/office/drawing/2014/main" id="{CC1A4140-F4C3-4EC1-8A6F-784197D81A1B}"/>
+                <a16:creationId xmlns:a16="http://schemas.microsoft.com/office/drawing/2014/main" id="{3D6AB0F5-14CA-4C48-BFF7-D12F894D5DF6}"/>
               </a:ext>
             </a:extLst>
           </p:cNvPr>
@@ -5466,20 +6044,21 @@
           </p:cNvPicPr>
           <p:nvPr/>
         </p:nvPicPr>
-        <p:blipFill rotWithShape="1">
-          <a:blip r:embed="rId2">
+        <p:blipFill>
+          <a:blip r:embed="rId4">
             <a:extLst>
               <a:ext uri="{28A0092B-C50C-407E-A947-70E740481C1C}">
                 <a14:useLocalDpi xmlns:a14="http://schemas.microsoft.com/office/drawing/2010/main" val="0"/>
               </a:ext>
             </a:extLst>
           </a:blip>
-          <a:srcRect l="30833" t="6779" b="15625"/>
-          <a:stretch/>
+          <a:stretch>
+            <a:fillRect/>
+          </a:stretch>
         </p:blipFill>
         <p:spPr>
           <a:xfrm>
-            <a:off x="1371600" y="2054520"/>
+            <a:off x="1371600" y="2057400"/>
             <a:ext cx="7616952" cy="4572000"/>
           </a:xfrm>
           <a:prstGeom prst="rect">
@@ -5517,12 +6096,77 @@
           </a:sp3d>
         </p:spPr>
       </p:pic>
-      <p:sp>
-        <p:nvSpPr>
-          <p:cNvPr id="11" name="TextBox 10">
+    </p:spTree>
+    <p:extLst>
+      <p:ext uri="{BB962C8B-B14F-4D97-AF65-F5344CB8AC3E}">
+        <p14:creationId xmlns:p14="http://schemas.microsoft.com/office/powerpoint/2010/main" val="2730196593"/>
+      </p:ext>
+    </p:extLst>
+  </p:cSld>
+  <p:clrMapOvr>
+    <a:masterClrMapping/>
+  </p:clrMapOvr>
+</p:sld>
+</file>
+
+<file path=ppt/slides/slide6.xml><?xml version="1.0" encoding="utf-8"?>
+<p:sld xmlns:a="http://schemas.openxmlformats.org/drawingml/2006/main" xmlns:r="http://schemas.openxmlformats.org/officeDocument/2006/relationships" xmlns:p="http://schemas.openxmlformats.org/presentationml/2006/main">
+  <p:cSld>
+    <p:spTree>
+      <p:nvGrpSpPr>
+        <p:cNvPr id="1" name=""/>
+        <p:cNvGrpSpPr/>
+        <p:nvPr/>
+      </p:nvGrpSpPr>
+      <p:grpSpPr>
+        <a:xfrm>
+          <a:off x="0" y="0"/>
+          <a:ext cx="0" cy="0"/>
+          <a:chOff x="0" y="0"/>
+          <a:chExt cx="0" cy="0"/>
+        </a:xfrm>
+      </p:grpSpPr>
+      <p:sp>
+        <p:nvSpPr>
+          <p:cNvPr id="2" name="Title 1">
             <a:extLst>
               <a:ext uri="{FF2B5EF4-FFF2-40B4-BE49-F238E27FC236}">
-                <a16:creationId xmlns:a16="http://schemas.microsoft.com/office/drawing/2014/main" id="{E61925C7-D817-43EA-8456-CDBEF70E3EAF}"/>
+                <a16:creationId xmlns:a16="http://schemas.microsoft.com/office/drawing/2014/main" id="{9684921B-6BBA-4BD5-ADA2-EBA7683B0D39}"/>
+              </a:ext>
+            </a:extLst>
+          </p:cNvPr>
+          <p:cNvSpPr>
+            <a:spLocks noGrp="1"/>
+          </p:cNvSpPr>
+          <p:nvPr>
+            <p:ph type="title"/>
+          </p:nvPr>
+        </p:nvSpPr>
+        <p:spPr>
+          <a:xfrm>
+            <a:off x="1028700" y="685801"/>
+            <a:ext cx="7200900" cy="533399"/>
+          </a:xfrm>
+        </p:spPr>
+        <p:txBody>
+          <a:bodyPr>
+            <a:noAutofit/>
+          </a:bodyPr>
+          <a:lstStyle/>
+          <a:p>
+            <a:r>
+              <a:rPr lang="en-US" sz="3600" dirty="0"/>
+              <a:t>Observations (Summary)</a:t>
+            </a:r>
+          </a:p>
+        </p:txBody>
+      </p:sp>
+      <p:sp>
+        <p:nvSpPr>
+          <p:cNvPr id="18" name="TextBox 17">
+            <a:extLst>
+              <a:ext uri="{FF2B5EF4-FFF2-40B4-BE49-F238E27FC236}">
+                <a16:creationId xmlns:a16="http://schemas.microsoft.com/office/drawing/2014/main" id="{F697F01C-ABF7-41A2-A8EF-3F0EC2579FCC}"/>
               </a:ext>
             </a:extLst>
           </p:cNvPr>
@@ -5532,7 +6176,7 @@
         <p:spPr>
           <a:xfrm>
             <a:off x="1219200" y="1524000"/>
-            <a:ext cx="3009900" cy="461665"/>
+            <a:ext cx="5867400" cy="461665"/>
           </a:xfrm>
           <a:prstGeom prst="rect">
             <a:avLst/>
@@ -5547,15 +6191,81 @@
           <a:p>
             <a:r>
               <a:rPr lang="en-US" sz="2400" b="1" dirty="0"/>
-              <a:t>Incidents by Region</a:t>
-            </a:r>
-          </a:p>
-        </p:txBody>
-      </p:sp>
+              <a:t>Incidents / Density by Location (Lat. Long.)</a:t>
+            </a:r>
+          </a:p>
+        </p:txBody>
+      </p:sp>
+      <p:pic>
+        <p:nvPicPr>
+          <p:cNvPr id="5" name="Picture 4" descr="A close up of a map&#10;&#10;Description automatically generated">
+            <a:extLst>
+              <a:ext uri="{FF2B5EF4-FFF2-40B4-BE49-F238E27FC236}">
+                <a16:creationId xmlns:a16="http://schemas.microsoft.com/office/drawing/2014/main" id="{B7F05EA4-ECAF-4F3F-8F9C-735CA0550607}"/>
+              </a:ext>
+            </a:extLst>
+          </p:cNvPr>
+          <p:cNvPicPr>
+            <a:picLocks/>
+          </p:cNvPicPr>
+          <p:nvPr/>
+        </p:nvPicPr>
+        <p:blipFill>
+          <a:blip r:embed="rId3">
+            <a:extLst>
+              <a:ext uri="{28A0092B-C50C-407E-A947-70E740481C1C}">
+                <a14:useLocalDpi xmlns:a14="http://schemas.microsoft.com/office/drawing/2010/main" val="0"/>
+              </a:ext>
+            </a:extLst>
+          </a:blip>
+          <a:stretch>
+            <a:fillRect/>
+          </a:stretch>
+        </p:blipFill>
+        <p:spPr>
+          <a:xfrm>
+            <a:off x="1371600" y="2057400"/>
+            <a:ext cx="7616952" cy="4572000"/>
+          </a:xfrm>
+          <a:prstGeom prst="rect">
+            <a:avLst/>
+          </a:prstGeom>
+          <a:solidFill>
+            <a:srgbClr val="FFFFFF">
+              <a:shade val="85000"/>
+            </a:srgbClr>
+          </a:solidFill>
+          <a:ln w="88900" cap="sq">
+            <a:solidFill>
+              <a:srgbClr val="FFFFFF"/>
+            </a:solidFill>
+            <a:miter lim="800000"/>
+          </a:ln>
+          <a:effectLst>
+            <a:outerShdw blurRad="55000" dist="18000" dir="5400000" algn="tl" rotWithShape="0">
+              <a:srgbClr val="000000">
+                <a:alpha val="40000"/>
+              </a:srgbClr>
+            </a:outerShdw>
+          </a:effectLst>
+          <a:scene3d>
+            <a:camera prst="orthographicFront"/>
+            <a:lightRig rig="twoPt" dir="t">
+              <a:rot lat="0" lon="0" rev="7200000"/>
+            </a:lightRig>
+          </a:scene3d>
+          <a:sp3d>
+            <a:bevelT w="25400" h="19050"/>
+            <a:contourClr>
+              <a:srgbClr val="FFFFFF"/>
+            </a:contourClr>
+          </a:sp3d>
+        </p:spPr>
+      </p:pic>
     </p:spTree>
     <p:extLst>
       <p:ext uri="{BB962C8B-B14F-4D97-AF65-F5344CB8AC3E}">
-        <p14:creationId xmlns:p14="http://schemas.microsoft.com/office/powerpoint/2010/main" val="3382637159"/>
+        <p14:creationId xmlns:p14="http://schemas.microsoft.com/office/powerpoint/2010/main" val="533367708"/>
       </p:ext>
     </p:extLst>
   </p:cSld>
@@ -5587,7 +6297,7 @@
           <p:cNvPr id="2" name="Title 1">
             <a:extLst>
               <a:ext uri="{FF2B5EF4-FFF2-40B4-BE49-F238E27FC236}">
-                <a16:creationId xmlns:a16="http://schemas.microsoft.com/office/drawing/2014/main" id="{B4C10FE4-B15D-44FC-A9F3-C12AA44DFBC9}"/>
+                <a16:creationId xmlns:a16="http://schemas.microsoft.com/office/drawing/2014/main" id="{9BB04737-5B5E-4061-9F4E-F1DEB1C647DE}"/>
               </a:ext>
             </a:extLst>
           </p:cNvPr>
@@ -5601,146 +6311,118 @@
         <p:spPr>
           <a:xfrm>
             <a:off x="1028700" y="685800"/>
-            <a:ext cx="7200900" cy="609600"/>
+            <a:ext cx="7200900" cy="685800"/>
           </a:xfrm>
         </p:spPr>
         <p:txBody>
           <a:bodyPr>
-            <a:normAutofit fontScale="90000"/>
+            <a:normAutofit/>
           </a:bodyPr>
           <a:lstStyle/>
           <a:p>
             <a:r>
               <a:rPr lang="en-US" sz="3600" dirty="0"/>
-              <a:t>Research Questions and Assignments</a:t>
-            </a:r>
-          </a:p>
-        </p:txBody>
-      </p:sp>
-      <p:sp>
-        <p:nvSpPr>
-          <p:cNvPr id="3" name="Content Placeholder 2">
+              <a:t>Observations (Summary)</a:t>
+            </a:r>
+          </a:p>
+        </p:txBody>
+      </p:sp>
+      <p:pic>
+        <p:nvPicPr>
+          <p:cNvPr id="10" name="Picture 9" descr="A close up of a map&#10;&#10;Description automatically generated">
             <a:extLst>
               <a:ext uri="{FF2B5EF4-FFF2-40B4-BE49-F238E27FC236}">
-                <a16:creationId xmlns:a16="http://schemas.microsoft.com/office/drawing/2014/main" id="{F6F941C1-C7E5-433B-8C09-E5187F5163A3}"/>
+                <a16:creationId xmlns:a16="http://schemas.microsoft.com/office/drawing/2014/main" id="{CC1A4140-F4C3-4EC1-8A6F-784197D81A1B}"/>
               </a:ext>
             </a:extLst>
           </p:cNvPr>
-          <p:cNvSpPr>
-            <a:spLocks noGrp="1"/>
-          </p:cNvSpPr>
-          <p:nvPr>
-            <p:ph idx="1"/>
-          </p:nvPr>
-        </p:nvSpPr>
+          <p:cNvPicPr>
+            <a:picLocks/>
+          </p:cNvPicPr>
+          <p:nvPr/>
+        </p:nvPicPr>
+        <p:blipFill rotWithShape="1">
+          <a:blip r:embed="rId2">
+            <a:extLst>
+              <a:ext uri="{28A0092B-C50C-407E-A947-70E740481C1C}">
+                <a14:useLocalDpi xmlns:a14="http://schemas.microsoft.com/office/drawing/2010/main" val="0"/>
+              </a:ext>
+            </a:extLst>
+          </a:blip>
+          <a:srcRect l="30833" t="6779" b="15625"/>
+          <a:stretch/>
+        </p:blipFill>
         <p:spPr>
           <a:xfrm>
-            <a:off x="1028700" y="1447800"/>
-            <a:ext cx="7200900" cy="5105400"/>
-          </a:xfrm>
+            <a:off x="1371600" y="2054520"/>
+            <a:ext cx="7616952" cy="4572000"/>
+          </a:xfrm>
+          <a:prstGeom prst="rect">
+            <a:avLst/>
+          </a:prstGeom>
+          <a:solidFill>
+            <a:srgbClr val="FFFFFF">
+              <a:shade val="85000"/>
+            </a:srgbClr>
+          </a:solidFill>
+          <a:ln w="88900" cap="sq">
+            <a:solidFill>
+              <a:srgbClr val="FFFFFF"/>
+            </a:solidFill>
+            <a:miter lim="800000"/>
+          </a:ln>
+          <a:effectLst>
+            <a:outerShdw blurRad="55000" dist="18000" dir="5400000" algn="tl" rotWithShape="0">
+              <a:srgbClr val="000000">
+                <a:alpha val="40000"/>
+              </a:srgbClr>
+            </a:outerShdw>
+          </a:effectLst>
+          <a:scene3d>
+            <a:camera prst="orthographicFront"/>
+            <a:lightRig rig="twoPt" dir="t">
+              <a:rot lat="0" lon="0" rev="7200000"/>
+            </a:lightRig>
+          </a:scene3d>
+          <a:sp3d>
+            <a:bevelT w="25400" h="19050"/>
+            <a:contourClr>
+              <a:srgbClr val="FFFFFF"/>
+            </a:contourClr>
+          </a:sp3d>
         </p:spPr>
-        <p:txBody>
-          <a:bodyPr>
-            <a:normAutofit fontScale="92500" lnSpcReduction="10000"/>
+      </p:pic>
+      <p:sp>
+        <p:nvSpPr>
+          <p:cNvPr id="11" name="TextBox 10">
+            <a:extLst>
+              <a:ext uri="{FF2B5EF4-FFF2-40B4-BE49-F238E27FC236}">
+                <a16:creationId xmlns:a16="http://schemas.microsoft.com/office/drawing/2014/main" id="{E61925C7-D817-43EA-8456-CDBEF70E3EAF}"/>
+              </a:ext>
+            </a:extLst>
+          </p:cNvPr>
+          <p:cNvSpPr txBox="1"/>
+          <p:nvPr/>
+        </p:nvSpPr>
+        <p:spPr>
+          <a:xfrm>
+            <a:off x="1219200" y="1524000"/>
+            <a:ext cx="3009900" cy="461665"/>
+          </a:xfrm>
+          <a:prstGeom prst="rect">
+            <a:avLst/>
+          </a:prstGeom>
+          <a:noFill/>
+        </p:spPr>
+        <p:txBody>
+          <a:bodyPr wrap="square" rtlCol="0">
+            <a:spAutoFit/>
           </a:bodyPr>
           <a:lstStyle/>
           <a:p>
-            <a:pPr marL="0" indent="0">
-              <a:buNone/>
-            </a:pPr>
-            <a:r>
-              <a:rPr lang="en-US" b="1" dirty="0"/>
-              <a:t>James </a:t>
-            </a:r>
-            <a:r>
-              <a:rPr lang="en-US" b="1" dirty="0" err="1"/>
-              <a:t>Willson</a:t>
-            </a:r>
-            <a:r>
-              <a:rPr lang="en-US" b="1" dirty="0"/>
-              <a:t> (Data Scientist)</a:t>
-            </a:r>
-          </a:p>
-          <a:p>
-            <a:pPr marL="457200" indent="-457200">
-              <a:buFont typeface="+mj-lt"/>
-              <a:buAutoNum type="arabicPeriod"/>
-            </a:pPr>
-            <a:r>
-              <a:rPr lang="en-US" dirty="0"/>
-              <a:t>Predict if an attack will be successful based on a variety of different factors.</a:t>
-            </a:r>
-          </a:p>
-          <a:p>
-            <a:pPr marL="457200" indent="-457200">
-              <a:buFont typeface="+mj-lt"/>
-              <a:buAutoNum type="arabicPeriod"/>
-            </a:pPr>
-            <a:r>
-              <a:rPr lang="en-US" dirty="0"/>
-              <a:t>Estimate the number of casualties in a successful terrorist attack</a:t>
-            </a:r>
-          </a:p>
-          <a:p>
-            <a:pPr marL="0" indent="0">
-              <a:buNone/>
-            </a:pPr>
-            <a:r>
-              <a:rPr lang="en-US" b="1" dirty="0" err="1"/>
-              <a:t>Kun</a:t>
-            </a:r>
-            <a:r>
-              <a:rPr lang="en-US" b="1" dirty="0"/>
-              <a:t> Li (Data Scientist)</a:t>
-            </a:r>
-          </a:p>
-          <a:p>
-            <a:pPr marL="457200" indent="-457200">
-              <a:buFont typeface="+mj-lt"/>
-              <a:buAutoNum type="arabicPeriod"/>
-            </a:pPr>
-            <a:r>
-              <a:rPr lang="en-US" dirty="0"/>
-              <a:t>Predict the extent/dollar-amount of property damage from any given attack</a:t>
-            </a:r>
-          </a:p>
-          <a:p>
-            <a:pPr marL="457200" indent="-457200">
-              <a:buFont typeface="+mj-lt"/>
-              <a:buAutoNum type="arabicPeriod"/>
-            </a:pPr>
-            <a:r>
-              <a:rPr lang="en-US" dirty="0"/>
-              <a:t>Identify factors that could predict the target/victim type in an attack</a:t>
-            </a:r>
-          </a:p>
-          <a:p>
-            <a:pPr marL="0" indent="0">
-              <a:buNone/>
-            </a:pPr>
-            <a:r>
-              <a:rPr lang="en-US" b="1" dirty="0"/>
-              <a:t>Sean Kugele (Data Scientist / Team Lead)</a:t>
-            </a:r>
-          </a:p>
-          <a:p>
-            <a:pPr marL="457200" indent="-457200">
-              <a:buFont typeface="+mj-lt"/>
-              <a:buAutoNum type="arabicPeriod"/>
-            </a:pPr>
-            <a:r>
-              <a:rPr lang="en-US" dirty="0"/>
-              <a:t>Predict the terrorist group responsible for perpetrating a terrorist attack</a:t>
-            </a:r>
-          </a:p>
-          <a:p>
-            <a:pPr marL="457200" indent="-457200">
-              <a:buFont typeface="+mj-lt"/>
-              <a:buAutoNum type="arabicPeriod"/>
-            </a:pPr>
-            <a:r>
-              <a:rPr lang="en-US" dirty="0"/>
-              <a:t>Estimate the probability of an attack based on temporal and geo-spatial variables</a:t>
+            <a:r>
+              <a:rPr lang="en-US" sz="2400" b="1" dirty="0"/>
+              <a:t>Incidents by Region</a:t>
             </a:r>
           </a:p>
         </p:txBody>
@@ -5748,7 +6430,7 @@
     </p:spTree>
     <p:extLst>
       <p:ext uri="{BB962C8B-B14F-4D97-AF65-F5344CB8AC3E}">
-        <p14:creationId xmlns:p14="http://schemas.microsoft.com/office/powerpoint/2010/main" val="2179402491"/>
+        <p14:creationId xmlns:p14="http://schemas.microsoft.com/office/powerpoint/2010/main" val="3382637159"/>
       </p:ext>
     </p:extLst>
   </p:cSld>
@@ -5780,7 +6462,7 @@
           <p:cNvPr id="2" name="Title 1">
             <a:extLst>
               <a:ext uri="{FF2B5EF4-FFF2-40B4-BE49-F238E27FC236}">
-                <a16:creationId xmlns:a16="http://schemas.microsoft.com/office/drawing/2014/main" id="{A6BC0C61-EB17-457A-9B6C-10566010700A}"/>
+                <a16:creationId xmlns:a16="http://schemas.microsoft.com/office/drawing/2014/main" id="{B4C10FE4-B15D-44FC-A9F3-C12AA44DFBC9}"/>
               </a:ext>
             </a:extLst>
           </p:cNvPr>
@@ -5791,12 +6473,22 @@
             <p:ph type="title"/>
           </p:nvPr>
         </p:nvSpPr>
-        <p:spPr/>
-        <p:txBody>
-          <a:bodyPr/>
+        <p:spPr>
+          <a:xfrm>
+            <a:off x="1028700" y="685800"/>
+            <a:ext cx="7200900" cy="609600"/>
+          </a:xfrm>
+        </p:spPr>
+        <p:txBody>
+          <a:bodyPr>
+            <a:normAutofit fontScale="90000"/>
+          </a:bodyPr>
           <a:lstStyle/>
           <a:p>
-            <a:endParaRPr lang="en-US" dirty="0"/>
+            <a:r>
+              <a:rPr lang="en-US" sz="3600" dirty="0"/>
+              <a:t>Research Questions and Assignments</a:t>
+            </a:r>
           </a:p>
         </p:txBody>
       </p:sp>
@@ -5805,7 +6497,7 @@
           <p:cNvPr id="3" name="Content Placeholder 2">
             <a:extLst>
               <a:ext uri="{FF2B5EF4-FFF2-40B4-BE49-F238E27FC236}">
-                <a16:creationId xmlns:a16="http://schemas.microsoft.com/office/drawing/2014/main" id="{1853A7BF-D4DF-4F30-8B41-EB08C3AC2379}"/>
+                <a16:creationId xmlns:a16="http://schemas.microsoft.com/office/drawing/2014/main" id="{F6F941C1-C7E5-433B-8C09-E5187F5163A3}"/>
               </a:ext>
             </a:extLst>
           </p:cNvPr>
@@ -5816,19 +6508,122 @@
             <p:ph idx="1"/>
           </p:nvPr>
         </p:nvSpPr>
-        <p:spPr/>
-        <p:txBody>
-          <a:bodyPr/>
+        <p:spPr>
+          <a:xfrm>
+            <a:off x="1028700" y="1447800"/>
+            <a:ext cx="7200900" cy="5105400"/>
+          </a:xfrm>
+        </p:spPr>
+        <p:txBody>
+          <a:bodyPr>
+            <a:normAutofit fontScale="92500" lnSpcReduction="10000"/>
+          </a:bodyPr>
           <a:lstStyle/>
           <a:p>
-            <a:endParaRPr lang="en-US" dirty="0"/>
+            <a:pPr marL="0" indent="0">
+              <a:buNone/>
+            </a:pPr>
+            <a:r>
+              <a:rPr lang="en-US" b="1" dirty="0"/>
+              <a:t>James </a:t>
+            </a:r>
+            <a:r>
+              <a:rPr lang="en-US" b="1" dirty="0" err="1"/>
+              <a:t>Willson</a:t>
+            </a:r>
+            <a:r>
+              <a:rPr lang="en-US" b="1" dirty="0"/>
+              <a:t> (Data Scientist)</a:t>
+            </a:r>
+          </a:p>
+          <a:p>
+            <a:pPr marL="457200" indent="-457200">
+              <a:buFont typeface="+mj-lt"/>
+              <a:buAutoNum type="arabicPeriod"/>
+            </a:pPr>
+            <a:r>
+              <a:rPr lang="en-US" dirty="0"/>
+              <a:t>Predict if an attack will be successful based on a variety of different factors.</a:t>
+            </a:r>
+          </a:p>
+          <a:p>
+            <a:pPr marL="457200" indent="-457200">
+              <a:buFont typeface="+mj-lt"/>
+              <a:buAutoNum type="arabicPeriod"/>
+            </a:pPr>
+            <a:r>
+              <a:rPr lang="en-US" dirty="0"/>
+              <a:t>Estimate the number of casualties in a successful terrorist attack</a:t>
+            </a:r>
+          </a:p>
+          <a:p>
+            <a:pPr marL="0" indent="0">
+              <a:buNone/>
+            </a:pPr>
+            <a:r>
+              <a:rPr lang="en-US" b="1" dirty="0" err="1"/>
+              <a:t>Kun</a:t>
+            </a:r>
+            <a:r>
+              <a:rPr lang="en-US" b="1" dirty="0"/>
+              <a:t> Li (Data Scientist)</a:t>
+            </a:r>
+          </a:p>
+          <a:p>
+            <a:pPr marL="457200" indent="-457200">
+              <a:buFont typeface="+mj-lt"/>
+              <a:buAutoNum type="arabicPeriod"/>
+            </a:pPr>
+            <a:r>
+              <a:rPr lang="en-US" dirty="0"/>
+              <a:t>Predict the extent/dollar-amount of property damage from any given attack</a:t>
+            </a:r>
+          </a:p>
+          <a:p>
+            <a:pPr marL="457200" indent="-457200">
+              <a:buFont typeface="+mj-lt"/>
+              <a:buAutoNum type="arabicPeriod"/>
+            </a:pPr>
+            <a:r>
+              <a:rPr lang="en-US" dirty="0"/>
+              <a:t>Identify factors that could predict the target/victim type in an attack</a:t>
+            </a:r>
+          </a:p>
+          <a:p>
+            <a:pPr marL="0" indent="0">
+              <a:buNone/>
+            </a:pPr>
+            <a:r>
+              <a:rPr lang="en-US" b="1" dirty="0"/>
+              <a:t>Sean Kugele (Data Scientist / Team Lead)</a:t>
+            </a:r>
+          </a:p>
+          <a:p>
+            <a:pPr marL="457200" indent="-457200">
+              <a:buFont typeface="+mj-lt"/>
+              <a:buAutoNum type="arabicPeriod"/>
+            </a:pPr>
+            <a:r>
+              <a:rPr lang="en-US" dirty="0"/>
+              <a:t>Predict the terrorist group responsible for perpetrating a terrorist attack</a:t>
+            </a:r>
+          </a:p>
+          <a:p>
+            <a:pPr marL="457200" indent="-457200">
+              <a:buFont typeface="+mj-lt"/>
+              <a:buAutoNum type="arabicPeriod"/>
+            </a:pPr>
+            <a:r>
+              <a:rPr lang="en-US" dirty="0"/>
+              <a:t>Estimate the probability of an attack based on temporal and geo-spatial variables</a:t>
+            </a:r>
           </a:p>
         </p:txBody>
       </p:sp>
     </p:spTree>
     <p:extLst>
       <p:ext uri="{BB962C8B-B14F-4D97-AF65-F5344CB8AC3E}">
-        <p14:creationId xmlns:p14="http://schemas.microsoft.com/office/powerpoint/2010/main" val="2044090292"/>
+        <p14:creationId xmlns:p14="http://schemas.microsoft.com/office/powerpoint/2010/main" val="2179402491"/>
       </p:ext>
     </p:extLst>
   </p:cSld>
@@ -5860,7 +6655,7 @@
           <p:cNvPr id="2" name="Title 1">
             <a:extLst>
               <a:ext uri="{FF2B5EF4-FFF2-40B4-BE49-F238E27FC236}">
-                <a16:creationId xmlns:a16="http://schemas.microsoft.com/office/drawing/2014/main" id="{68036183-F8B1-4928-A184-069233BF2AE7}"/>
+                <a16:creationId xmlns:a16="http://schemas.microsoft.com/office/drawing/2014/main" id="{A6BC0C61-EB17-457A-9B6C-10566010700A}"/>
               </a:ext>
             </a:extLst>
           </p:cNvPr>
@@ -5876,7 +6671,7 @@
           <a:bodyPr/>
           <a:lstStyle/>
           <a:p>
-            <a:endParaRPr lang="en-US"/>
+            <a:endParaRPr lang="en-US" dirty="0"/>
           </a:p>
         </p:txBody>
       </p:sp>
@@ -5885,7 +6680,7 @@
           <p:cNvPr id="3" name="Content Placeholder 2">
             <a:extLst>
               <a:ext uri="{FF2B5EF4-FFF2-40B4-BE49-F238E27FC236}">
-                <a16:creationId xmlns:a16="http://schemas.microsoft.com/office/drawing/2014/main" id="{7CA6673B-21BE-406F-BE8D-8A7E80804C8F}"/>
+                <a16:creationId xmlns:a16="http://schemas.microsoft.com/office/drawing/2014/main" id="{1853A7BF-D4DF-4F30-8B41-EB08C3AC2379}"/>
               </a:ext>
             </a:extLst>
           </p:cNvPr>
@@ -5901,14 +6696,14 @@
           <a:bodyPr/>
           <a:lstStyle/>
           <a:p>
-            <a:endParaRPr lang="en-US"/>
+            <a:endParaRPr lang="en-US" dirty="0"/>
           </a:p>
         </p:txBody>
       </p:sp>
     </p:spTree>
     <p:extLst>
       <p:ext uri="{BB962C8B-B14F-4D97-AF65-F5344CB8AC3E}">
-        <p14:creationId xmlns:p14="http://schemas.microsoft.com/office/powerpoint/2010/main" val="1956369432"/>
+        <p14:creationId xmlns:p14="http://schemas.microsoft.com/office/powerpoint/2010/main" val="2044090292"/>
       </p:ext>
     </p:extLst>
   </p:cSld>
@@ -6174,4 +6969,299 @@
     </a:ext>
   </a:extLst>
 </a:theme>
+</file>
+
+<file path=ppt/theme/theme2.xml><?xml version="1.0" encoding="utf-8"?>
+<a:theme xmlns:a="http://schemas.openxmlformats.org/drawingml/2006/main" name="Office Theme">
+  <a:themeElements>
+    <a:clrScheme name="Office">
+      <a:dk1>
+        <a:sysClr val="windowText" lastClr="000000"/>
+      </a:dk1>
+      <a:lt1>
+        <a:sysClr val="window" lastClr="FFFFFF"/>
+      </a:lt1>
+      <a:dk2>
+        <a:srgbClr val="44546A"/>
+      </a:dk2>
+      <a:lt2>
+        <a:srgbClr val="E7E6E6"/>
+      </a:lt2>
+      <a:accent1>
+        <a:srgbClr val="4472C4"/>
+      </a:accent1>
+      <a:accent2>
+        <a:srgbClr val="ED7D31"/>
+      </a:accent2>
+      <a:accent3>
+        <a:srgbClr val="A5A5A5"/>
+      </a:accent3>
+      <a:accent4>
+        <a:srgbClr val="FFC000"/>
+      </a:accent4>
+      <a:accent5>
+        <a:srgbClr val="5B9BD5"/>
+      </a:accent5>
+      <a:accent6>
+        <a:srgbClr val="70AD47"/>
+      </a:accent6>
+      <a:hlink>
+        <a:srgbClr val="0563C1"/>
+      </a:hlink>
+      <a:folHlink>
+        <a:srgbClr val="954F72"/>
+      </a:folHlink>
+    </a:clrScheme>
+    <a:fontScheme name="Office">
+      <a:majorFont>
+        <a:latin typeface="Calibri Light" panose="020F0302020204030204"/>
+        <a:ea typeface=""/>
+        <a:cs typeface=""/>
+        <a:font script="Jpan" typeface="游ゴシック Light"/>
+        <a:font script="Hang" typeface="맑은 고딕"/>
+        <a:font script="Hans" typeface="等线 Light"/>
+        <a:font script="Hant" typeface="新細明體"/>
+        <a:font script="Arab" typeface="Times New Roman"/>
+        <a:font script="Hebr" typeface="Times New Roman"/>
+        <a:font script="Thai" typeface="Angsana New"/>
+        <a:font script="Ethi" typeface="Nyala"/>
+        <a:font script="Beng" typeface="Vrinda"/>
+        <a:font script="Gujr" typeface="Shruti"/>
+        <a:font script="Khmr" typeface="MoolBoran"/>
+        <a:font script="Knda" typeface="Tunga"/>
+        <a:font script="Guru" typeface="Raavi"/>
+        <a:font script="Cans" typeface="Euphemia"/>
+        <a:font script="Cher" typeface="Plantagenet Cherokee"/>
+        <a:font script="Yiii" typeface="Microsoft Yi Baiti"/>
+        <a:font script="Tibt" typeface="Microsoft Himalaya"/>
+        <a:font script="Thaa" typeface="MV Boli"/>
+        <a:font script="Deva" typeface="Mangal"/>
+        <a:font script="Telu" typeface="Gautami"/>
+        <a:font script="Taml" typeface="Latha"/>
+        <a:font script="Syrc" typeface="Estrangelo Edessa"/>
+        <a:font script="Orya" typeface="Kalinga"/>
+        <a:font script="Mlym" typeface="Kartika"/>
+        <a:font script="Laoo" typeface="DokChampa"/>
+        <a:font script="Sinh" typeface="Iskoola Pota"/>
+        <a:font script="Mong" typeface="Mongolian Baiti"/>
+        <a:font script="Viet" typeface="Times New Roman"/>
+        <a:font script="Uigh" typeface="Microsoft Uighur"/>
+        <a:font script="Geor" typeface="Sylfaen"/>
+        <a:font script="Armn" typeface="Arial"/>
+        <a:font script="Bugi" typeface="Leelawadee UI"/>
+        <a:font script="Bopo" typeface="Microsoft JhengHei"/>
+        <a:font script="Java" typeface="Javanese Text"/>
+        <a:font script="Lisu" typeface="Segoe UI"/>
+        <a:font script="Mymr" typeface="Myanmar Text"/>
+        <a:font script="Nkoo" typeface="Ebrima"/>
+        <a:font script="Olck" typeface="Nirmala UI"/>
+        <a:font script="Osma" typeface="Ebrima"/>
+        <a:font script="Phag" typeface="Phagspa"/>
+        <a:font script="Syrn" typeface="Estrangelo Edessa"/>
+        <a:font script="Syrj" typeface="Estrangelo Edessa"/>
+        <a:font script="Syre" typeface="Estrangelo Edessa"/>
+        <a:font script="Sora" typeface="Nirmala UI"/>
+        <a:font script="Tale" typeface="Microsoft Tai Le"/>
+        <a:font script="Talu" typeface="Microsoft New Tai Lue"/>
+        <a:font script="Tfng" typeface="Ebrima"/>
+      </a:majorFont>
+      <a:minorFont>
+        <a:latin typeface="Calibri" panose="020F0502020204030204"/>
+        <a:ea typeface=""/>
+        <a:cs typeface=""/>
+        <a:font script="Jpan" typeface="游ゴシック"/>
+        <a:font script="Hang" typeface="맑은 고딕"/>
+        <a:font script="Hans" typeface="等线"/>
+        <a:font script="Hant" typeface="新細明體"/>
+        <a:font script="Arab" typeface="Arial"/>
+        <a:font script="Hebr" typeface="Arial"/>
+        <a:font script="Thai" typeface="Cordia New"/>
+        <a:font script="Ethi" typeface="Nyala"/>
+        <a:font script="Beng" typeface="Vrinda"/>
+        <a:font script="Gujr" typeface="Shruti"/>
+        <a:font script="Khmr" typeface="DaunPenh"/>
+        <a:font script="Knda" typeface="Tunga"/>
+        <a:font script="Guru" typeface="Raavi"/>
+        <a:font script="Cans" typeface="Euphemia"/>
+        <a:font script="Cher" typeface="Plantagenet Cherokee"/>
+        <a:font script="Yiii" typeface="Microsoft Yi Baiti"/>
+        <a:font script="Tibt" typeface="Microsoft Himalaya"/>
+        <a:font script="Thaa" typeface="MV Boli"/>
+        <a:font script="Deva" typeface="Mangal"/>
+        <a:font script="Telu" typeface="Gautami"/>
+        <a:font script="Taml" typeface="Latha"/>
+        <a:font script="Syrc" typeface="Estrangelo Edessa"/>
+        <a:font script="Orya" typeface="Kalinga"/>
+        <a:font script="Mlym" typeface="Kartika"/>
+        <a:font script="Laoo" typeface="DokChampa"/>
+        <a:font script="Sinh" typeface="Iskoola Pota"/>
+        <a:font script="Mong" typeface="Mongolian Baiti"/>
+        <a:font script="Viet" typeface="Arial"/>
+        <a:font script="Uigh" typeface="Microsoft Uighur"/>
+        <a:font script="Geor" typeface="Sylfaen"/>
+        <a:font script="Armn" typeface="Arial"/>
+        <a:font script="Bugi" typeface="Leelawadee UI"/>
+        <a:font script="Bopo" typeface="Microsoft JhengHei"/>
+        <a:font script="Java" typeface="Javanese Text"/>
+        <a:font script="Lisu" typeface="Segoe UI"/>
+        <a:font script="Mymr" typeface="Myanmar Text"/>
+        <a:font script="Nkoo" typeface="Ebrima"/>
+        <a:font script="Olck" typeface="Nirmala UI"/>
+        <a:font script="Osma" typeface="Ebrima"/>
+        <a:font script="Phag" typeface="Phagspa"/>
+        <a:font script="Syrn" typeface="Estrangelo Edessa"/>
+        <a:font script="Syrj" typeface="Estrangelo Edessa"/>
+        <a:font script="Syre" typeface="Estrangelo Edessa"/>
+        <a:font script="Sora" typeface="Nirmala UI"/>
+        <a:font script="Tale" typeface="Microsoft Tai Le"/>
+        <a:font script="Talu" typeface="Microsoft New Tai Lue"/>
+        <a:font script="Tfng" typeface="Ebrima"/>
+      </a:minorFont>
+    </a:fontScheme>
+    <a:fmtScheme name="Office">
+      <a:fillStyleLst>
+        <a:solidFill>
+          <a:schemeClr val="phClr"/>
+        </a:solidFill>
+        <a:gradFill rotWithShape="1">
+          <a:gsLst>
+            <a:gs pos="0">
+              <a:schemeClr val="phClr">
+                <a:lumMod val="110000"/>
+                <a:satMod val="105000"/>
+                <a:tint val="67000"/>
+              </a:schemeClr>
+            </a:gs>
+            <a:gs pos="50000">
+              <a:schemeClr val="phClr">
+                <a:lumMod val="105000"/>
+                <a:satMod val="103000"/>
+                <a:tint val="73000"/>
+              </a:schemeClr>
+            </a:gs>
+            <a:gs pos="100000">
+              <a:schemeClr val="phClr">
+                <a:lumMod val="105000"/>
+                <a:satMod val="109000"/>
+                <a:tint val="81000"/>
+              </a:schemeClr>
+            </a:gs>
+          </a:gsLst>
+          <a:lin ang="5400000" scaled="0"/>
+        </a:gradFill>
+        <a:gradFill rotWithShape="1">
+          <a:gsLst>
+            <a:gs pos="0">
+              <a:schemeClr val="phClr">
+                <a:satMod val="103000"/>
+                <a:lumMod val="102000"/>
+                <a:tint val="94000"/>
+              </a:schemeClr>
+            </a:gs>
+            <a:gs pos="50000">
+              <a:schemeClr val="phClr">
+                <a:satMod val="110000"/>
+                <a:lumMod val="100000"/>
+                <a:shade val="100000"/>
+              </a:schemeClr>
+            </a:gs>
+            <a:gs pos="100000">
+              <a:schemeClr val="phClr">
+                <a:lumMod val="99000"/>
+                <a:satMod val="120000"/>
+                <a:shade val="78000"/>
+              </a:schemeClr>
+            </a:gs>
+          </a:gsLst>
+          <a:lin ang="5400000" scaled="0"/>
+        </a:gradFill>
+      </a:fillStyleLst>
+      <a:lnStyleLst>
+        <a:ln w="6350" cap="flat" cmpd="sng" algn="ctr">
+          <a:solidFill>
+            <a:schemeClr val="phClr"/>
+          </a:solidFill>
+          <a:prstDash val="solid"/>
+          <a:miter lim="800000"/>
+        </a:ln>
+        <a:ln w="12700" cap="flat" cmpd="sng" algn="ctr">
+          <a:solidFill>
+            <a:schemeClr val="phClr"/>
+          </a:solidFill>
+          <a:prstDash val="solid"/>
+          <a:miter lim="800000"/>
+        </a:ln>
+        <a:ln w="19050" cap="flat" cmpd="sng" algn="ctr">
+          <a:solidFill>
+            <a:schemeClr val="phClr"/>
+          </a:solidFill>
+          <a:prstDash val="solid"/>
+          <a:miter lim="800000"/>
+        </a:ln>
+      </a:lnStyleLst>
+      <a:effectStyleLst>
+        <a:effectStyle>
+          <a:effectLst/>
+        </a:effectStyle>
+        <a:effectStyle>
+          <a:effectLst/>
+        </a:effectStyle>
+        <a:effectStyle>
+          <a:effectLst>
+            <a:outerShdw blurRad="57150" dist="19050" dir="5400000" algn="ctr" rotWithShape="0">
+              <a:srgbClr val="000000">
+                <a:alpha val="63000"/>
+              </a:srgbClr>
+            </a:outerShdw>
+          </a:effectLst>
+        </a:effectStyle>
+      </a:effectStyleLst>
+      <a:bgFillStyleLst>
+        <a:solidFill>
+          <a:schemeClr val="phClr"/>
+        </a:solidFill>
+        <a:solidFill>
+          <a:schemeClr val="phClr">
+            <a:tint val="95000"/>
+            <a:satMod val="170000"/>
+          </a:schemeClr>
+        </a:solidFill>
+        <a:gradFill rotWithShape="1">
+          <a:gsLst>
+            <a:gs pos="0">
+              <a:schemeClr val="phClr">
+                <a:tint val="93000"/>
+                <a:satMod val="150000"/>
+                <a:shade val="98000"/>
+                <a:lumMod val="102000"/>
+              </a:schemeClr>
+            </a:gs>
+            <a:gs pos="50000">
+              <a:schemeClr val="phClr">
+                <a:tint val="98000"/>
+                <a:satMod val="130000"/>
+                <a:shade val="90000"/>
+                <a:lumMod val="103000"/>
+              </a:schemeClr>
+            </a:gs>
+            <a:gs pos="100000">
+              <a:schemeClr val="phClr">
+                <a:shade val="63000"/>
+                <a:satMod val="120000"/>
+              </a:schemeClr>
+            </a:gs>
+          </a:gsLst>
+          <a:lin ang="5400000" scaled="0"/>
+        </a:gradFill>
+      </a:bgFillStyleLst>
+    </a:fmtScheme>
+  </a:themeElements>
+  <a:objectDefaults/>
+  <a:extraClrSchemeLst/>
+  <a:extLst>
+    <a:ext uri="{05A4C25C-085E-4340-85A3-A5531E510DB2}">
+      <thm15:themeFamily xmlns:thm15="http://schemas.microsoft.com/office/thememl/2012/main" name="Office Theme" id="{62F939B6-93AF-4DB8-9C6B-D6C7DFDC589F}" vid="{4A3C46E8-61CC-4603-A589-7422A47A8E4A}"/>
+    </a:ext>
+  </a:extLst>
+</a:theme>
 </file>
</xml_diff>

<commit_message>
Updates introduction of presentation: new maps and data quality slide
</commit_message>
<xml_diff>
--- a/presentation/gtdb-final-presentation.pptx
+++ b/presentation/gtdb-final-presentation.pptx
@@ -5,21 +5,22 @@
     <p:sldMasterId id="2147483803" r:id="rId1"/>
   </p:sldMasterIdLst>
   <p:notesMasterIdLst>
-    <p:notesMasterId r:id="rId14"/>
+    <p:notesMasterId r:id="rId15"/>
   </p:notesMasterIdLst>
   <p:sldIdLst>
     <p:sldId id="256" r:id="rId2"/>
     <p:sldId id="261" r:id="rId3"/>
     <p:sldId id="262" r:id="rId4"/>
     <p:sldId id="266" r:id="rId5"/>
-    <p:sldId id="267" r:id="rId6"/>
+    <p:sldId id="263" r:id="rId6"/>
     <p:sldId id="268" r:id="rId7"/>
-    <p:sldId id="263" r:id="rId8"/>
-    <p:sldId id="264" r:id="rId9"/>
-    <p:sldId id="257" r:id="rId10"/>
-    <p:sldId id="258" r:id="rId11"/>
-    <p:sldId id="259" r:id="rId12"/>
-    <p:sldId id="265" r:id="rId13"/>
+    <p:sldId id="270" r:id="rId8"/>
+    <p:sldId id="271" r:id="rId9"/>
+    <p:sldId id="264" r:id="rId10"/>
+    <p:sldId id="257" r:id="rId11"/>
+    <p:sldId id="258" r:id="rId12"/>
+    <p:sldId id="259" r:id="rId13"/>
+    <p:sldId id="265" r:id="rId14"/>
   </p:sldIdLst>
   <p:sldSz cx="9144000" cy="6858000" type="screen4x3"/>
   <p:notesSz cx="6858000" cy="9144000"/>
@@ -127,9 +128,10 @@
             <p14:sldId id="261"/>
             <p14:sldId id="262"/>
             <p14:sldId id="266"/>
-            <p14:sldId id="267"/>
+            <p14:sldId id="263"/>
             <p14:sldId id="268"/>
-            <p14:sldId id="263"/>
+            <p14:sldId id="270"/>
+            <p14:sldId id="271"/>
             <p14:sldId id="264"/>
           </p14:sldIdLst>
         </p14:section>
@@ -255,7 +257,7 @@
           <a:p>
             <a:fld id="{5FFFC3A9-8065-47C2-8225-E4C63BB2D22D}" type="datetimeFigureOut">
               <a:rPr lang="en-US" smtClean="0"/>
-              <a:t>11/16/2019</a:t>
+              <a:t>11/19/2019</a:t>
             </a:fld>
             <a:endParaRPr lang="en-US"/>
           </a:p>
@@ -568,7 +570,7 @@
           <a:p>
             <a:r>
               <a:rPr lang="en-US" dirty="0"/>
-              <a:t>Random plot of 20,000 incidents</a:t>
+              <a:t>Densities based on random plot of 20,000 incidents</a:t>
             </a:r>
           </a:p>
         </p:txBody>
@@ -590,7 +592,7 @@
           <a:p>
             <a:fld id="{58F5E0F1-AB47-4A7A-BA35-9463FCF91331}" type="slidenum">
               <a:rPr lang="en-US" smtClean="0"/>
-              <a:t>5</a:t>
+              <a:t>6</a:t>
             </a:fld>
             <a:endParaRPr lang="en-US"/>
           </a:p>
@@ -599,7 +601,7 @@
     </p:spTree>
     <p:extLst>
       <p:ext uri="{BB962C8B-B14F-4D97-AF65-F5344CB8AC3E}">
-        <p14:creationId xmlns:p14="http://schemas.microsoft.com/office/powerpoint/2010/main" val="4054851122"/>
+        <p14:creationId xmlns:p14="http://schemas.microsoft.com/office/powerpoint/2010/main" val="2759362589"/>
       </p:ext>
     </p:extLst>
   </p:cSld>
@@ -653,10 +655,723 @@
           <a:bodyPr/>
           <a:lstStyle/>
           <a:p>
-            <a:r>
-              <a:rPr lang="en-US" dirty="0"/>
-              <a:t>Densities based on random plot of 20,000 incidents</a:t>
-            </a:r>
+            <a:pPr marL="0" algn="r" rtl="0" eaLnBrk="1" fontAlgn="ctr" latinLnBrk="0" hangingPunct="1">
+              <a:spcBef>
+                <a:spcPts val="0"/>
+              </a:spcBef>
+              <a:spcAft>
+                <a:spcPts val="0"/>
+              </a:spcAft>
+            </a:pPr>
+            <a:r>
+              <a:rPr lang="en-US" sz="1200" b="1" i="0" u="none" strike="noStrike" kern="1200" dirty="0">
+                <a:solidFill>
+                  <a:srgbClr val="000000"/>
+                </a:solidFill>
+                <a:effectLst/>
+                <a:latin typeface="Franklin Gothic Book" panose="020B0503020102020204" pitchFamily="34" charset="0"/>
+              </a:rPr>
+              <a:t>1</a:t>
+            </a:r>
+            <a:endParaRPr lang="en-US" sz="1600" b="0" i="0" u="none" strike="noStrike" dirty="0">
+              <a:effectLst/>
+              <a:latin typeface="Arial" panose="020B0604020202020204" pitchFamily="34" charset="0"/>
+            </a:endParaRPr>
+          </a:p>
+          <a:p>
+            <a:pPr marL="0" algn="l" defTabSz="914400" rtl="0" eaLnBrk="1" fontAlgn="ctr" latinLnBrk="0" hangingPunct="1">
+              <a:spcBef>
+                <a:spcPts val="0"/>
+              </a:spcBef>
+              <a:spcAft>
+                <a:spcPts val="0"/>
+              </a:spcAft>
+            </a:pPr>
+            <a:r>
+              <a:rPr lang="en-US" sz="1200" b="0" i="0" u="none" strike="noStrike" kern="1200" dirty="0">
+                <a:solidFill>
+                  <a:srgbClr val="000000"/>
+                </a:solidFill>
+                <a:effectLst/>
+                <a:latin typeface="Franklin Gothic Book" panose="020B0503020102020204" pitchFamily="34" charset="0"/>
+                <a:ea typeface="+mn-ea"/>
+                <a:cs typeface="+mn-cs"/>
+              </a:rPr>
+              <a:t>Iraq</a:t>
+            </a:r>
+          </a:p>
+          <a:p>
+            <a:pPr marL="0" algn="l" defTabSz="914400" rtl="0" eaLnBrk="1" fontAlgn="ctr" latinLnBrk="0" hangingPunct="1">
+              <a:spcBef>
+                <a:spcPts val="0"/>
+              </a:spcBef>
+              <a:spcAft>
+                <a:spcPts val="0"/>
+              </a:spcAft>
+            </a:pPr>
+            <a:r>
+              <a:rPr lang="en-US" sz="1200" b="0" i="0" u="none" strike="noStrike" kern="1200" dirty="0">
+                <a:solidFill>
+                  <a:srgbClr val="000000"/>
+                </a:solidFill>
+                <a:effectLst/>
+                <a:latin typeface="Franklin Gothic Book" panose="020B0503020102020204" pitchFamily="34" charset="0"/>
+                <a:ea typeface="+mn-ea"/>
+                <a:cs typeface="+mn-cs"/>
+              </a:rPr>
+              <a:t>24636</a:t>
+            </a:r>
+          </a:p>
+          <a:p>
+            <a:pPr marL="0" algn="r" rtl="0" eaLnBrk="1" fontAlgn="ctr" latinLnBrk="0" hangingPunct="1">
+              <a:spcBef>
+                <a:spcPts val="0"/>
+              </a:spcBef>
+              <a:spcAft>
+                <a:spcPts val="0"/>
+              </a:spcAft>
+            </a:pPr>
+            <a:r>
+              <a:rPr lang="en-US" sz="1200" b="1" i="0" u="none" strike="noStrike" kern="1200" dirty="0">
+                <a:solidFill>
+                  <a:srgbClr val="000000"/>
+                </a:solidFill>
+                <a:effectLst/>
+                <a:latin typeface="Franklin Gothic Book" panose="020B0503020102020204" pitchFamily="34" charset="0"/>
+              </a:rPr>
+              <a:t>2</a:t>
+            </a:r>
+            <a:endParaRPr lang="en-US" sz="1600" b="0" i="0" u="none" strike="noStrike" dirty="0">
+              <a:effectLst/>
+              <a:latin typeface="Arial" panose="020B0604020202020204" pitchFamily="34" charset="0"/>
+            </a:endParaRPr>
+          </a:p>
+          <a:p>
+            <a:pPr marL="0" algn="l" rtl="0" eaLnBrk="1" fontAlgn="ctr" latinLnBrk="0" hangingPunct="1">
+              <a:spcBef>
+                <a:spcPts val="0"/>
+              </a:spcBef>
+              <a:spcAft>
+                <a:spcPts val="0"/>
+              </a:spcAft>
+            </a:pPr>
+            <a:r>
+              <a:rPr lang="en-US" sz="1200" b="0" i="0" u="none" strike="noStrike" kern="1200" dirty="0">
+                <a:solidFill>
+                  <a:srgbClr val="000000"/>
+                </a:solidFill>
+                <a:effectLst/>
+                <a:latin typeface="Franklin Gothic Book" panose="020B0503020102020204" pitchFamily="34" charset="0"/>
+              </a:rPr>
+              <a:t>Pakistan</a:t>
+            </a:r>
+            <a:endParaRPr lang="en-US" sz="1600" b="0" i="0" u="none" strike="noStrike" dirty="0">
+              <a:effectLst/>
+              <a:latin typeface="Arial" panose="020B0604020202020204" pitchFamily="34" charset="0"/>
+            </a:endParaRPr>
+          </a:p>
+          <a:p>
+            <a:pPr marL="0" algn="l" rtl="0" eaLnBrk="1" fontAlgn="ctr" latinLnBrk="0" hangingPunct="1">
+              <a:spcBef>
+                <a:spcPts val="0"/>
+              </a:spcBef>
+              <a:spcAft>
+                <a:spcPts val="0"/>
+              </a:spcAft>
+            </a:pPr>
+            <a:r>
+              <a:rPr lang="en-US" sz="1200" b="0" i="0" u="none" strike="noStrike" kern="1200" dirty="0">
+                <a:solidFill>
+                  <a:srgbClr val="000000"/>
+                </a:solidFill>
+                <a:effectLst/>
+                <a:latin typeface="Franklin Gothic Book" panose="020B0503020102020204" pitchFamily="34" charset="0"/>
+              </a:rPr>
+              <a:t>14368</a:t>
+            </a:r>
+            <a:endParaRPr lang="en-US" sz="1600" b="0" i="0" u="none" strike="noStrike" dirty="0">
+              <a:effectLst/>
+              <a:latin typeface="Arial" panose="020B0604020202020204" pitchFamily="34" charset="0"/>
+            </a:endParaRPr>
+          </a:p>
+          <a:p>
+            <a:pPr marL="0" algn="r" rtl="0" eaLnBrk="1" fontAlgn="ctr" latinLnBrk="0" hangingPunct="1">
+              <a:spcBef>
+                <a:spcPts val="0"/>
+              </a:spcBef>
+              <a:spcAft>
+                <a:spcPts val="0"/>
+              </a:spcAft>
+            </a:pPr>
+            <a:r>
+              <a:rPr lang="en-US" sz="1200" b="1" i="0" u="none" strike="noStrike" kern="1200" dirty="0">
+                <a:solidFill>
+                  <a:srgbClr val="000000"/>
+                </a:solidFill>
+                <a:effectLst/>
+                <a:latin typeface="Franklin Gothic Book" panose="020B0503020102020204" pitchFamily="34" charset="0"/>
+              </a:rPr>
+              <a:t>3</a:t>
+            </a:r>
+            <a:endParaRPr lang="en-US" sz="1600" b="0" i="0" u="none" strike="noStrike" dirty="0">
+              <a:effectLst/>
+              <a:latin typeface="Arial" panose="020B0604020202020204" pitchFamily="34" charset="0"/>
+            </a:endParaRPr>
+          </a:p>
+          <a:p>
+            <a:pPr marL="0" algn="l" rtl="0" eaLnBrk="1" fontAlgn="ctr" latinLnBrk="0" hangingPunct="1">
+              <a:spcBef>
+                <a:spcPts val="0"/>
+              </a:spcBef>
+              <a:spcAft>
+                <a:spcPts val="0"/>
+              </a:spcAft>
+            </a:pPr>
+            <a:r>
+              <a:rPr lang="en-US" sz="1200" b="0" i="0" u="none" strike="noStrike" kern="1200" dirty="0">
+                <a:solidFill>
+                  <a:srgbClr val="000000"/>
+                </a:solidFill>
+                <a:effectLst/>
+                <a:latin typeface="Franklin Gothic Book" panose="020B0503020102020204" pitchFamily="34" charset="0"/>
+              </a:rPr>
+              <a:t>Afghanistan</a:t>
+            </a:r>
+            <a:endParaRPr lang="en-US" sz="1600" b="0" i="0" u="none" strike="noStrike" dirty="0">
+              <a:effectLst/>
+              <a:latin typeface="Arial" panose="020B0604020202020204" pitchFamily="34" charset="0"/>
+            </a:endParaRPr>
+          </a:p>
+          <a:p>
+            <a:pPr marL="0" algn="l" rtl="0" eaLnBrk="1" fontAlgn="ctr" latinLnBrk="0" hangingPunct="1">
+              <a:spcBef>
+                <a:spcPts val="0"/>
+              </a:spcBef>
+              <a:spcAft>
+                <a:spcPts val="0"/>
+              </a:spcAft>
+            </a:pPr>
+            <a:r>
+              <a:rPr lang="en-US" sz="1200" b="0" i="0" u="none" strike="noStrike" kern="1200" dirty="0">
+                <a:solidFill>
+                  <a:srgbClr val="000000"/>
+                </a:solidFill>
+                <a:effectLst/>
+                <a:latin typeface="Franklin Gothic Book" panose="020B0503020102020204" pitchFamily="34" charset="0"/>
+              </a:rPr>
+              <a:t>12731</a:t>
+            </a:r>
+            <a:endParaRPr lang="en-US" sz="1600" b="0" i="0" u="none" strike="noStrike" dirty="0">
+              <a:effectLst/>
+              <a:latin typeface="Arial" panose="020B0604020202020204" pitchFamily="34" charset="0"/>
+            </a:endParaRPr>
+          </a:p>
+          <a:p>
+            <a:pPr marL="0" algn="r" rtl="0" eaLnBrk="1" fontAlgn="ctr" latinLnBrk="0" hangingPunct="1">
+              <a:spcBef>
+                <a:spcPts val="0"/>
+              </a:spcBef>
+              <a:spcAft>
+                <a:spcPts val="0"/>
+              </a:spcAft>
+            </a:pPr>
+            <a:r>
+              <a:rPr lang="en-US" sz="1200" b="1" i="0" u="none" strike="noStrike" kern="1200" dirty="0">
+                <a:solidFill>
+                  <a:srgbClr val="000000"/>
+                </a:solidFill>
+                <a:effectLst/>
+                <a:latin typeface="Franklin Gothic Book" panose="020B0503020102020204" pitchFamily="34" charset="0"/>
+              </a:rPr>
+              <a:t>4</a:t>
+            </a:r>
+            <a:endParaRPr lang="en-US" sz="1600" b="0" i="0" u="none" strike="noStrike" dirty="0">
+              <a:effectLst/>
+              <a:latin typeface="Arial" panose="020B0604020202020204" pitchFamily="34" charset="0"/>
+            </a:endParaRPr>
+          </a:p>
+          <a:p>
+            <a:pPr marL="0" algn="l" rtl="0" eaLnBrk="1" fontAlgn="ctr" latinLnBrk="0" hangingPunct="1">
+              <a:spcBef>
+                <a:spcPts val="0"/>
+              </a:spcBef>
+              <a:spcAft>
+                <a:spcPts val="0"/>
+              </a:spcAft>
+            </a:pPr>
+            <a:r>
+              <a:rPr lang="en-US" sz="1200" b="0" i="0" u="none" strike="noStrike" kern="1200" dirty="0">
+                <a:solidFill>
+                  <a:srgbClr val="000000"/>
+                </a:solidFill>
+                <a:effectLst/>
+                <a:latin typeface="Franklin Gothic Book" panose="020B0503020102020204" pitchFamily="34" charset="0"/>
+              </a:rPr>
+              <a:t>India</a:t>
+            </a:r>
+            <a:endParaRPr lang="en-US" sz="1600" b="0" i="0" u="none" strike="noStrike" dirty="0">
+              <a:effectLst/>
+              <a:latin typeface="Arial" panose="020B0604020202020204" pitchFamily="34" charset="0"/>
+            </a:endParaRPr>
+          </a:p>
+          <a:p>
+            <a:pPr marL="0" algn="l" rtl="0" eaLnBrk="1" fontAlgn="ctr" latinLnBrk="0" hangingPunct="1">
+              <a:spcBef>
+                <a:spcPts val="0"/>
+              </a:spcBef>
+              <a:spcAft>
+                <a:spcPts val="0"/>
+              </a:spcAft>
+            </a:pPr>
+            <a:r>
+              <a:rPr lang="en-US" sz="1200" b="0" i="0" u="none" strike="noStrike" kern="1200" dirty="0">
+                <a:solidFill>
+                  <a:srgbClr val="000000"/>
+                </a:solidFill>
+                <a:effectLst/>
+                <a:latin typeface="Franklin Gothic Book" panose="020B0503020102020204" pitchFamily="34" charset="0"/>
+              </a:rPr>
+              <a:t>11960</a:t>
+            </a:r>
+            <a:endParaRPr lang="en-US" sz="1600" b="0" i="0" u="none" strike="noStrike" dirty="0">
+              <a:effectLst/>
+              <a:latin typeface="Arial" panose="020B0604020202020204" pitchFamily="34" charset="0"/>
+            </a:endParaRPr>
+          </a:p>
+          <a:p>
+            <a:pPr marL="0" algn="r" rtl="0" eaLnBrk="1" fontAlgn="ctr" latinLnBrk="0" hangingPunct="1">
+              <a:spcBef>
+                <a:spcPts val="0"/>
+              </a:spcBef>
+              <a:spcAft>
+                <a:spcPts val="0"/>
+              </a:spcAft>
+            </a:pPr>
+            <a:r>
+              <a:rPr lang="en-US" sz="1200" b="1" i="0" u="none" strike="noStrike" kern="1200" dirty="0">
+                <a:solidFill>
+                  <a:srgbClr val="000000"/>
+                </a:solidFill>
+                <a:effectLst/>
+                <a:latin typeface="Franklin Gothic Book" panose="020B0503020102020204" pitchFamily="34" charset="0"/>
+              </a:rPr>
+              <a:t>5</a:t>
+            </a:r>
+            <a:endParaRPr lang="en-US" sz="1600" b="0" i="0" u="none" strike="noStrike" dirty="0">
+              <a:effectLst/>
+              <a:latin typeface="Arial" panose="020B0604020202020204" pitchFamily="34" charset="0"/>
+            </a:endParaRPr>
+          </a:p>
+          <a:p>
+            <a:pPr marL="0" algn="l" rtl="0" eaLnBrk="1" fontAlgn="ctr" latinLnBrk="0" hangingPunct="1">
+              <a:spcBef>
+                <a:spcPts val="0"/>
+              </a:spcBef>
+              <a:spcAft>
+                <a:spcPts val="0"/>
+              </a:spcAft>
+            </a:pPr>
+            <a:r>
+              <a:rPr lang="en-US" sz="1200" b="0" i="0" u="none" strike="noStrike" kern="1200" dirty="0">
+                <a:solidFill>
+                  <a:srgbClr val="000000"/>
+                </a:solidFill>
+                <a:effectLst/>
+                <a:latin typeface="Franklin Gothic Book" panose="020B0503020102020204" pitchFamily="34" charset="0"/>
+              </a:rPr>
+              <a:t>Colombia</a:t>
+            </a:r>
+            <a:endParaRPr lang="en-US" sz="1600" b="0" i="0" u="none" strike="noStrike" dirty="0">
+              <a:effectLst/>
+              <a:latin typeface="Arial" panose="020B0604020202020204" pitchFamily="34" charset="0"/>
+            </a:endParaRPr>
+          </a:p>
+          <a:p>
+            <a:pPr marL="0" algn="l" rtl="0" eaLnBrk="1" fontAlgn="ctr" latinLnBrk="0" hangingPunct="1">
+              <a:spcBef>
+                <a:spcPts val="0"/>
+              </a:spcBef>
+              <a:spcAft>
+                <a:spcPts val="0"/>
+              </a:spcAft>
+            </a:pPr>
+            <a:r>
+              <a:rPr lang="en-US" sz="1200" b="0" i="0" u="none" strike="noStrike" kern="1200" dirty="0">
+                <a:solidFill>
+                  <a:srgbClr val="000000"/>
+                </a:solidFill>
+                <a:effectLst/>
+                <a:latin typeface="Franklin Gothic Book" panose="020B0503020102020204" pitchFamily="34" charset="0"/>
+              </a:rPr>
+              <a:t>8306</a:t>
+            </a:r>
+            <a:endParaRPr lang="en-US" sz="1600" b="0" i="0" u="none" strike="noStrike" dirty="0">
+              <a:effectLst/>
+              <a:latin typeface="Arial" panose="020B0604020202020204" pitchFamily="34" charset="0"/>
+            </a:endParaRPr>
+          </a:p>
+          <a:p>
+            <a:pPr marL="0" algn="r" rtl="0" eaLnBrk="1" fontAlgn="ctr" latinLnBrk="0" hangingPunct="1">
+              <a:spcBef>
+                <a:spcPts val="0"/>
+              </a:spcBef>
+              <a:spcAft>
+                <a:spcPts val="0"/>
+              </a:spcAft>
+            </a:pPr>
+            <a:r>
+              <a:rPr lang="en-US" sz="1200" b="1" i="0" u="none" strike="noStrike" kern="1200" dirty="0">
+                <a:solidFill>
+                  <a:srgbClr val="000000"/>
+                </a:solidFill>
+                <a:effectLst/>
+                <a:latin typeface="Franklin Gothic Book" panose="020B0503020102020204" pitchFamily="34" charset="0"/>
+              </a:rPr>
+              <a:t>6</a:t>
+            </a:r>
+            <a:endParaRPr lang="en-US" sz="1600" b="0" i="0" u="none" strike="noStrike" dirty="0">
+              <a:effectLst/>
+              <a:latin typeface="Arial" panose="020B0604020202020204" pitchFamily="34" charset="0"/>
+            </a:endParaRPr>
+          </a:p>
+          <a:p>
+            <a:pPr marL="0" algn="l" rtl="0" eaLnBrk="1" fontAlgn="ctr" latinLnBrk="0" hangingPunct="1">
+              <a:spcBef>
+                <a:spcPts val="0"/>
+              </a:spcBef>
+              <a:spcAft>
+                <a:spcPts val="0"/>
+              </a:spcAft>
+            </a:pPr>
+            <a:r>
+              <a:rPr lang="en-US" sz="1200" b="0" i="0" u="none" strike="noStrike" kern="1200" dirty="0">
+                <a:solidFill>
+                  <a:srgbClr val="000000"/>
+                </a:solidFill>
+                <a:effectLst/>
+                <a:latin typeface="Franklin Gothic Book" panose="020B0503020102020204" pitchFamily="34" charset="0"/>
+              </a:rPr>
+              <a:t>Philippines</a:t>
+            </a:r>
+            <a:endParaRPr lang="en-US" sz="1600" b="0" i="0" u="none" strike="noStrike" dirty="0">
+              <a:effectLst/>
+              <a:latin typeface="Arial" panose="020B0604020202020204" pitchFamily="34" charset="0"/>
+            </a:endParaRPr>
+          </a:p>
+          <a:p>
+            <a:pPr marL="0" algn="l" rtl="0" eaLnBrk="1" fontAlgn="ctr" latinLnBrk="0" hangingPunct="1">
+              <a:spcBef>
+                <a:spcPts val="0"/>
+              </a:spcBef>
+              <a:spcAft>
+                <a:spcPts val="0"/>
+              </a:spcAft>
+            </a:pPr>
+            <a:r>
+              <a:rPr lang="en-US" sz="1200" b="0" i="0" u="none" strike="noStrike" kern="1200" dirty="0">
+                <a:solidFill>
+                  <a:srgbClr val="000000"/>
+                </a:solidFill>
+                <a:effectLst/>
+                <a:latin typeface="Franklin Gothic Book" panose="020B0503020102020204" pitchFamily="34" charset="0"/>
+              </a:rPr>
+              <a:t>6908</a:t>
+            </a:r>
+            <a:endParaRPr lang="en-US" sz="1600" b="0" i="0" u="none" strike="noStrike" dirty="0">
+              <a:effectLst/>
+              <a:latin typeface="Arial" panose="020B0604020202020204" pitchFamily="34" charset="0"/>
+            </a:endParaRPr>
+          </a:p>
+          <a:p>
+            <a:pPr marL="0" algn="r" rtl="0" eaLnBrk="1" fontAlgn="ctr" latinLnBrk="0" hangingPunct="1">
+              <a:spcBef>
+                <a:spcPts val="0"/>
+              </a:spcBef>
+              <a:spcAft>
+                <a:spcPts val="0"/>
+              </a:spcAft>
+            </a:pPr>
+            <a:r>
+              <a:rPr lang="en-US" sz="1200" b="1" i="0" u="none" strike="noStrike" kern="1200" dirty="0">
+                <a:solidFill>
+                  <a:srgbClr val="000000"/>
+                </a:solidFill>
+                <a:effectLst/>
+                <a:latin typeface="Franklin Gothic Book" panose="020B0503020102020204" pitchFamily="34" charset="0"/>
+              </a:rPr>
+              <a:t>7</a:t>
+            </a:r>
+            <a:endParaRPr lang="en-US" sz="1600" b="0" i="0" u="none" strike="noStrike" dirty="0">
+              <a:effectLst/>
+              <a:latin typeface="Arial" panose="020B0604020202020204" pitchFamily="34" charset="0"/>
+            </a:endParaRPr>
+          </a:p>
+          <a:p>
+            <a:pPr marL="0" algn="l" rtl="0" eaLnBrk="1" fontAlgn="ctr" latinLnBrk="0" hangingPunct="1">
+              <a:spcBef>
+                <a:spcPts val="0"/>
+              </a:spcBef>
+              <a:spcAft>
+                <a:spcPts val="0"/>
+              </a:spcAft>
+            </a:pPr>
+            <a:r>
+              <a:rPr lang="en-US" sz="1200" b="0" i="0" u="none" strike="noStrike" kern="1200" dirty="0">
+                <a:solidFill>
+                  <a:srgbClr val="000000"/>
+                </a:solidFill>
+                <a:effectLst/>
+                <a:latin typeface="Franklin Gothic Book" panose="020B0503020102020204" pitchFamily="34" charset="0"/>
+              </a:rPr>
+              <a:t>Peru</a:t>
+            </a:r>
+            <a:endParaRPr lang="en-US" sz="1600" b="0" i="0" u="none" strike="noStrike" dirty="0">
+              <a:effectLst/>
+              <a:latin typeface="Arial" panose="020B0604020202020204" pitchFamily="34" charset="0"/>
+            </a:endParaRPr>
+          </a:p>
+          <a:p>
+            <a:pPr marL="0" algn="l" rtl="0" eaLnBrk="1" fontAlgn="ctr" latinLnBrk="0" hangingPunct="1">
+              <a:spcBef>
+                <a:spcPts val="0"/>
+              </a:spcBef>
+              <a:spcAft>
+                <a:spcPts val="0"/>
+              </a:spcAft>
+            </a:pPr>
+            <a:r>
+              <a:rPr lang="en-US" sz="1200" b="0" i="0" u="none" strike="noStrike" kern="1200" dirty="0">
+                <a:solidFill>
+                  <a:srgbClr val="000000"/>
+                </a:solidFill>
+                <a:effectLst/>
+                <a:latin typeface="Franklin Gothic Book" panose="020B0503020102020204" pitchFamily="34" charset="0"/>
+              </a:rPr>
+              <a:t>6096</a:t>
+            </a:r>
+            <a:endParaRPr lang="en-US" sz="1600" b="0" i="0" u="none" strike="noStrike" dirty="0">
+              <a:effectLst/>
+              <a:latin typeface="Arial" panose="020B0604020202020204" pitchFamily="34" charset="0"/>
+            </a:endParaRPr>
+          </a:p>
+          <a:p>
+            <a:pPr marL="0" algn="r" rtl="0" eaLnBrk="1" fontAlgn="ctr" latinLnBrk="0" hangingPunct="1">
+              <a:spcBef>
+                <a:spcPts val="0"/>
+              </a:spcBef>
+              <a:spcAft>
+                <a:spcPts val="0"/>
+              </a:spcAft>
+            </a:pPr>
+            <a:r>
+              <a:rPr lang="en-US" sz="1200" b="1" i="0" u="none" strike="noStrike" kern="1200" dirty="0">
+                <a:solidFill>
+                  <a:srgbClr val="000000"/>
+                </a:solidFill>
+                <a:effectLst/>
+                <a:latin typeface="Franklin Gothic Book" panose="020B0503020102020204" pitchFamily="34" charset="0"/>
+              </a:rPr>
+              <a:t>8</a:t>
+            </a:r>
+            <a:endParaRPr lang="en-US" sz="1600" b="0" i="0" u="none" strike="noStrike" dirty="0">
+              <a:effectLst/>
+              <a:latin typeface="Arial" panose="020B0604020202020204" pitchFamily="34" charset="0"/>
+            </a:endParaRPr>
+          </a:p>
+          <a:p>
+            <a:pPr marL="0" algn="l" rtl="0" eaLnBrk="1" fontAlgn="ctr" latinLnBrk="0" hangingPunct="1">
+              <a:spcBef>
+                <a:spcPts val="0"/>
+              </a:spcBef>
+              <a:spcAft>
+                <a:spcPts val="0"/>
+              </a:spcAft>
+            </a:pPr>
+            <a:r>
+              <a:rPr lang="en-US" sz="1200" b="0" i="0" u="none" strike="noStrike" kern="1200" dirty="0">
+                <a:solidFill>
+                  <a:srgbClr val="000000"/>
+                </a:solidFill>
+                <a:effectLst/>
+                <a:latin typeface="Franklin Gothic Book" panose="020B0503020102020204" pitchFamily="34" charset="0"/>
+              </a:rPr>
+              <a:t>El Salvador</a:t>
+            </a:r>
+            <a:endParaRPr lang="en-US" sz="1600" b="0" i="0" u="none" strike="noStrike" dirty="0">
+              <a:effectLst/>
+              <a:latin typeface="Arial" panose="020B0604020202020204" pitchFamily="34" charset="0"/>
+            </a:endParaRPr>
+          </a:p>
+          <a:p>
+            <a:pPr marL="0" algn="l" rtl="0" eaLnBrk="1" fontAlgn="ctr" latinLnBrk="0" hangingPunct="1">
+              <a:spcBef>
+                <a:spcPts val="0"/>
+              </a:spcBef>
+              <a:spcAft>
+                <a:spcPts val="0"/>
+              </a:spcAft>
+            </a:pPr>
+            <a:r>
+              <a:rPr lang="en-US" sz="1200" b="0" i="0" u="none" strike="noStrike" kern="1200" dirty="0">
+                <a:solidFill>
+                  <a:srgbClr val="000000"/>
+                </a:solidFill>
+                <a:effectLst/>
+                <a:latin typeface="Franklin Gothic Book" panose="020B0503020102020204" pitchFamily="34" charset="0"/>
+              </a:rPr>
+              <a:t>5320</a:t>
+            </a:r>
+            <a:endParaRPr lang="en-US" sz="1600" b="0" i="0" u="none" strike="noStrike" dirty="0">
+              <a:effectLst/>
+              <a:latin typeface="Arial" panose="020B0604020202020204" pitchFamily="34" charset="0"/>
+            </a:endParaRPr>
+          </a:p>
+          <a:p>
+            <a:pPr marL="0" algn="r" rtl="0" eaLnBrk="1" fontAlgn="ctr" latinLnBrk="0" hangingPunct="1">
+              <a:spcBef>
+                <a:spcPts val="0"/>
+              </a:spcBef>
+              <a:spcAft>
+                <a:spcPts val="0"/>
+              </a:spcAft>
+            </a:pPr>
+            <a:r>
+              <a:rPr lang="en-US" sz="1200" b="1" i="0" u="none" strike="noStrike" kern="1200" dirty="0">
+                <a:solidFill>
+                  <a:srgbClr val="000000"/>
+                </a:solidFill>
+                <a:effectLst/>
+                <a:latin typeface="Franklin Gothic Book" panose="020B0503020102020204" pitchFamily="34" charset="0"/>
+              </a:rPr>
+              <a:t>9</a:t>
+            </a:r>
+            <a:endParaRPr lang="en-US" sz="1600" b="0" i="0" u="none" strike="noStrike" dirty="0">
+              <a:effectLst/>
+              <a:latin typeface="Arial" panose="020B0604020202020204" pitchFamily="34" charset="0"/>
+            </a:endParaRPr>
+          </a:p>
+          <a:p>
+            <a:pPr marL="0" algn="l" rtl="0" eaLnBrk="1" fontAlgn="ctr" latinLnBrk="0" hangingPunct="1">
+              <a:spcBef>
+                <a:spcPts val="0"/>
+              </a:spcBef>
+              <a:spcAft>
+                <a:spcPts val="0"/>
+              </a:spcAft>
+            </a:pPr>
+            <a:r>
+              <a:rPr lang="en-US" sz="1200" b="0" i="0" u="none" strike="noStrike" kern="1200" dirty="0">
+                <a:solidFill>
+                  <a:srgbClr val="000000"/>
+                </a:solidFill>
+                <a:effectLst/>
+                <a:latin typeface="Franklin Gothic Book" panose="020B0503020102020204" pitchFamily="34" charset="0"/>
+              </a:rPr>
+              <a:t>United Kingdom</a:t>
+            </a:r>
+            <a:endParaRPr lang="en-US" sz="1600" b="0" i="0" u="none" strike="noStrike" dirty="0">
+              <a:effectLst/>
+              <a:latin typeface="Arial" panose="020B0604020202020204" pitchFamily="34" charset="0"/>
+            </a:endParaRPr>
+          </a:p>
+          <a:p>
+            <a:pPr marL="0" algn="l" rtl="0" eaLnBrk="1" fontAlgn="ctr" latinLnBrk="0" hangingPunct="1">
+              <a:spcBef>
+                <a:spcPts val="0"/>
+              </a:spcBef>
+              <a:spcAft>
+                <a:spcPts val="0"/>
+              </a:spcAft>
+            </a:pPr>
+            <a:r>
+              <a:rPr lang="en-US" sz="1200" b="0" i="0" u="none" strike="noStrike" kern="1200" dirty="0">
+                <a:solidFill>
+                  <a:srgbClr val="000000"/>
+                </a:solidFill>
+                <a:effectLst/>
+                <a:latin typeface="Franklin Gothic Book" panose="020B0503020102020204" pitchFamily="34" charset="0"/>
+              </a:rPr>
+              <a:t>5235</a:t>
+            </a:r>
+            <a:endParaRPr lang="en-US" sz="1600" b="0" i="0" u="none" strike="noStrike" dirty="0">
+              <a:effectLst/>
+              <a:latin typeface="Arial" panose="020B0604020202020204" pitchFamily="34" charset="0"/>
+            </a:endParaRPr>
+          </a:p>
+          <a:p>
+            <a:pPr marL="0" algn="r" rtl="0" eaLnBrk="1" fontAlgn="ctr" latinLnBrk="0" hangingPunct="1">
+              <a:spcBef>
+                <a:spcPts val="0"/>
+              </a:spcBef>
+              <a:spcAft>
+                <a:spcPts val="0"/>
+              </a:spcAft>
+            </a:pPr>
+            <a:r>
+              <a:rPr lang="en-US" sz="1200" b="1" i="0" u="none" strike="noStrike" kern="1200" dirty="0">
+                <a:solidFill>
+                  <a:srgbClr val="000000"/>
+                </a:solidFill>
+                <a:effectLst/>
+                <a:latin typeface="Franklin Gothic Book" panose="020B0503020102020204" pitchFamily="34" charset="0"/>
+              </a:rPr>
+              <a:t>10</a:t>
+            </a:r>
+            <a:endParaRPr lang="en-US" sz="1600" b="0" i="0" u="none" strike="noStrike" dirty="0">
+              <a:effectLst/>
+              <a:latin typeface="Arial" panose="020B0604020202020204" pitchFamily="34" charset="0"/>
+            </a:endParaRPr>
+          </a:p>
+          <a:p>
+            <a:pPr marL="0" algn="l" rtl="0" eaLnBrk="1" fontAlgn="ctr" latinLnBrk="0" hangingPunct="1">
+              <a:spcBef>
+                <a:spcPts val="0"/>
+              </a:spcBef>
+              <a:spcAft>
+                <a:spcPts val="0"/>
+              </a:spcAft>
+            </a:pPr>
+            <a:r>
+              <a:rPr lang="en-US" sz="1200" b="0" i="0" u="none" strike="noStrike" kern="1200" dirty="0">
+                <a:solidFill>
+                  <a:srgbClr val="000000"/>
+                </a:solidFill>
+                <a:effectLst/>
+                <a:latin typeface="Franklin Gothic Book" panose="020B0503020102020204" pitchFamily="34" charset="0"/>
+              </a:rPr>
+              <a:t>Turkey</a:t>
+            </a:r>
+            <a:endParaRPr lang="en-US" sz="1600" b="0" i="0" u="none" strike="noStrike" dirty="0">
+              <a:effectLst/>
+              <a:latin typeface="Arial" panose="020B0604020202020204" pitchFamily="34" charset="0"/>
+            </a:endParaRPr>
+          </a:p>
+          <a:p>
+            <a:pPr marL="0" algn="l" rtl="0" eaLnBrk="1" fontAlgn="ctr" latinLnBrk="0" hangingPunct="1">
+              <a:spcBef>
+                <a:spcPts val="0"/>
+              </a:spcBef>
+              <a:spcAft>
+                <a:spcPts val="0"/>
+              </a:spcAft>
+            </a:pPr>
+            <a:r>
+              <a:rPr lang="en-US" sz="1200" b="0" i="0" u="none" strike="noStrike" kern="1200" dirty="0">
+                <a:solidFill>
+                  <a:srgbClr val="000000"/>
+                </a:solidFill>
+                <a:effectLst/>
+                <a:latin typeface="Franklin Gothic Book" panose="020B0503020102020204" pitchFamily="34" charset="0"/>
+              </a:rPr>
+              <a:t>4292</a:t>
+            </a:r>
+            <a:endParaRPr lang="en-US" sz="1600" b="0" i="0" u="none" strike="noStrike" dirty="0">
+              <a:effectLst/>
+              <a:latin typeface="Arial" panose="020B0604020202020204" pitchFamily="34" charset="0"/>
+            </a:endParaRPr>
+          </a:p>
+          <a:p>
+            <a:endParaRPr lang="en-US" dirty="0"/>
           </a:p>
         </p:txBody>
       </p:sp>
@@ -677,7 +1392,7 @@
           <a:p>
             <a:fld id="{58F5E0F1-AB47-4A7A-BA35-9463FCF91331}" type="slidenum">
               <a:rPr lang="en-US" smtClean="0"/>
-              <a:t>6</a:t>
+              <a:t>7</a:t>
             </a:fld>
             <a:endParaRPr lang="en-US"/>
           </a:p>
@@ -686,7 +1401,7 @@
     </p:spTree>
     <p:extLst>
       <p:ext uri="{BB962C8B-B14F-4D97-AF65-F5344CB8AC3E}">
-        <p14:creationId xmlns:p14="http://schemas.microsoft.com/office/powerpoint/2010/main" val="2759362589"/>
+        <p14:creationId xmlns:p14="http://schemas.microsoft.com/office/powerpoint/2010/main" val="3508771164"/>
       </p:ext>
     </p:extLst>
   </p:cSld>
@@ -866,7 +1581,7 @@
             <a:fld id="{1D8BD707-D9CF-40AE-B4C6-C98DA3205C09}" type="datetimeFigureOut">
               <a:rPr lang="en-US" smtClean="0"/>
               <a:pPr/>
-              <a:t>11/16/2019</a:t>
+              <a:t>11/19/2019</a:t>
             </a:fld>
             <a:endParaRPr lang="en-US"/>
           </a:p>
@@ -1203,7 +1918,7 @@
             <a:fld id="{1D8BD707-D9CF-40AE-B4C6-C98DA3205C09}" type="datetimeFigureOut">
               <a:rPr lang="en-US" smtClean="0"/>
               <a:pPr/>
-              <a:t>11/16/2019</a:t>
+              <a:t>11/19/2019</a:t>
             </a:fld>
             <a:endParaRPr lang="en-US"/>
           </a:p>
@@ -1385,7 +2100,7 @@
             <a:fld id="{1D8BD707-D9CF-40AE-B4C6-C98DA3205C09}" type="datetimeFigureOut">
               <a:rPr lang="en-US" smtClean="0"/>
               <a:pPr/>
-              <a:t>11/16/2019</a:t>
+              <a:t>11/19/2019</a:t>
             </a:fld>
             <a:endParaRPr lang="en-US"/>
           </a:p>
@@ -1557,7 +2272,7 @@
             <a:fld id="{1D8BD707-D9CF-40AE-B4C6-C98DA3205C09}" type="datetimeFigureOut">
               <a:rPr lang="en-US" smtClean="0"/>
               <a:pPr/>
-              <a:t>11/16/2019</a:t>
+              <a:t>11/19/2019</a:t>
             </a:fld>
             <a:endParaRPr lang="en-US"/>
           </a:p>
@@ -1836,7 +2551,7 @@
             <a:fld id="{1D8BD707-D9CF-40AE-B4C6-C98DA3205C09}" type="datetimeFigureOut">
               <a:rPr lang="en-US" smtClean="0"/>
               <a:pPr/>
-              <a:t>11/16/2019</a:t>
+              <a:t>11/19/2019</a:t>
             </a:fld>
             <a:endParaRPr lang="en-US"/>
           </a:p>
@@ -2288,7 +3003,7 @@
             <a:fld id="{1D8BD707-D9CF-40AE-B4C6-C98DA3205C09}" type="datetimeFigureOut">
               <a:rPr lang="en-US" smtClean="0"/>
               <a:pPr/>
-              <a:t>11/16/2019</a:t>
+              <a:t>11/19/2019</a:t>
             </a:fld>
             <a:endParaRPr lang="en-US"/>
           </a:p>
@@ -2767,7 +3482,7 @@
             <a:fld id="{1D8BD707-D9CF-40AE-B4C6-C98DA3205C09}" type="datetimeFigureOut">
               <a:rPr lang="en-US" smtClean="0"/>
               <a:pPr/>
-              <a:t>11/16/2019</a:t>
+              <a:t>11/19/2019</a:t>
             </a:fld>
             <a:endParaRPr lang="en-US"/>
           </a:p>
@@ -2887,7 +3602,7 @@
             <a:fld id="{1D8BD707-D9CF-40AE-B4C6-C98DA3205C09}" type="datetimeFigureOut">
               <a:rPr lang="en-US" smtClean="0"/>
               <a:pPr/>
-              <a:t>11/16/2019</a:t>
+              <a:t>11/19/2019</a:t>
             </a:fld>
             <a:endParaRPr lang="en-US"/>
           </a:p>
@@ -2984,7 +3699,7 @@
             <a:fld id="{1D8BD707-D9CF-40AE-B4C6-C98DA3205C09}" type="datetimeFigureOut">
               <a:rPr lang="en-US" smtClean="0"/>
               <a:pPr/>
-              <a:t>11/16/2019</a:t>
+              <a:t>11/19/2019</a:t>
             </a:fld>
             <a:endParaRPr lang="en-US"/>
           </a:p>
@@ -3339,7 +4054,7 @@
             <a:fld id="{1D8BD707-D9CF-40AE-B4C6-C98DA3205C09}" type="datetimeFigureOut">
               <a:rPr lang="en-US" smtClean="0"/>
               <a:pPr/>
-              <a:t>11/16/2019</a:t>
+              <a:t>11/19/2019</a:t>
             </a:fld>
             <a:endParaRPr lang="en-US"/>
           </a:p>
@@ -3769,7 +4484,7 @@
             <a:fld id="{1D8BD707-D9CF-40AE-B4C6-C98DA3205C09}" type="datetimeFigureOut">
               <a:rPr lang="en-US" smtClean="0"/>
               <a:pPr/>
-              <a:t>11/16/2019</a:t>
+              <a:t>11/19/2019</a:t>
             </a:fld>
             <a:endParaRPr lang="en-US"/>
           </a:p>
@@ -4087,7 +4802,7 @@
             <a:fld id="{1D8BD707-D9CF-40AE-B4C6-C98DA3205C09}" type="datetimeFigureOut">
               <a:rPr lang="en-US" smtClean="0"/>
               <a:pPr/>
-              <a:t>11/16/2019</a:t>
+              <a:t>11/19/2019</a:t>
             </a:fld>
             <a:endParaRPr lang="en-US"/>
           </a:p>
@@ -4782,7 +5497,7 @@
           <p:cNvPr id="2" name="Title 1">
             <a:extLst>
               <a:ext uri="{FF2B5EF4-FFF2-40B4-BE49-F238E27FC236}">
-                <a16:creationId xmlns:a16="http://schemas.microsoft.com/office/drawing/2014/main" id="{68036183-F8B1-4928-A184-069233BF2AE7}"/>
+                <a16:creationId xmlns:a16="http://schemas.microsoft.com/office/drawing/2014/main" id="{A6BC0C61-EB17-457A-9B6C-10566010700A}"/>
               </a:ext>
             </a:extLst>
           </p:cNvPr>
@@ -4798,7 +5513,7 @@
           <a:bodyPr/>
           <a:lstStyle/>
           <a:p>
-            <a:endParaRPr lang="en-US"/>
+            <a:endParaRPr lang="en-US" dirty="0"/>
           </a:p>
         </p:txBody>
       </p:sp>
@@ -4807,7 +5522,7 @@
           <p:cNvPr id="3" name="Content Placeholder 2">
             <a:extLst>
               <a:ext uri="{FF2B5EF4-FFF2-40B4-BE49-F238E27FC236}">
-                <a16:creationId xmlns:a16="http://schemas.microsoft.com/office/drawing/2014/main" id="{7CA6673B-21BE-406F-BE8D-8A7E80804C8F}"/>
+                <a16:creationId xmlns:a16="http://schemas.microsoft.com/office/drawing/2014/main" id="{1853A7BF-D4DF-4F30-8B41-EB08C3AC2379}"/>
               </a:ext>
             </a:extLst>
           </p:cNvPr>
@@ -4823,14 +5538,14 @@
           <a:bodyPr/>
           <a:lstStyle/>
           <a:p>
-            <a:endParaRPr lang="en-US"/>
+            <a:endParaRPr lang="en-US" dirty="0"/>
           </a:p>
         </p:txBody>
       </p:sp>
     </p:spTree>
     <p:extLst>
       <p:ext uri="{BB962C8B-B14F-4D97-AF65-F5344CB8AC3E}">
-        <p14:creationId xmlns:p14="http://schemas.microsoft.com/office/powerpoint/2010/main" val="1956369432"/>
+        <p14:creationId xmlns:p14="http://schemas.microsoft.com/office/powerpoint/2010/main" val="2044090292"/>
       </p:ext>
     </p:extLst>
   </p:cSld>
@@ -4910,6 +5625,86 @@
     </p:spTree>
     <p:extLst>
       <p:ext uri="{BB962C8B-B14F-4D97-AF65-F5344CB8AC3E}">
+        <p14:creationId xmlns:p14="http://schemas.microsoft.com/office/powerpoint/2010/main" val="1956369432"/>
+      </p:ext>
+    </p:extLst>
+  </p:cSld>
+  <p:clrMapOvr>
+    <a:masterClrMapping/>
+  </p:clrMapOvr>
+</p:sld>
+</file>
+
+<file path=ppt/slides/slide12.xml><?xml version="1.0" encoding="utf-8"?>
+<p:sld xmlns:a="http://schemas.openxmlformats.org/drawingml/2006/main" xmlns:r="http://schemas.openxmlformats.org/officeDocument/2006/relationships" xmlns:p="http://schemas.openxmlformats.org/presentationml/2006/main">
+  <p:cSld>
+    <p:spTree>
+      <p:nvGrpSpPr>
+        <p:cNvPr id="1" name=""/>
+        <p:cNvGrpSpPr/>
+        <p:nvPr/>
+      </p:nvGrpSpPr>
+      <p:grpSpPr>
+        <a:xfrm>
+          <a:off x="0" y="0"/>
+          <a:ext cx="0" cy="0"/>
+          <a:chOff x="0" y="0"/>
+          <a:chExt cx="0" cy="0"/>
+        </a:xfrm>
+      </p:grpSpPr>
+      <p:sp>
+        <p:nvSpPr>
+          <p:cNvPr id="2" name="Title 1">
+            <a:extLst>
+              <a:ext uri="{FF2B5EF4-FFF2-40B4-BE49-F238E27FC236}">
+                <a16:creationId xmlns:a16="http://schemas.microsoft.com/office/drawing/2014/main" id="{68036183-F8B1-4928-A184-069233BF2AE7}"/>
+              </a:ext>
+            </a:extLst>
+          </p:cNvPr>
+          <p:cNvSpPr>
+            <a:spLocks noGrp="1"/>
+          </p:cNvSpPr>
+          <p:nvPr>
+            <p:ph type="title"/>
+          </p:nvPr>
+        </p:nvSpPr>
+        <p:spPr/>
+        <p:txBody>
+          <a:bodyPr/>
+          <a:lstStyle/>
+          <a:p>
+            <a:endParaRPr lang="en-US"/>
+          </a:p>
+        </p:txBody>
+      </p:sp>
+      <p:sp>
+        <p:nvSpPr>
+          <p:cNvPr id="3" name="Content Placeholder 2">
+            <a:extLst>
+              <a:ext uri="{FF2B5EF4-FFF2-40B4-BE49-F238E27FC236}">
+                <a16:creationId xmlns:a16="http://schemas.microsoft.com/office/drawing/2014/main" id="{7CA6673B-21BE-406F-BE8D-8A7E80804C8F}"/>
+              </a:ext>
+            </a:extLst>
+          </p:cNvPr>
+          <p:cNvSpPr>
+            <a:spLocks noGrp="1"/>
+          </p:cNvSpPr>
+          <p:nvPr>
+            <p:ph idx="1"/>
+          </p:nvPr>
+        </p:nvSpPr>
+        <p:spPr/>
+        <p:txBody>
+          <a:bodyPr/>
+          <a:lstStyle/>
+          <a:p>
+            <a:endParaRPr lang="en-US"/>
+          </a:p>
+        </p:txBody>
+      </p:sp>
+    </p:spTree>
+    <p:extLst>
+      <p:ext uri="{BB962C8B-B14F-4D97-AF65-F5344CB8AC3E}">
         <p14:creationId xmlns:p14="http://schemas.microsoft.com/office/powerpoint/2010/main" val="3123317090"/>
       </p:ext>
     </p:extLst>
@@ -4920,7 +5715,7 @@
 </p:sld>
 </file>
 
-<file path=ppt/slides/slide12.xml><?xml version="1.0" encoding="utf-8"?>
+<file path=ppt/slides/slide13.xml><?xml version="1.0" encoding="utf-8"?>
 <p:sld xmlns:a="http://schemas.openxmlformats.org/drawingml/2006/main" xmlns:r="http://schemas.openxmlformats.org/officeDocument/2006/relationships" xmlns:p="http://schemas.openxmlformats.org/presentationml/2006/main">
   <p:cSld>
     <p:spTree>
@@ -5929,7 +6724,7 @@
           <p:cNvPr id="2" name="Title 1">
             <a:extLst>
               <a:ext uri="{FF2B5EF4-FFF2-40B4-BE49-F238E27FC236}">
-                <a16:creationId xmlns:a16="http://schemas.microsoft.com/office/drawing/2014/main" id="{9684921B-6BBA-4BD5-ADA2-EBA7683B0D39}"/>
+                <a16:creationId xmlns:a16="http://schemas.microsoft.com/office/drawing/2014/main" id="{9BB04737-5B5E-4061-9F4E-F1DEB1C647DE}"/>
               </a:ext>
             </a:extLst>
           </p:cNvPr>
@@ -5942,13 +6737,13 @@
         </p:nvSpPr>
         <p:spPr>
           <a:xfrm>
-            <a:off x="1028700" y="685801"/>
-            <a:ext cx="7200900" cy="533399"/>
+            <a:off x="1028700" y="685800"/>
+            <a:ext cx="7200900" cy="685800"/>
           </a:xfrm>
         </p:spPr>
         <p:txBody>
           <a:bodyPr>
-            <a:noAutofit/>
+            <a:normAutofit/>
           </a:bodyPr>
           <a:lstStyle/>
           <a:p>
@@ -5959,83 +6754,12 @@
           </a:p>
         </p:txBody>
       </p:sp>
-      <p:sp>
-        <p:nvSpPr>
-          <p:cNvPr id="18" name="TextBox 17">
+      <p:pic>
+        <p:nvPicPr>
+          <p:cNvPr id="10" name="Picture 9" descr="A close up of a map&#10;&#10;Description automatically generated">
             <a:extLst>
               <a:ext uri="{FF2B5EF4-FFF2-40B4-BE49-F238E27FC236}">
-                <a16:creationId xmlns:a16="http://schemas.microsoft.com/office/drawing/2014/main" id="{F697F01C-ABF7-41A2-A8EF-3F0EC2579FCC}"/>
-              </a:ext>
-            </a:extLst>
-          </p:cNvPr>
-          <p:cNvSpPr txBox="1"/>
-          <p:nvPr/>
-        </p:nvSpPr>
-        <p:spPr>
-          <a:xfrm>
-            <a:off x="1219200" y="1524000"/>
-            <a:ext cx="5867400" cy="461665"/>
-          </a:xfrm>
-          <a:prstGeom prst="rect">
-            <a:avLst/>
-          </a:prstGeom>
-          <a:noFill/>
-        </p:spPr>
-        <p:txBody>
-          <a:bodyPr wrap="square" rtlCol="0">
-            <a:spAutoFit/>
-          </a:bodyPr>
-          <a:lstStyle/>
-          <a:p>
-            <a:r>
-              <a:rPr lang="en-US" sz="2400" b="1" dirty="0"/>
-              <a:t>Incidents / Density by Location (Lat. Long.)</a:t>
-            </a:r>
-          </a:p>
-        </p:txBody>
-      </p:sp>
-      <p:pic>
-        <p:nvPicPr>
-          <p:cNvPr id="5" name="Picture 4" descr="A close up of a map&#10;&#10;Description automatically generated">
-            <a:extLst>
-              <a:ext uri="{FF2B5EF4-FFF2-40B4-BE49-F238E27FC236}">
-                <a16:creationId xmlns:a16="http://schemas.microsoft.com/office/drawing/2014/main" id="{B7F05EA4-ECAF-4F3F-8F9C-735CA0550607}"/>
-              </a:ext>
-            </a:extLst>
-          </p:cNvPr>
-          <p:cNvPicPr>
-            <a:picLocks noChangeAspect="1"/>
-          </p:cNvPicPr>
-          <p:nvPr/>
-        </p:nvPicPr>
-        <p:blipFill>
-          <a:blip r:embed="rId3">
-            <a:extLst>
-              <a:ext uri="{28A0092B-C50C-407E-A947-70E740481C1C}">
-                <a14:useLocalDpi xmlns:a14="http://schemas.microsoft.com/office/drawing/2010/main" val="0"/>
-              </a:ext>
-            </a:extLst>
-          </a:blip>
-          <a:stretch>
-            <a:fillRect/>
-          </a:stretch>
-        </p:blipFill>
-        <p:spPr>
-          <a:xfrm>
-            <a:off x="2590800" y="3200400"/>
-            <a:ext cx="4419598" cy="2651759"/>
-          </a:xfrm>
-          <a:prstGeom prst="rect">
-            <a:avLst/>
-          </a:prstGeom>
-        </p:spPr>
-      </p:pic>
-      <p:pic>
-        <p:nvPicPr>
-          <p:cNvPr id="7" name="Picture 6" descr="A close up of a map&#10;&#10;Description automatically generated">
-            <a:extLst>
-              <a:ext uri="{FF2B5EF4-FFF2-40B4-BE49-F238E27FC236}">
-                <a16:creationId xmlns:a16="http://schemas.microsoft.com/office/drawing/2014/main" id="{3D6AB0F5-14CA-4C48-BFF7-D12F894D5DF6}"/>
+                <a16:creationId xmlns:a16="http://schemas.microsoft.com/office/drawing/2014/main" id="{CC1A4140-F4C3-4EC1-8A6F-784197D81A1B}"/>
               </a:ext>
             </a:extLst>
           </p:cNvPr>
@@ -6044,21 +6768,20 @@
           </p:cNvPicPr>
           <p:nvPr/>
         </p:nvPicPr>
-        <p:blipFill>
-          <a:blip r:embed="rId4">
+        <p:blipFill rotWithShape="1">
+          <a:blip r:embed="rId2">
             <a:extLst>
               <a:ext uri="{28A0092B-C50C-407E-A947-70E740481C1C}">
                 <a14:useLocalDpi xmlns:a14="http://schemas.microsoft.com/office/drawing/2010/main" val="0"/>
               </a:ext>
             </a:extLst>
           </a:blip>
-          <a:stretch>
-            <a:fillRect/>
-          </a:stretch>
+          <a:srcRect l="30833" t="6779" b="15625"/>
+          <a:stretch/>
         </p:blipFill>
         <p:spPr>
           <a:xfrm>
-            <a:off x="1371600" y="2057400"/>
+            <a:off x="1371600" y="2054520"/>
             <a:ext cx="7616952" cy="4572000"/>
           </a:xfrm>
           <a:prstGeom prst="rect">
@@ -6096,10 +6819,45 @@
           </a:sp3d>
         </p:spPr>
       </p:pic>
+      <p:sp>
+        <p:nvSpPr>
+          <p:cNvPr id="11" name="TextBox 10">
+            <a:extLst>
+              <a:ext uri="{FF2B5EF4-FFF2-40B4-BE49-F238E27FC236}">
+                <a16:creationId xmlns:a16="http://schemas.microsoft.com/office/drawing/2014/main" id="{E61925C7-D817-43EA-8456-CDBEF70E3EAF}"/>
+              </a:ext>
+            </a:extLst>
+          </p:cNvPr>
+          <p:cNvSpPr txBox="1"/>
+          <p:nvPr/>
+        </p:nvSpPr>
+        <p:spPr>
+          <a:xfrm>
+            <a:off x="1219200" y="1524000"/>
+            <a:ext cx="3009900" cy="461665"/>
+          </a:xfrm>
+          <a:prstGeom prst="rect">
+            <a:avLst/>
+          </a:prstGeom>
+          <a:noFill/>
+        </p:spPr>
+        <p:txBody>
+          <a:bodyPr wrap="square" rtlCol="0">
+            <a:spAutoFit/>
+          </a:bodyPr>
+          <a:lstStyle/>
+          <a:p>
+            <a:r>
+              <a:rPr lang="en-US" sz="2400" b="1" dirty="0"/>
+              <a:t>Incidents by Region</a:t>
+            </a:r>
+          </a:p>
+        </p:txBody>
+      </p:sp>
     </p:spTree>
     <p:extLst>
       <p:ext uri="{BB962C8B-B14F-4D97-AF65-F5344CB8AC3E}">
-        <p14:creationId xmlns:p14="http://schemas.microsoft.com/office/powerpoint/2010/main" val="2730196593"/>
+        <p14:creationId xmlns:p14="http://schemas.microsoft.com/office/powerpoint/2010/main" val="3382637159"/>
       </p:ext>
     </p:extLst>
   </p:cSld>
@@ -6190,18 +6948,19 @@
           <a:lstStyle/>
           <a:p>
             <a:r>
-              <a:rPr lang="en-US" sz="2400" b="1" dirty="0"/>
-              <a:t>Incidents / Density by Location (Lat. Long.)</a:t>
-            </a:r>
+              <a:rPr lang="en-US" sz="2400" b="1"/>
+              <a:t>Terrorism Incidents (Density Plot)</a:t>
+            </a:r>
+            <a:endParaRPr lang="en-US" sz="2400" b="1" dirty="0"/>
           </a:p>
         </p:txBody>
       </p:sp>
       <p:pic>
         <p:nvPicPr>
-          <p:cNvPr id="5" name="Picture 4" descr="A close up of a map&#10;&#10;Description automatically generated">
+          <p:cNvPr id="4" name="Picture 3" descr="A close up of a map&#10;&#10;Description automatically generated">
             <a:extLst>
               <a:ext uri="{FF2B5EF4-FFF2-40B4-BE49-F238E27FC236}">
-                <a16:creationId xmlns:a16="http://schemas.microsoft.com/office/drawing/2014/main" id="{B7F05EA4-ECAF-4F3F-8F9C-735CA0550607}"/>
+                <a16:creationId xmlns:a16="http://schemas.microsoft.com/office/drawing/2014/main" id="{A804E226-F267-4EE5-A60E-DED17B638BB0}"/>
               </a:ext>
             </a:extLst>
           </p:cNvPr>
@@ -6211,7 +6970,7 @@
           <p:nvPr/>
         </p:nvPicPr>
         <p:blipFill>
-          <a:blip r:embed="rId3">
+          <a:blip r:embed="rId3" cstate="print">
             <a:extLst>
               <a:ext uri="{28A0092B-C50C-407E-A947-70E740481C1C}">
                 <a14:useLocalDpi xmlns:a14="http://schemas.microsoft.com/office/drawing/2010/main" val="0"/>
@@ -6297,7 +7056,7 @@
           <p:cNvPr id="2" name="Title 1">
             <a:extLst>
               <a:ext uri="{FF2B5EF4-FFF2-40B4-BE49-F238E27FC236}">
-                <a16:creationId xmlns:a16="http://schemas.microsoft.com/office/drawing/2014/main" id="{9BB04737-5B5E-4061-9F4E-F1DEB1C647DE}"/>
+                <a16:creationId xmlns:a16="http://schemas.microsoft.com/office/drawing/2014/main" id="{9684921B-6BBA-4BD5-ADA2-EBA7683B0D39}"/>
               </a:ext>
             </a:extLst>
           </p:cNvPr>
@@ -6310,13 +7069,13 @@
         </p:nvSpPr>
         <p:spPr>
           <a:xfrm>
-            <a:off x="1028700" y="685800"/>
-            <a:ext cx="7200900" cy="685800"/>
+            <a:off x="1028700" y="685801"/>
+            <a:ext cx="7200900" cy="533399"/>
           </a:xfrm>
         </p:spPr>
         <p:txBody>
           <a:bodyPr>
-            <a:normAutofit/>
+            <a:noAutofit/>
           </a:bodyPr>
           <a:lstStyle/>
           <a:p>
@@ -6327,12 +7086,47 @@
           </a:p>
         </p:txBody>
       </p:sp>
+      <p:sp>
+        <p:nvSpPr>
+          <p:cNvPr id="18" name="TextBox 17">
+            <a:extLst>
+              <a:ext uri="{FF2B5EF4-FFF2-40B4-BE49-F238E27FC236}">
+                <a16:creationId xmlns:a16="http://schemas.microsoft.com/office/drawing/2014/main" id="{F697F01C-ABF7-41A2-A8EF-3F0EC2579FCC}"/>
+              </a:ext>
+            </a:extLst>
+          </p:cNvPr>
+          <p:cNvSpPr txBox="1"/>
+          <p:nvPr/>
+        </p:nvSpPr>
+        <p:spPr>
+          <a:xfrm>
+            <a:off x="1219200" y="1524000"/>
+            <a:ext cx="5867400" cy="461665"/>
+          </a:xfrm>
+          <a:prstGeom prst="rect">
+            <a:avLst/>
+          </a:prstGeom>
+          <a:noFill/>
+        </p:spPr>
+        <p:txBody>
+          <a:bodyPr wrap="square" rtlCol="0">
+            <a:spAutoFit/>
+          </a:bodyPr>
+          <a:lstStyle/>
+          <a:p>
+            <a:r>
+              <a:rPr lang="en-US" sz="2400" b="1" dirty="0"/>
+              <a:t>Number of Terrorist Incidents by Country</a:t>
+            </a:r>
+          </a:p>
+        </p:txBody>
+      </p:sp>
       <p:pic>
         <p:nvPicPr>
-          <p:cNvPr id="10" name="Picture 9" descr="A close up of a map&#10;&#10;Description automatically generated">
+          <p:cNvPr id="4" name="Picture 3" descr="A close up of a map&#10;&#10;Description automatically generated">
             <a:extLst>
               <a:ext uri="{FF2B5EF4-FFF2-40B4-BE49-F238E27FC236}">
-                <a16:creationId xmlns:a16="http://schemas.microsoft.com/office/drawing/2014/main" id="{CC1A4140-F4C3-4EC1-8A6F-784197D81A1B}"/>
+                <a16:creationId xmlns:a16="http://schemas.microsoft.com/office/drawing/2014/main" id="{5DF0AAA0-165F-42D1-A30B-768F5FED97F3}"/>
               </a:ext>
             </a:extLst>
           </p:cNvPr>
@@ -6341,20 +7135,21 @@
           </p:cNvPicPr>
           <p:nvPr/>
         </p:nvPicPr>
-        <p:blipFill rotWithShape="1">
-          <a:blip r:embed="rId2">
+        <p:blipFill>
+          <a:blip r:embed="rId3" cstate="print">
             <a:extLst>
               <a:ext uri="{28A0092B-C50C-407E-A947-70E740481C1C}">
                 <a14:useLocalDpi xmlns:a14="http://schemas.microsoft.com/office/drawing/2010/main" val="0"/>
               </a:ext>
             </a:extLst>
           </a:blip>
-          <a:srcRect l="30833" t="6779" b="15625"/>
-          <a:stretch/>
+          <a:stretch>
+            <a:fillRect/>
+          </a:stretch>
         </p:blipFill>
         <p:spPr>
           <a:xfrm>
-            <a:off x="1371600" y="2054520"/>
+            <a:off x="1371600" y="2057400"/>
             <a:ext cx="7616952" cy="4572000"/>
           </a:xfrm>
           <a:prstGeom prst="rect">
@@ -6392,45 +7187,10 @@
           </a:sp3d>
         </p:spPr>
       </p:pic>
-      <p:sp>
-        <p:nvSpPr>
-          <p:cNvPr id="11" name="TextBox 10">
-            <a:extLst>
-              <a:ext uri="{FF2B5EF4-FFF2-40B4-BE49-F238E27FC236}">
-                <a16:creationId xmlns:a16="http://schemas.microsoft.com/office/drawing/2014/main" id="{E61925C7-D817-43EA-8456-CDBEF70E3EAF}"/>
-              </a:ext>
-            </a:extLst>
-          </p:cNvPr>
-          <p:cNvSpPr txBox="1"/>
-          <p:nvPr/>
-        </p:nvSpPr>
-        <p:spPr>
-          <a:xfrm>
-            <a:off x="1219200" y="1524000"/>
-            <a:ext cx="3009900" cy="461665"/>
-          </a:xfrm>
-          <a:prstGeom prst="rect">
-            <a:avLst/>
-          </a:prstGeom>
-          <a:noFill/>
-        </p:spPr>
-        <p:txBody>
-          <a:bodyPr wrap="square" rtlCol="0">
-            <a:spAutoFit/>
-          </a:bodyPr>
-          <a:lstStyle/>
-          <a:p>
-            <a:r>
-              <a:rPr lang="en-US" sz="2400" b="1" dirty="0"/>
-              <a:t>Incidents by Region</a:t>
-            </a:r>
-          </a:p>
-        </p:txBody>
-      </p:sp>
     </p:spTree>
     <p:extLst>
       <p:ext uri="{BB962C8B-B14F-4D97-AF65-F5344CB8AC3E}">
-        <p14:creationId xmlns:p14="http://schemas.microsoft.com/office/powerpoint/2010/main" val="3382637159"/>
+        <p14:creationId xmlns:p14="http://schemas.microsoft.com/office/powerpoint/2010/main" val="2074726821"/>
       </p:ext>
     </p:extLst>
   </p:cSld>
@@ -6462,7 +7222,7 @@
           <p:cNvPr id="2" name="Title 1">
             <a:extLst>
               <a:ext uri="{FF2B5EF4-FFF2-40B4-BE49-F238E27FC236}">
-                <a16:creationId xmlns:a16="http://schemas.microsoft.com/office/drawing/2014/main" id="{B4C10FE4-B15D-44FC-A9F3-C12AA44DFBC9}"/>
+                <a16:creationId xmlns:a16="http://schemas.microsoft.com/office/drawing/2014/main" id="{F0726FFB-7146-41B2-B650-8B0988B42948}"/>
               </a:ext>
             </a:extLst>
           </p:cNvPr>
@@ -6476,7 +7236,7 @@
         <p:spPr>
           <a:xfrm>
             <a:off x="1028700" y="685800"/>
-            <a:ext cx="7200900" cy="609600"/>
+            <a:ext cx="7200900" cy="762000"/>
           </a:xfrm>
         </p:spPr>
         <p:txBody>
@@ -6486,8 +7246,8 @@
           <a:lstStyle/>
           <a:p>
             <a:r>
-              <a:rPr lang="en-US" sz="3600" dirty="0"/>
-              <a:t>Research Questions and Assignments</a:t>
+              <a:rPr lang="en-US" dirty="0"/>
+              <a:t>Data Quality and Characteristics</a:t>
             </a:r>
           </a:p>
         </p:txBody>
@@ -6497,7 +7257,7 @@
           <p:cNvPr id="3" name="Content Placeholder 2">
             <a:extLst>
               <a:ext uri="{FF2B5EF4-FFF2-40B4-BE49-F238E27FC236}">
-                <a16:creationId xmlns:a16="http://schemas.microsoft.com/office/drawing/2014/main" id="{F6F941C1-C7E5-433B-8C09-E5187F5163A3}"/>
+                <a16:creationId xmlns:a16="http://schemas.microsoft.com/office/drawing/2014/main" id="{06EC84B0-4634-409F-A92C-F15F5AF5C7FC}"/>
               </a:ext>
             </a:extLst>
           </p:cNvPr>
@@ -6510,120 +7270,104 @@
         </p:nvSpPr>
         <p:spPr>
           <a:xfrm>
-            <a:off x="1028700" y="1447800"/>
-            <a:ext cx="7200900" cy="5105400"/>
+            <a:off x="1028700" y="1524000"/>
+            <a:ext cx="7200900" cy="4343400"/>
           </a:xfrm>
         </p:spPr>
         <p:txBody>
-          <a:bodyPr>
-            <a:normAutofit fontScale="92500" lnSpcReduction="10000"/>
-          </a:bodyPr>
+          <a:bodyPr/>
           <a:lstStyle/>
+          <a:p>
+            <a:r>
+              <a:rPr lang="en-US" dirty="0"/>
+              <a:t>All columns </a:t>
+            </a:r>
+            <a:r>
+              <a:rPr lang="en-US" b="1" dirty="0"/>
+              <a:t>NA</a:t>
+            </a:r>
+            <a:r>
+              <a:rPr lang="en-US" dirty="0"/>
+              <a:t> values</a:t>
+            </a:r>
+          </a:p>
+          <a:p>
+            <a:pPr lvl="1"/>
+            <a:r>
+              <a:rPr lang="en-US" dirty="0" err="1"/>
+              <a:t>na.omit</a:t>
+            </a:r>
+            <a:r>
+              <a:rPr lang="en-US" dirty="0"/>
+              <a:t> results in zero observations!</a:t>
+            </a:r>
+          </a:p>
+          <a:p>
+            <a:r>
+              <a:rPr lang="en-US" dirty="0"/>
+              <a:t>Most variables are </a:t>
+            </a:r>
+            <a:r>
+              <a:rPr lang="en-US" b="1" i="1" dirty="0"/>
+              <a:t>categorical</a:t>
+            </a:r>
+            <a:r>
+              <a:rPr lang="en-US" i="1" dirty="0"/>
+              <a:t> (not numerical</a:t>
+            </a:r>
+            <a:r>
+              <a:rPr lang="en-US" dirty="0"/>
+              <a:t>)</a:t>
+            </a:r>
+          </a:p>
+          <a:p>
+            <a:pPr lvl="1"/>
+            <a:r>
+              <a:rPr lang="en-US" dirty="0"/>
+              <a:t>“unknown” common as a category value</a:t>
+            </a:r>
+          </a:p>
+          <a:p>
+            <a:r>
+              <a:rPr lang="en-US" dirty="0"/>
+              <a:t>Many redundant “description” variables </a:t>
+            </a:r>
+          </a:p>
+          <a:p>
+            <a:pPr lvl="1"/>
+            <a:r>
+              <a:rPr lang="en-US" i="0" dirty="0"/>
+              <a:t>for example, textual translations of categorical variables</a:t>
+            </a:r>
+          </a:p>
           <a:p>
             <a:pPr marL="0" indent="0">
               <a:buNone/>
             </a:pPr>
-            <a:r>
-              <a:rPr lang="en-US" b="1" dirty="0"/>
-              <a:t>James </a:t>
-            </a:r>
-            <a:r>
-              <a:rPr lang="en-US" b="1" dirty="0" err="1"/>
-              <a:t>Willson</a:t>
-            </a:r>
-            <a:r>
-              <a:rPr lang="en-US" b="1" dirty="0"/>
-              <a:t> (Data Scientist)</a:t>
-            </a:r>
-          </a:p>
-          <a:p>
-            <a:pPr marL="457200" indent="-457200">
-              <a:buFont typeface="+mj-lt"/>
-              <a:buAutoNum type="arabicPeriod"/>
-            </a:pPr>
-            <a:r>
-              <a:rPr lang="en-US" dirty="0"/>
-              <a:t>Predict if an attack will be successful based on a variety of different factors.</a:t>
-            </a:r>
-          </a:p>
-          <a:p>
-            <a:pPr marL="457200" indent="-457200">
-              <a:buFont typeface="+mj-lt"/>
-              <a:buAutoNum type="arabicPeriod"/>
-            </a:pPr>
-            <a:r>
-              <a:rPr lang="en-US" dirty="0"/>
-              <a:t>Estimate the number of casualties in a successful terrorist attack</a:t>
-            </a:r>
-          </a:p>
-          <a:p>
-            <a:pPr marL="0" indent="0">
+            <a:endParaRPr lang="en-US" b="1" i="1" dirty="0"/>
+          </a:p>
+          <a:p>
+            <a:pPr marL="0" indent="0" algn="ctr">
               <a:buNone/>
             </a:pPr>
             <a:r>
-              <a:rPr lang="en-US" b="1" dirty="0" err="1"/>
-              <a:t>Kun</a:t>
-            </a:r>
-            <a:r>
-              <a:rPr lang="en-US" b="1" dirty="0"/>
-              <a:t> Li (Data Scientist)</a:t>
-            </a:r>
-          </a:p>
-          <a:p>
-            <a:pPr marL="457200" indent="-457200">
-              <a:buFont typeface="+mj-lt"/>
-              <a:buAutoNum type="arabicPeriod"/>
-            </a:pPr>
-            <a:r>
-              <a:rPr lang="en-US" dirty="0"/>
-              <a:t>Predict the extent/dollar-amount of property damage from any given attack</a:t>
-            </a:r>
-          </a:p>
-          <a:p>
-            <a:pPr marL="457200" indent="-457200">
-              <a:buFont typeface="+mj-lt"/>
-              <a:buAutoNum type="arabicPeriod"/>
-            </a:pPr>
-            <a:r>
-              <a:rPr lang="en-US" dirty="0"/>
-              <a:t>Identify factors that could predict the target/victim type in an attack</a:t>
-            </a:r>
-          </a:p>
-          <a:p>
-            <a:pPr marL="0" indent="0">
-              <a:buNone/>
-            </a:pPr>
-            <a:r>
-              <a:rPr lang="en-US" b="1" dirty="0"/>
-              <a:t>Sean Kugele (Data Scientist / Team Lead)</a:t>
-            </a:r>
-          </a:p>
-          <a:p>
-            <a:pPr marL="457200" indent="-457200">
-              <a:buFont typeface="+mj-lt"/>
-              <a:buAutoNum type="arabicPeriod"/>
-            </a:pPr>
-            <a:r>
-              <a:rPr lang="en-US" dirty="0"/>
-              <a:t>Predict the terrorist group responsible for perpetrating a terrorist attack</a:t>
-            </a:r>
-          </a:p>
-          <a:p>
-            <a:pPr marL="457200" indent="-457200">
-              <a:buFont typeface="+mj-lt"/>
-              <a:buAutoNum type="arabicPeriod"/>
-            </a:pPr>
-            <a:r>
-              <a:rPr lang="en-US" dirty="0"/>
-              <a:t>Estimate the probability of an attack based on temporal and geo-spatial variables</a:t>
-            </a:r>
+              <a:rPr lang="en-US" sz="2400" b="1" i="1" dirty="0">
+                <a:solidFill>
+                  <a:srgbClr val="FF0000"/>
+                </a:solidFill>
+              </a:rPr>
+              <a:t>Large Data Cleansing Effort Needed!</a:t>
+            </a:r>
+          </a:p>
+          <a:p>
+            <a:endParaRPr lang="en-US" b="1" dirty="0"/>
           </a:p>
         </p:txBody>
       </p:sp>
     </p:spTree>
     <p:extLst>
       <p:ext uri="{BB962C8B-B14F-4D97-AF65-F5344CB8AC3E}">
-        <p14:creationId xmlns:p14="http://schemas.microsoft.com/office/powerpoint/2010/main" val="2179402491"/>
+        <p14:creationId xmlns:p14="http://schemas.microsoft.com/office/powerpoint/2010/main" val="4107628178"/>
       </p:ext>
     </p:extLst>
   </p:cSld>
@@ -6655,7 +7399,7 @@
           <p:cNvPr id="2" name="Title 1">
             <a:extLst>
               <a:ext uri="{FF2B5EF4-FFF2-40B4-BE49-F238E27FC236}">
-                <a16:creationId xmlns:a16="http://schemas.microsoft.com/office/drawing/2014/main" id="{A6BC0C61-EB17-457A-9B6C-10566010700A}"/>
+                <a16:creationId xmlns:a16="http://schemas.microsoft.com/office/drawing/2014/main" id="{B4C10FE4-B15D-44FC-A9F3-C12AA44DFBC9}"/>
               </a:ext>
             </a:extLst>
           </p:cNvPr>
@@ -6666,12 +7410,22 @@
             <p:ph type="title"/>
           </p:nvPr>
         </p:nvSpPr>
-        <p:spPr/>
-        <p:txBody>
-          <a:bodyPr/>
+        <p:spPr>
+          <a:xfrm>
+            <a:off x="1028700" y="685800"/>
+            <a:ext cx="7200900" cy="609600"/>
+          </a:xfrm>
+        </p:spPr>
+        <p:txBody>
+          <a:bodyPr>
+            <a:normAutofit fontScale="90000"/>
+          </a:bodyPr>
           <a:lstStyle/>
           <a:p>
-            <a:endParaRPr lang="en-US" dirty="0"/>
+            <a:r>
+              <a:rPr lang="en-US" sz="3600" dirty="0"/>
+              <a:t>Research Questions and Assignments</a:t>
+            </a:r>
           </a:p>
         </p:txBody>
       </p:sp>
@@ -6680,7 +7434,7 @@
           <p:cNvPr id="3" name="Content Placeholder 2">
             <a:extLst>
               <a:ext uri="{FF2B5EF4-FFF2-40B4-BE49-F238E27FC236}">
-                <a16:creationId xmlns:a16="http://schemas.microsoft.com/office/drawing/2014/main" id="{1853A7BF-D4DF-4F30-8B41-EB08C3AC2379}"/>
+                <a16:creationId xmlns:a16="http://schemas.microsoft.com/office/drawing/2014/main" id="{F6F941C1-C7E5-433B-8C09-E5187F5163A3}"/>
               </a:ext>
             </a:extLst>
           </p:cNvPr>
@@ -6691,19 +7445,122 @@
             <p:ph idx="1"/>
           </p:nvPr>
         </p:nvSpPr>
-        <p:spPr/>
-        <p:txBody>
-          <a:bodyPr/>
+        <p:spPr>
+          <a:xfrm>
+            <a:off x="1028700" y="1447800"/>
+            <a:ext cx="7200900" cy="5105400"/>
+          </a:xfrm>
+        </p:spPr>
+        <p:txBody>
+          <a:bodyPr>
+            <a:normAutofit fontScale="92500" lnSpcReduction="10000"/>
+          </a:bodyPr>
           <a:lstStyle/>
           <a:p>
-            <a:endParaRPr lang="en-US" dirty="0"/>
+            <a:pPr marL="0" indent="0">
+              <a:buNone/>
+            </a:pPr>
+            <a:r>
+              <a:rPr lang="en-US" b="1" dirty="0"/>
+              <a:t>James </a:t>
+            </a:r>
+            <a:r>
+              <a:rPr lang="en-US" b="1" dirty="0" err="1"/>
+              <a:t>Willson</a:t>
+            </a:r>
+            <a:r>
+              <a:rPr lang="en-US" b="1" dirty="0"/>
+              <a:t> (Data Scientist)</a:t>
+            </a:r>
+          </a:p>
+          <a:p>
+            <a:pPr marL="457200" indent="-457200">
+              <a:buFont typeface="+mj-lt"/>
+              <a:buAutoNum type="arabicPeriod"/>
+            </a:pPr>
+            <a:r>
+              <a:rPr lang="en-US" dirty="0"/>
+              <a:t>Predict if an attack will be successful based on a variety of different factors.</a:t>
+            </a:r>
+          </a:p>
+          <a:p>
+            <a:pPr marL="457200" indent="-457200">
+              <a:buFont typeface="+mj-lt"/>
+              <a:buAutoNum type="arabicPeriod"/>
+            </a:pPr>
+            <a:r>
+              <a:rPr lang="en-US" dirty="0"/>
+              <a:t>Estimate the number of casualties in a successful terrorist attack</a:t>
+            </a:r>
+          </a:p>
+          <a:p>
+            <a:pPr marL="0" indent="0">
+              <a:buNone/>
+            </a:pPr>
+            <a:r>
+              <a:rPr lang="en-US" b="1" dirty="0" err="1"/>
+              <a:t>Kun</a:t>
+            </a:r>
+            <a:r>
+              <a:rPr lang="en-US" b="1" dirty="0"/>
+              <a:t> Li (Data Scientist)</a:t>
+            </a:r>
+          </a:p>
+          <a:p>
+            <a:pPr marL="457200" indent="-457200">
+              <a:buFont typeface="+mj-lt"/>
+              <a:buAutoNum type="arabicPeriod"/>
+            </a:pPr>
+            <a:r>
+              <a:rPr lang="en-US" dirty="0"/>
+              <a:t>Predict the extent/dollar-amount of property damage from any given attack</a:t>
+            </a:r>
+          </a:p>
+          <a:p>
+            <a:pPr marL="457200" indent="-457200">
+              <a:buFont typeface="+mj-lt"/>
+              <a:buAutoNum type="arabicPeriod"/>
+            </a:pPr>
+            <a:r>
+              <a:rPr lang="en-US" dirty="0"/>
+              <a:t>Identify factors that could predict the target/victim type in an attack</a:t>
+            </a:r>
+          </a:p>
+          <a:p>
+            <a:pPr marL="0" indent="0">
+              <a:buNone/>
+            </a:pPr>
+            <a:r>
+              <a:rPr lang="en-US" b="1" dirty="0"/>
+              <a:t>Sean Kugele (Data Scientist / Team Lead)</a:t>
+            </a:r>
+          </a:p>
+          <a:p>
+            <a:pPr marL="457200" indent="-457200">
+              <a:buFont typeface="+mj-lt"/>
+              <a:buAutoNum type="arabicPeriod"/>
+            </a:pPr>
+            <a:r>
+              <a:rPr lang="en-US" dirty="0"/>
+              <a:t>Predict the terrorist group responsible for perpetrating a terrorist attack</a:t>
+            </a:r>
+          </a:p>
+          <a:p>
+            <a:pPr marL="457200" indent="-457200">
+              <a:buFont typeface="+mj-lt"/>
+              <a:buAutoNum type="arabicPeriod"/>
+            </a:pPr>
+            <a:r>
+              <a:rPr lang="en-US" dirty="0"/>
+              <a:t>Estimate the probability of an attack based on temporal and geo-spatial variables</a:t>
+            </a:r>
           </a:p>
         </p:txBody>
       </p:sp>
     </p:spTree>
     <p:extLst>
       <p:ext uri="{BB962C8B-B14F-4D97-AF65-F5344CB8AC3E}">
-        <p14:creationId xmlns:p14="http://schemas.microsoft.com/office/powerpoint/2010/main" val="2044090292"/>
+        <p14:creationId xmlns:p14="http://schemas.microsoft.com/office/powerpoint/2010/main" val="2179402491"/>
       </p:ext>
     </p:extLst>
   </p:cSld>

</xml_diff>

<commit_message>
Adds world plot for attacks by group
</commit_message>
<xml_diff>
--- a/presentation/gtdb-final-presentation.pptx
+++ b/presentation/gtdb-final-presentation.pptx
@@ -5,7 +5,7 @@
     <p:sldMasterId id="2147483803" r:id="rId1"/>
   </p:sldMasterIdLst>
   <p:notesMasterIdLst>
-    <p:notesMasterId r:id="rId15"/>
+    <p:notesMasterId r:id="rId16"/>
   </p:notesMasterIdLst>
   <p:sldIdLst>
     <p:sldId id="256" r:id="rId2"/>
@@ -20,7 +20,8 @@
     <p:sldId id="257" r:id="rId11"/>
     <p:sldId id="258" r:id="rId12"/>
     <p:sldId id="259" r:id="rId13"/>
-    <p:sldId id="265" r:id="rId14"/>
+    <p:sldId id="272" r:id="rId14"/>
+    <p:sldId id="265" r:id="rId15"/>
   </p:sldIdLst>
   <p:sldSz cx="9144000" cy="6858000" type="screen4x3"/>
   <p:notesSz cx="6858000" cy="9144000"/>
@@ -148,6 +149,7 @@
         <p14:section name="Sean" id="{1C3D8192-CB26-499D-A6D8-E7F692D2D51F}">
           <p14:sldIdLst>
             <p14:sldId id="259"/>
+            <p14:sldId id="272"/>
           </p14:sldIdLst>
         </p14:section>
         <p14:section name="Summary and Conclusion" id="{A2B1DDA9-9FDD-4663-A154-79354B6BCDF3}">
@@ -1402,6 +1404,90 @@
     <p:extLst>
       <p:ext uri="{BB962C8B-B14F-4D97-AF65-F5344CB8AC3E}">
         <p14:creationId xmlns:p14="http://schemas.microsoft.com/office/powerpoint/2010/main" val="3508771164"/>
+      </p:ext>
+    </p:extLst>
+  </p:cSld>
+  <p:clrMapOvr>
+    <a:masterClrMapping/>
+  </p:clrMapOvr>
+</p:notes>
+</file>
+
+<file path=ppt/notesSlides/notesSlide3.xml><?xml version="1.0" encoding="utf-8"?>
+<p:notes xmlns:a="http://schemas.openxmlformats.org/drawingml/2006/main" xmlns:r="http://schemas.openxmlformats.org/officeDocument/2006/relationships" xmlns:p="http://schemas.openxmlformats.org/presentationml/2006/main">
+  <p:cSld>
+    <p:spTree>
+      <p:nvGrpSpPr>
+        <p:cNvPr id="1" name=""/>
+        <p:cNvGrpSpPr/>
+        <p:nvPr/>
+      </p:nvGrpSpPr>
+      <p:grpSpPr>
+        <a:xfrm>
+          <a:off x="0" y="0"/>
+          <a:ext cx="0" cy="0"/>
+          <a:chOff x="0" y="0"/>
+          <a:chExt cx="0" cy="0"/>
+        </a:xfrm>
+      </p:grpSpPr>
+      <p:sp>
+        <p:nvSpPr>
+          <p:cNvPr id="2" name="Slide Image Placeholder 1"/>
+          <p:cNvSpPr>
+            <a:spLocks noGrp="1" noRot="1" noChangeAspect="1"/>
+          </p:cNvSpPr>
+          <p:nvPr>
+            <p:ph type="sldImg"/>
+          </p:nvPr>
+        </p:nvSpPr>
+        <p:spPr/>
+      </p:sp>
+      <p:sp>
+        <p:nvSpPr>
+          <p:cNvPr id="3" name="Notes Placeholder 2"/>
+          <p:cNvSpPr>
+            <a:spLocks noGrp="1"/>
+          </p:cNvSpPr>
+          <p:nvPr>
+            <p:ph type="body" idx="1"/>
+          </p:nvPr>
+        </p:nvSpPr>
+        <p:spPr/>
+        <p:txBody>
+          <a:bodyPr/>
+          <a:lstStyle/>
+          <a:p>
+            <a:endParaRPr lang="en-US" dirty="0"/>
+          </a:p>
+        </p:txBody>
+      </p:sp>
+      <p:sp>
+        <p:nvSpPr>
+          <p:cNvPr id="4" name="Slide Number Placeholder 3"/>
+          <p:cNvSpPr>
+            <a:spLocks noGrp="1"/>
+          </p:cNvSpPr>
+          <p:nvPr>
+            <p:ph type="sldNum" sz="quarter" idx="5"/>
+          </p:nvPr>
+        </p:nvSpPr>
+        <p:spPr/>
+        <p:txBody>
+          <a:bodyPr/>
+          <a:lstStyle/>
+          <a:p>
+            <a:fld id="{58F5E0F1-AB47-4A7A-BA35-9463FCF91331}" type="slidenum">
+              <a:rPr lang="en-US" smtClean="0"/>
+              <a:t>13</a:t>
+            </a:fld>
+            <a:endParaRPr lang="en-US"/>
+          </a:p>
+        </p:txBody>
+      </p:sp>
+    </p:spTree>
+    <p:extLst>
+      <p:ext uri="{BB962C8B-B14F-4D97-AF65-F5344CB8AC3E}">
+        <p14:creationId xmlns:p14="http://schemas.microsoft.com/office/powerpoint/2010/main" val="3784740203"/>
       </p:ext>
     </p:extLst>
   </p:cSld>
@@ -5716,6 +5802,550 @@
 </file>
 
 <file path=ppt/slides/slide13.xml><?xml version="1.0" encoding="utf-8"?>
+<p:sld xmlns:a="http://schemas.openxmlformats.org/drawingml/2006/main" xmlns:r="http://schemas.openxmlformats.org/officeDocument/2006/relationships" xmlns:p="http://schemas.openxmlformats.org/presentationml/2006/main">
+  <p:cSld>
+    <p:bg>
+      <p:bgPr>
+        <a:solidFill>
+          <a:schemeClr val="bg2"/>
+        </a:solidFill>
+        <a:effectLst/>
+      </p:bgPr>
+    </p:bg>
+    <p:spTree>
+      <p:nvGrpSpPr>
+        <p:cNvPr id="1" name=""/>
+        <p:cNvGrpSpPr/>
+        <p:nvPr/>
+      </p:nvGrpSpPr>
+      <p:grpSpPr>
+        <a:xfrm>
+          <a:off x="0" y="0"/>
+          <a:ext cx="0" cy="0"/>
+          <a:chOff x="0" y="0"/>
+          <a:chExt cx="0" cy="0"/>
+        </a:xfrm>
+      </p:grpSpPr>
+      <p:sp>
+        <p:nvSpPr>
+          <p:cNvPr id="10" name="Rectangle 9">
+            <a:extLst>
+              <a:ext uri="{FF2B5EF4-FFF2-40B4-BE49-F238E27FC236}">
+                <a16:creationId xmlns:a16="http://schemas.microsoft.com/office/drawing/2014/main" id="{AA6EC888-B85F-410F-B430-06583E94BEEC}"/>
+              </a:ext>
+              <a:ext uri="{C183D7F6-B498-43B3-948B-1728B52AA6E4}">
+                <adec:decorative xmlns:adec="http://schemas.microsoft.com/office/drawing/2017/decorative" val="1"/>
+              </a:ext>
+            </a:extLst>
+          </p:cNvPr>
+          <p:cNvSpPr>
+            <a:spLocks noGrp="1" noRot="1" noChangeAspect="1" noMove="1" noResize="1" noEditPoints="1" noAdjustHandles="1" noChangeArrowheads="1" noChangeShapeType="1" noTextEdit="1"/>
+          </p:cNvSpPr>
+          <p:nvPr>
+            <p:extLst>
+              <p:ext uri="{386F3935-93C4-4BCD-93E2-E3B085C9AB24}">
+                <p16:designElem xmlns:p16="http://schemas.microsoft.com/office/powerpoint/2015/main" val="1"/>
+              </p:ext>
+            </p:extLst>
+          </p:nvPr>
+        </p:nvSpPr>
+        <p:spPr>
+          <a:xfrm>
+            <a:off x="358571" y="376"/>
+            <a:ext cx="171450" cy="6858000"/>
+          </a:xfrm>
+          <a:prstGeom prst="rect">
+            <a:avLst/>
+          </a:prstGeom>
+          <a:solidFill>
+            <a:schemeClr val="tx2"/>
+          </a:solidFill>
+          <a:ln>
+            <a:noFill/>
+          </a:ln>
+        </p:spPr>
+        <p:style>
+          <a:lnRef idx="2">
+            <a:schemeClr val="accent1">
+              <a:shade val="50000"/>
+            </a:schemeClr>
+          </a:lnRef>
+          <a:fillRef idx="1">
+            <a:schemeClr val="accent1"/>
+          </a:fillRef>
+          <a:effectRef idx="0">
+            <a:schemeClr val="accent1"/>
+          </a:effectRef>
+          <a:fontRef idx="minor">
+            <a:schemeClr val="lt1"/>
+          </a:fontRef>
+        </p:style>
+      </p:sp>
+      <p:sp>
+        <p:nvSpPr>
+          <p:cNvPr id="12" name="Rectangle 11">
+            <a:extLst>
+              <a:ext uri="{FF2B5EF4-FFF2-40B4-BE49-F238E27FC236}">
+                <a16:creationId xmlns:a16="http://schemas.microsoft.com/office/drawing/2014/main" id="{9485DA84-CB73-4E5E-9864-2460CE28055D}"/>
+              </a:ext>
+              <a:ext uri="{C183D7F6-B498-43B3-948B-1728B52AA6E4}">
+                <adec:decorative xmlns:adec="http://schemas.microsoft.com/office/drawing/2017/decorative" val="1"/>
+              </a:ext>
+            </a:extLst>
+          </p:cNvPr>
+          <p:cNvSpPr>
+            <a:spLocks noGrp="1" noRot="1" noChangeAspect="1" noMove="1" noResize="1" noEditPoints="1" noAdjustHandles="1" noChangeArrowheads="1" noChangeShapeType="1" noTextEdit="1"/>
+          </p:cNvSpPr>
+          <p:nvPr>
+            <p:extLst>
+              <p:ext uri="{386F3935-93C4-4BCD-93E2-E3B085C9AB24}">
+                <p16:designElem xmlns:p16="http://schemas.microsoft.com/office/powerpoint/2015/main" val="1"/>
+              </p:ext>
+            </p:extLst>
+          </p:nvPr>
+        </p:nvSpPr>
+        <p:spPr>
+          <a:xfrm>
+            <a:off x="0" y="0"/>
+            <a:ext cx="9144000" cy="6858000"/>
+          </a:xfrm>
+          <a:prstGeom prst="rect">
+            <a:avLst/>
+          </a:prstGeom>
+          <a:solidFill>
+            <a:schemeClr val="bg2"/>
+          </a:solidFill>
+          <a:ln>
+            <a:noFill/>
+          </a:ln>
+        </p:spPr>
+        <p:style>
+          <a:lnRef idx="2">
+            <a:schemeClr val="accent1">
+              <a:shade val="50000"/>
+            </a:schemeClr>
+          </a:lnRef>
+          <a:fillRef idx="1">
+            <a:schemeClr val="accent1"/>
+          </a:fillRef>
+          <a:effectRef idx="0">
+            <a:schemeClr val="accent1"/>
+          </a:effectRef>
+          <a:fontRef idx="minor">
+            <a:schemeClr val="lt1"/>
+          </a:fontRef>
+        </p:style>
+        <p:txBody>
+          <a:bodyPr rtlCol="0" anchor="ctr"/>
+          <a:lstStyle/>
+          <a:p>
+            <a:pPr algn="ctr"/>
+            <a:endParaRPr lang="en-US"/>
+          </a:p>
+        </p:txBody>
+      </p:sp>
+      <p:sp>
+        <p:nvSpPr>
+          <p:cNvPr id="14" name="Rectangle 13">
+            <a:extLst>
+              <a:ext uri="{FF2B5EF4-FFF2-40B4-BE49-F238E27FC236}">
+                <a16:creationId xmlns:a16="http://schemas.microsoft.com/office/drawing/2014/main" id="{7D49185E-361A-421B-8F2D-11C7FFC686F0}"/>
+              </a:ext>
+              <a:ext uri="{C183D7F6-B498-43B3-948B-1728B52AA6E4}">
+                <adec:decorative xmlns:adec="http://schemas.microsoft.com/office/drawing/2017/decorative" val="1"/>
+              </a:ext>
+            </a:extLst>
+          </p:cNvPr>
+          <p:cNvSpPr>
+            <a:spLocks noGrp="1" noRot="1" noChangeAspect="1" noMove="1" noResize="1" noEditPoints="1" noAdjustHandles="1" noChangeArrowheads="1" noChangeShapeType="1" noTextEdit="1"/>
+          </p:cNvSpPr>
+          <p:nvPr>
+            <p:extLst>
+              <p:ext uri="{386F3935-93C4-4BCD-93E2-E3B085C9AB24}">
+                <p16:designElem xmlns:p16="http://schemas.microsoft.com/office/powerpoint/2015/main" val="1"/>
+              </p:ext>
+            </p:extLst>
+          </p:nvPr>
+        </p:nvSpPr>
+        <p:spPr>
+          <a:xfrm>
+            <a:off x="0" y="0"/>
+            <a:ext cx="274320" cy="365760"/>
+          </a:xfrm>
+          <a:prstGeom prst="rect">
+            <a:avLst/>
+          </a:prstGeom>
+          <a:solidFill>
+            <a:schemeClr val="tx1"/>
+          </a:solidFill>
+          <a:ln>
+            <a:noFill/>
+          </a:ln>
+        </p:spPr>
+        <p:style>
+          <a:lnRef idx="2">
+            <a:schemeClr val="accent1">
+              <a:shade val="50000"/>
+            </a:schemeClr>
+          </a:lnRef>
+          <a:fillRef idx="1">
+            <a:schemeClr val="accent1"/>
+          </a:fillRef>
+          <a:effectRef idx="0">
+            <a:schemeClr val="accent1"/>
+          </a:effectRef>
+          <a:fontRef idx="minor">
+            <a:schemeClr val="lt1"/>
+          </a:fontRef>
+        </p:style>
+        <p:txBody>
+          <a:bodyPr rtlCol="0" anchor="ctr"/>
+          <a:lstStyle/>
+          <a:p>
+            <a:pPr algn="ctr"/>
+            <a:endParaRPr lang="en-US"/>
+          </a:p>
+        </p:txBody>
+      </p:sp>
+      <p:sp>
+        <p:nvSpPr>
+          <p:cNvPr id="16" name="Rectangle 15">
+            <a:extLst>
+              <a:ext uri="{FF2B5EF4-FFF2-40B4-BE49-F238E27FC236}">
+                <a16:creationId xmlns:a16="http://schemas.microsoft.com/office/drawing/2014/main" id="{14B85BAA-C37F-44B4-B427-B4F10EBB4183}"/>
+              </a:ext>
+              <a:ext uri="{C183D7F6-B498-43B3-948B-1728B52AA6E4}">
+                <adec:decorative xmlns:adec="http://schemas.microsoft.com/office/drawing/2017/decorative" val="1"/>
+              </a:ext>
+            </a:extLst>
+          </p:cNvPr>
+          <p:cNvSpPr>
+            <a:spLocks noGrp="1" noRot="1" noChangeAspect="1" noMove="1" noResize="1" noEditPoints="1" noAdjustHandles="1" noChangeArrowheads="1" noChangeShapeType="1" noTextEdit="1"/>
+          </p:cNvSpPr>
+          <p:nvPr>
+            <p:extLst>
+              <p:ext uri="{386F3935-93C4-4BCD-93E2-E3B085C9AB24}">
+                <p16:designElem xmlns:p16="http://schemas.microsoft.com/office/powerpoint/2015/main" val="1"/>
+              </p:ext>
+            </p:extLst>
+          </p:nvPr>
+        </p:nvSpPr>
+        <p:spPr>
+          <a:xfrm>
+            <a:off x="8869680" y="-4668"/>
+            <a:ext cx="274320" cy="365760"/>
+          </a:xfrm>
+          <a:prstGeom prst="rect">
+            <a:avLst/>
+          </a:prstGeom>
+          <a:solidFill>
+            <a:schemeClr val="tx1"/>
+          </a:solidFill>
+          <a:ln>
+            <a:noFill/>
+          </a:ln>
+        </p:spPr>
+        <p:style>
+          <a:lnRef idx="2">
+            <a:schemeClr val="accent1">
+              <a:shade val="50000"/>
+            </a:schemeClr>
+          </a:lnRef>
+          <a:fillRef idx="1">
+            <a:schemeClr val="accent1"/>
+          </a:fillRef>
+          <a:effectRef idx="0">
+            <a:schemeClr val="accent1"/>
+          </a:effectRef>
+          <a:fontRef idx="minor">
+            <a:schemeClr val="lt1"/>
+          </a:fontRef>
+        </p:style>
+        <p:txBody>
+          <a:bodyPr rtlCol="0" anchor="ctr"/>
+          <a:lstStyle/>
+          <a:p>
+            <a:pPr algn="ctr"/>
+            <a:endParaRPr lang="en-US"/>
+          </a:p>
+        </p:txBody>
+      </p:sp>
+      <p:sp>
+        <p:nvSpPr>
+          <p:cNvPr id="18" name="Rectangle 17">
+            <a:extLst>
+              <a:ext uri="{FF2B5EF4-FFF2-40B4-BE49-F238E27FC236}">
+                <a16:creationId xmlns:a16="http://schemas.microsoft.com/office/drawing/2014/main" id="{EDC4EE06-D7B4-4FAC-A561-38A1C380232A}"/>
+              </a:ext>
+              <a:ext uri="{C183D7F6-B498-43B3-948B-1728B52AA6E4}">
+                <adec:decorative xmlns:adec="http://schemas.microsoft.com/office/drawing/2017/decorative" val="1"/>
+              </a:ext>
+            </a:extLst>
+          </p:cNvPr>
+          <p:cNvSpPr>
+            <a:spLocks noGrp="1" noRot="1" noChangeAspect="1" noMove="1" noResize="1" noEditPoints="1" noAdjustHandles="1" noChangeArrowheads="1" noChangeShapeType="1" noTextEdit="1"/>
+          </p:cNvSpPr>
+          <p:nvPr>
+            <p:extLst>
+              <p:ext uri="{386F3935-93C4-4BCD-93E2-E3B085C9AB24}">
+                <p16:designElem xmlns:p16="http://schemas.microsoft.com/office/powerpoint/2015/main" val="1"/>
+              </p:ext>
+            </p:extLst>
+          </p:nvPr>
+        </p:nvSpPr>
+        <p:spPr>
+          <a:xfrm>
+            <a:off x="0" y="6494325"/>
+            <a:ext cx="274320" cy="365760"/>
+          </a:xfrm>
+          <a:prstGeom prst="rect">
+            <a:avLst/>
+          </a:prstGeom>
+          <a:solidFill>
+            <a:schemeClr val="tx1"/>
+          </a:solidFill>
+          <a:ln>
+            <a:noFill/>
+          </a:ln>
+        </p:spPr>
+        <p:style>
+          <a:lnRef idx="2">
+            <a:schemeClr val="accent1">
+              <a:shade val="50000"/>
+            </a:schemeClr>
+          </a:lnRef>
+          <a:fillRef idx="1">
+            <a:schemeClr val="accent1"/>
+          </a:fillRef>
+          <a:effectRef idx="0">
+            <a:schemeClr val="accent1"/>
+          </a:effectRef>
+          <a:fontRef idx="minor">
+            <a:schemeClr val="lt1"/>
+          </a:fontRef>
+        </p:style>
+        <p:txBody>
+          <a:bodyPr rtlCol="0" anchor="ctr"/>
+          <a:lstStyle/>
+          <a:p>
+            <a:pPr algn="ctr"/>
+            <a:endParaRPr lang="en-US"/>
+          </a:p>
+        </p:txBody>
+      </p:sp>
+      <p:sp>
+        <p:nvSpPr>
+          <p:cNvPr id="20" name="Rectangle 19">
+            <a:extLst>
+              <a:ext uri="{FF2B5EF4-FFF2-40B4-BE49-F238E27FC236}">
+                <a16:creationId xmlns:a16="http://schemas.microsoft.com/office/drawing/2014/main" id="{9018D83B-903C-4782-B1BB-A45164A71F60}"/>
+              </a:ext>
+              <a:ext uri="{C183D7F6-B498-43B3-948B-1728B52AA6E4}">
+                <adec:decorative xmlns:adec="http://schemas.microsoft.com/office/drawing/2017/decorative" val="1"/>
+              </a:ext>
+            </a:extLst>
+          </p:cNvPr>
+          <p:cNvSpPr>
+            <a:spLocks noGrp="1" noRot="1" noChangeAspect="1" noMove="1" noResize="1" noEditPoints="1" noAdjustHandles="1" noChangeArrowheads="1" noChangeShapeType="1" noTextEdit="1"/>
+          </p:cNvSpPr>
+          <p:nvPr>
+            <p:extLst>
+              <p:ext uri="{386F3935-93C4-4BCD-93E2-E3B085C9AB24}">
+                <p16:designElem xmlns:p16="http://schemas.microsoft.com/office/powerpoint/2015/main" val="1"/>
+              </p:ext>
+            </p:extLst>
+          </p:nvPr>
+        </p:nvSpPr>
+        <p:spPr>
+          <a:xfrm>
+            <a:off x="8869680" y="6494325"/>
+            <a:ext cx="274320" cy="365760"/>
+          </a:xfrm>
+          <a:prstGeom prst="rect">
+            <a:avLst/>
+          </a:prstGeom>
+          <a:solidFill>
+            <a:schemeClr val="tx1"/>
+          </a:solidFill>
+          <a:ln>
+            <a:noFill/>
+          </a:ln>
+        </p:spPr>
+        <p:style>
+          <a:lnRef idx="2">
+            <a:schemeClr val="accent1">
+              <a:shade val="50000"/>
+            </a:schemeClr>
+          </a:lnRef>
+          <a:fillRef idx="1">
+            <a:schemeClr val="accent1"/>
+          </a:fillRef>
+          <a:effectRef idx="0">
+            <a:schemeClr val="accent1"/>
+          </a:effectRef>
+          <a:fontRef idx="minor">
+            <a:schemeClr val="lt1"/>
+          </a:fontRef>
+        </p:style>
+        <p:txBody>
+          <a:bodyPr rtlCol="0" anchor="ctr"/>
+          <a:lstStyle/>
+          <a:p>
+            <a:pPr algn="ctr"/>
+            <a:endParaRPr lang="en-US"/>
+          </a:p>
+        </p:txBody>
+      </p:sp>
+      <p:sp>
+        <p:nvSpPr>
+          <p:cNvPr id="22" name="Rectangle 21">
+            <a:extLst>
+              <a:ext uri="{FF2B5EF4-FFF2-40B4-BE49-F238E27FC236}">
+                <a16:creationId xmlns:a16="http://schemas.microsoft.com/office/drawing/2014/main" id="{8785589A-A5AC-409A-B2A2-24D871B4CEF0}"/>
+              </a:ext>
+              <a:ext uri="{C183D7F6-B498-43B3-948B-1728B52AA6E4}">
+                <adec:decorative xmlns:adec="http://schemas.microsoft.com/office/drawing/2017/decorative" val="1"/>
+              </a:ext>
+            </a:extLst>
+          </p:cNvPr>
+          <p:cNvSpPr>
+            <a:spLocks noGrp="1" noRot="1" noChangeAspect="1" noMove="1" noResize="1" noEditPoints="1" noAdjustHandles="1" noChangeArrowheads="1" noChangeShapeType="1" noTextEdit="1"/>
+          </p:cNvSpPr>
+          <p:nvPr>
+            <p:extLst>
+              <p:ext uri="{386F3935-93C4-4BCD-93E2-E3B085C9AB24}">
+                <p16:designElem xmlns:p16="http://schemas.microsoft.com/office/powerpoint/2015/main" val="1"/>
+              </p:ext>
+            </p:extLst>
+          </p:nvPr>
+        </p:nvSpPr>
+        <p:spPr>
+          <a:xfrm>
+            <a:off x="120650" y="158782"/>
+            <a:ext cx="8902699" cy="6537850"/>
+          </a:xfrm>
+          <a:prstGeom prst="rect">
+            <a:avLst/>
+          </a:prstGeom>
+          <a:solidFill>
+            <a:srgbClr val="FFFFFF"/>
+          </a:solidFill>
+          <a:ln>
+            <a:noFill/>
+          </a:ln>
+        </p:spPr>
+        <p:style>
+          <a:lnRef idx="2">
+            <a:schemeClr val="accent1">
+              <a:shade val="50000"/>
+            </a:schemeClr>
+          </a:lnRef>
+          <a:fillRef idx="1">
+            <a:schemeClr val="accent1"/>
+          </a:fillRef>
+          <a:effectRef idx="0">
+            <a:schemeClr val="accent1"/>
+          </a:effectRef>
+          <a:fontRef idx="minor">
+            <a:schemeClr val="lt1"/>
+          </a:fontRef>
+        </p:style>
+        <p:txBody>
+          <a:bodyPr rtlCol="0" anchor="ctr"/>
+          <a:lstStyle/>
+          <a:p>
+            <a:pPr algn="ctr"/>
+            <a:endParaRPr lang="en-US"/>
+          </a:p>
+        </p:txBody>
+      </p:sp>
+      <p:pic>
+        <p:nvPicPr>
+          <p:cNvPr id="5" name="Content Placeholder 4" descr="A close up of a map&#10;&#10;Description automatically generated">
+            <a:extLst>
+              <a:ext uri="{FF2B5EF4-FFF2-40B4-BE49-F238E27FC236}">
+                <a16:creationId xmlns:a16="http://schemas.microsoft.com/office/drawing/2014/main" id="{8E038568-82E5-4972-941D-CAB1B7BF0DE5}"/>
+              </a:ext>
+            </a:extLst>
+          </p:cNvPr>
+          <p:cNvPicPr>
+            <a:picLocks noGrp="1" noChangeAspect="1"/>
+          </p:cNvPicPr>
+          <p:nvPr>
+            <p:ph idx="1"/>
+          </p:nvPr>
+        </p:nvPicPr>
+        <p:blipFill>
+          <a:blip r:embed="rId3" cstate="print">
+            <a:extLst>
+              <a:ext uri="{28A0092B-C50C-407E-A947-70E740481C1C}">
+                <a14:useLocalDpi xmlns:a14="http://schemas.microsoft.com/office/drawing/2010/main" val="0"/>
+              </a:ext>
+            </a:extLst>
+          </a:blip>
+          <a:stretch>
+            <a:fillRect/>
+          </a:stretch>
+        </p:blipFill>
+        <p:spPr>
+          <a:xfrm>
+            <a:off x="361950" y="900637"/>
+            <a:ext cx="8420099" cy="5500163"/>
+          </a:xfrm>
+          <a:prstGeom prst="rect">
+            <a:avLst/>
+          </a:prstGeom>
+        </p:spPr>
+      </p:pic>
+      <p:sp>
+        <p:nvSpPr>
+          <p:cNvPr id="23" name="Title 1">
+            <a:extLst>
+              <a:ext uri="{FF2B5EF4-FFF2-40B4-BE49-F238E27FC236}">
+                <a16:creationId xmlns:a16="http://schemas.microsoft.com/office/drawing/2014/main" id="{0FB2F5D6-7099-450C-9833-0F17F76AD88A}"/>
+              </a:ext>
+            </a:extLst>
+          </p:cNvPr>
+          <p:cNvSpPr>
+            <a:spLocks noGrp="1"/>
+          </p:cNvSpPr>
+          <p:nvPr>
+            <p:ph type="title"/>
+          </p:nvPr>
+        </p:nvSpPr>
+        <p:spPr>
+          <a:xfrm>
+            <a:off x="1028700" y="685800"/>
+            <a:ext cx="7200900" cy="762000"/>
+          </a:xfrm>
+        </p:spPr>
+        <p:txBody>
+          <a:bodyPr>
+            <a:normAutofit/>
+          </a:bodyPr>
+          <a:lstStyle/>
+          <a:p>
+            <a:r>
+              <a:rPr lang="en-US" dirty="0"/>
+              <a:t>Terrorist Attacks by Group</a:t>
+            </a:r>
+          </a:p>
+        </p:txBody>
+      </p:sp>
+    </p:spTree>
+    <p:extLst>
+      <p:ext uri="{BB962C8B-B14F-4D97-AF65-F5344CB8AC3E}">
+        <p14:creationId xmlns:p14="http://schemas.microsoft.com/office/powerpoint/2010/main" val="3430899876"/>
+      </p:ext>
+    </p:extLst>
+  </p:cSld>
+  <p:clrMapOvr>
+    <a:masterClrMapping/>
+  </p:clrMapOvr>
+</p:sld>
+</file>
+
+<file path=ppt/slides/slide14.xml><?xml version="1.0" encoding="utf-8"?>
 <p:sld xmlns:a="http://schemas.openxmlformats.org/drawingml/2006/main" xmlns:r="http://schemas.openxmlformats.org/officeDocument/2006/relationships" xmlns:p="http://schemas.openxmlformats.org/presentationml/2006/main">
   <p:cSld>
     <p:spTree>

</xml_diff>

<commit_message>
Adds table of attacks by group to presentation
</commit_message>
<xml_diff>
--- a/presentation/gtdb-final-presentation.pptx
+++ b/presentation/gtdb-final-presentation.pptx
@@ -5754,40 +5754,619 @@
             <p:ph type="title"/>
           </p:nvPr>
         </p:nvSpPr>
-        <p:spPr/>
+        <p:spPr>
+          <a:xfrm>
+            <a:off x="685800" y="0"/>
+            <a:ext cx="8156448" cy="838200"/>
+          </a:xfrm>
+        </p:spPr>
         <p:txBody>
           <a:bodyPr/>
           <a:lstStyle/>
           <a:p>
-            <a:endParaRPr lang="en-US"/>
-          </a:p>
-        </p:txBody>
-      </p:sp>
-      <p:sp>
-        <p:nvSpPr>
-          <p:cNvPr id="3" name="Content Placeholder 2">
+            <a:r>
+              <a:rPr lang="en-US" dirty="0"/>
+              <a:t>Terrorist Groups</a:t>
+            </a:r>
+          </a:p>
+        </p:txBody>
+      </p:sp>
+      <p:graphicFrame>
+        <p:nvGraphicFramePr>
+          <p:cNvPr id="4" name="Content Placeholder 3">
             <a:extLst>
               <a:ext uri="{FF2B5EF4-FFF2-40B4-BE49-F238E27FC236}">
-                <a16:creationId xmlns:a16="http://schemas.microsoft.com/office/drawing/2014/main" id="{7CA6673B-21BE-406F-BE8D-8A7E80804C8F}"/>
+                <a16:creationId xmlns:a16="http://schemas.microsoft.com/office/drawing/2014/main" id="{FDF86962-8BE3-42D9-94C4-F9CFABB037E2}"/>
               </a:ext>
             </a:extLst>
           </p:cNvPr>
-          <p:cNvSpPr>
-            <a:spLocks noGrp="1"/>
-          </p:cNvSpPr>
+          <p:cNvGraphicFramePr>
+            <a:graphicFrameLocks noGrp="1"/>
+          </p:cNvGraphicFramePr>
           <p:nvPr>
             <p:ph idx="1"/>
-          </p:nvPr>
-        </p:nvSpPr>
-        <p:spPr/>
-        <p:txBody>
-          <a:bodyPr/>
-          <a:lstStyle/>
-          <a:p>
-            <a:endParaRPr lang="en-US"/>
-          </a:p>
-        </p:txBody>
-      </p:sp>
+            <p:extLst>
+              <p:ext uri="{D42A27DB-BD31-4B8C-83A1-F6EECF244321}">
+                <p14:modId xmlns:p14="http://schemas.microsoft.com/office/powerpoint/2010/main" val="3834051845"/>
+              </p:ext>
+            </p:extLst>
+          </p:nvPr>
+        </p:nvGraphicFramePr>
+        <p:xfrm>
+          <a:off x="835152" y="1183640"/>
+          <a:ext cx="8156448" cy="5217160"/>
+        </p:xfrm>
+        <a:graphic>
+          <a:graphicData uri="http://schemas.openxmlformats.org/drawingml/2006/table">
+            <a:tbl>
+              <a:tblPr firstRow="1" bandRow="1">
+                <a:tableStyleId>{5C22544A-7EE6-4342-B048-85BDC9FD1C3A}</a:tableStyleId>
+              </a:tblPr>
+              <a:tblGrid>
+                <a:gridCol w="4803648">
+                  <a:extLst>
+                    <a:ext uri="{9D8B030D-6E8A-4147-A177-3AD203B41FA5}">
+                      <a16:colId xmlns:a16="http://schemas.microsoft.com/office/drawing/2014/main" val="1251328461"/>
+                    </a:ext>
+                  </a:extLst>
+                </a:gridCol>
+                <a:gridCol w="3352800">
+                  <a:extLst>
+                    <a:ext uri="{9D8B030D-6E8A-4147-A177-3AD203B41FA5}">
+                      <a16:colId xmlns:a16="http://schemas.microsoft.com/office/drawing/2014/main" val="2069697519"/>
+                    </a:ext>
+                  </a:extLst>
+                </a:gridCol>
+              </a:tblGrid>
+              <a:tr h="370840">
+                <a:tc>
+                  <a:txBody>
+                    <a:bodyPr/>
+                    <a:lstStyle/>
+                    <a:p>
+                      <a:r>
+                        <a:rPr lang="en-US" sz="2000" b="1" dirty="0"/>
+                        <a:t>Terrorist Group</a:t>
+                      </a:r>
+                    </a:p>
+                  </a:txBody>
+                  <a:tcPr/>
+                </a:tc>
+                <a:tc>
+                  <a:txBody>
+                    <a:bodyPr/>
+                    <a:lstStyle/>
+                    <a:p>
+                      <a:r>
+                        <a:rPr lang="en-US" sz="2000" b="1" dirty="0"/>
+                        <a:t>Number of Known Attacks</a:t>
+                      </a:r>
+                    </a:p>
+                  </a:txBody>
+                  <a:tcPr/>
+                </a:tc>
+                <a:extLst>
+                  <a:ext uri="{0D108BD9-81ED-4DB2-BD59-A6C34878D82A}">
+                    <a16:rowId xmlns:a16="http://schemas.microsoft.com/office/drawing/2014/main" val="1009795437"/>
+                  </a:ext>
+                </a:extLst>
+              </a:tr>
+              <a:tr h="370840">
+                <a:tc>
+                  <a:txBody>
+                    <a:bodyPr/>
+                    <a:lstStyle/>
+                    <a:p>
+                      <a:r>
+                        <a:rPr lang="en-US" sz="1800" dirty="0">
+                          <a:effectLst/>
+                        </a:rPr>
+                        <a:t>Al-Qaida in Iraq</a:t>
+                      </a:r>
+                    </a:p>
+                  </a:txBody>
+                  <a:tcPr marL="38100" marR="38100" marT="30480" marB="30480" anchor="ctr"/>
+                </a:tc>
+                <a:tc>
+                  <a:txBody>
+                    <a:bodyPr/>
+                    <a:lstStyle/>
+                    <a:p>
+                      <a:pPr algn="r"/>
+                      <a:r>
+                        <a:rPr lang="en-US" sz="1800" dirty="0">
+                          <a:effectLst/>
+                        </a:rPr>
+                        <a:t>599</a:t>
+                      </a:r>
+                    </a:p>
+                  </a:txBody>
+                  <a:tcPr marL="38100" marR="38100" marT="30480" marB="30480" anchor="ctr"/>
+                </a:tc>
+                <a:extLst>
+                  <a:ext uri="{0D108BD9-81ED-4DB2-BD59-A6C34878D82A}">
+                    <a16:rowId xmlns:a16="http://schemas.microsoft.com/office/drawing/2014/main" val="1848061333"/>
+                  </a:ext>
+                </a:extLst>
+              </a:tr>
+              <a:tr h="370840">
+                <a:tc>
+                  <a:txBody>
+                    <a:bodyPr/>
+                    <a:lstStyle/>
+                    <a:p>
+                      <a:r>
+                        <a:rPr lang="it-IT" sz="1800">
+                          <a:effectLst/>
+                        </a:rPr>
+                        <a:t>Al-Qaida in the Arabian Peninsula (AQAP)</a:t>
+                      </a:r>
+                    </a:p>
+                  </a:txBody>
+                  <a:tcPr marL="38100" marR="38100" marT="30480" marB="30480" anchor="ctr"/>
+                </a:tc>
+                <a:tc>
+                  <a:txBody>
+                    <a:bodyPr/>
+                    <a:lstStyle/>
+                    <a:p>
+                      <a:pPr algn="r"/>
+                      <a:r>
+                        <a:rPr lang="en-US" sz="1800">
+                          <a:effectLst/>
+                        </a:rPr>
+                        <a:t>883</a:t>
+                      </a:r>
+                    </a:p>
+                  </a:txBody>
+                  <a:tcPr marL="38100" marR="38100" marT="30480" marB="30480" anchor="ctr"/>
+                </a:tc>
+                <a:extLst>
+                  <a:ext uri="{0D108BD9-81ED-4DB2-BD59-A6C34878D82A}">
+                    <a16:rowId xmlns:a16="http://schemas.microsoft.com/office/drawing/2014/main" val="189407758"/>
+                  </a:ext>
+                </a:extLst>
+              </a:tr>
+              <a:tr h="370840">
+                <a:tc>
+                  <a:txBody>
+                    <a:bodyPr/>
+                    <a:lstStyle/>
+                    <a:p>
+                      <a:r>
+                        <a:rPr lang="en-US" sz="1800" dirty="0">
+                          <a:effectLst/>
+                        </a:rPr>
+                        <a:t>Al-Qaida in the Islamic Maghreb (AQIM)</a:t>
+                      </a:r>
+                    </a:p>
+                  </a:txBody>
+                  <a:tcPr marL="38100" marR="38100" marT="30480" marB="30480" anchor="ctr"/>
+                </a:tc>
+                <a:tc>
+                  <a:txBody>
+                    <a:bodyPr/>
+                    <a:lstStyle/>
+                    <a:p>
+                      <a:pPr algn="r"/>
+                      <a:r>
+                        <a:rPr lang="en-US" sz="1800" dirty="0">
+                          <a:effectLst/>
+                        </a:rPr>
+                        <a:t>232</a:t>
+                      </a:r>
+                    </a:p>
+                  </a:txBody>
+                  <a:tcPr marL="38100" marR="38100" marT="30480" marB="30480" anchor="ctr"/>
+                </a:tc>
+                <a:extLst>
+                  <a:ext uri="{0D108BD9-81ED-4DB2-BD59-A6C34878D82A}">
+                    <a16:rowId xmlns:a16="http://schemas.microsoft.com/office/drawing/2014/main" val="3584528073"/>
+                  </a:ext>
+                </a:extLst>
+              </a:tr>
+              <a:tr h="370840">
+                <a:tc>
+                  <a:txBody>
+                    <a:bodyPr/>
+                    <a:lstStyle/>
+                    <a:p>
+                      <a:r>
+                        <a:rPr lang="en-US" sz="1800">
+                          <a:effectLst/>
+                        </a:rPr>
+                        <a:t>Hamas (Islamic Resistance Movement)</a:t>
+                      </a:r>
+                    </a:p>
+                  </a:txBody>
+                  <a:tcPr marL="38100" marR="38100" marT="30480" marB="30480" anchor="ctr"/>
+                </a:tc>
+                <a:tc>
+                  <a:txBody>
+                    <a:bodyPr/>
+                    <a:lstStyle/>
+                    <a:p>
+                      <a:pPr algn="r"/>
+                      <a:r>
+                        <a:rPr lang="en-US" sz="1800" dirty="0">
+                          <a:effectLst/>
+                        </a:rPr>
+                        <a:t>291</a:t>
+                      </a:r>
+                    </a:p>
+                  </a:txBody>
+                  <a:tcPr marL="38100" marR="38100" marT="30480" marB="30480" anchor="ctr"/>
+                </a:tc>
+                <a:extLst>
+                  <a:ext uri="{0D108BD9-81ED-4DB2-BD59-A6C34878D82A}">
+                    <a16:rowId xmlns:a16="http://schemas.microsoft.com/office/drawing/2014/main" val="2120915403"/>
+                  </a:ext>
+                </a:extLst>
+              </a:tr>
+              <a:tr h="370840">
+                <a:tc>
+                  <a:txBody>
+                    <a:bodyPr/>
+                    <a:lstStyle/>
+                    <a:p>
+                      <a:r>
+                        <a:rPr lang="en-US" sz="1800">
+                          <a:effectLst/>
+                        </a:rPr>
+                        <a:t>Hezbollah</a:t>
+                      </a:r>
+                    </a:p>
+                  </a:txBody>
+                  <a:tcPr marL="38100" marR="38100" marT="30480" marB="30480" anchor="ctr"/>
+                </a:tc>
+                <a:tc>
+                  <a:txBody>
+                    <a:bodyPr/>
+                    <a:lstStyle/>
+                    <a:p>
+                      <a:pPr algn="r"/>
+                      <a:r>
+                        <a:rPr lang="en-US" sz="1800" dirty="0">
+                          <a:effectLst/>
+                        </a:rPr>
+                        <a:t>111</a:t>
+                      </a:r>
+                    </a:p>
+                  </a:txBody>
+                  <a:tcPr marL="38100" marR="38100" marT="30480" marB="30480" anchor="ctr"/>
+                </a:tc>
+                <a:extLst>
+                  <a:ext uri="{0D108BD9-81ED-4DB2-BD59-A6C34878D82A}">
+                    <a16:rowId xmlns:a16="http://schemas.microsoft.com/office/drawing/2014/main" val="1245415448"/>
+                  </a:ext>
+                </a:extLst>
+              </a:tr>
+              <a:tr h="370840">
+                <a:tc>
+                  <a:txBody>
+                    <a:bodyPr/>
+                    <a:lstStyle/>
+                    <a:p>
+                      <a:r>
+                        <a:rPr lang="en-US" sz="1800" dirty="0">
+                          <a:effectLst/>
+                        </a:rPr>
+                        <a:t>Islamic State of Iraq and the Levant (ISIL)</a:t>
+                      </a:r>
+                    </a:p>
+                  </a:txBody>
+                  <a:tcPr marL="38100" marR="38100" marT="30480" marB="30480" anchor="ctr"/>
+                </a:tc>
+                <a:tc>
+                  <a:txBody>
+                    <a:bodyPr/>
+                    <a:lstStyle/>
+                    <a:p>
+                      <a:pPr algn="r"/>
+                      <a:r>
+                        <a:rPr lang="en-US" sz="1800" dirty="0">
+                          <a:effectLst/>
+                        </a:rPr>
+                        <a:t>4,286</a:t>
+                      </a:r>
+                    </a:p>
+                  </a:txBody>
+                  <a:tcPr marL="38100" marR="38100" marT="30480" marB="30480" anchor="ctr"/>
+                </a:tc>
+                <a:extLst>
+                  <a:ext uri="{0D108BD9-81ED-4DB2-BD59-A6C34878D82A}">
+                    <a16:rowId xmlns:a16="http://schemas.microsoft.com/office/drawing/2014/main" val="3798587476"/>
+                  </a:ext>
+                </a:extLst>
+              </a:tr>
+              <a:tr h="370840">
+                <a:tc>
+                  <a:txBody>
+                    <a:bodyPr/>
+                    <a:lstStyle/>
+                    <a:p>
+                      <a:r>
+                        <a:rPr lang="en-US" sz="1800">
+                          <a:effectLst/>
+                        </a:rPr>
+                        <a:t>Kurdistan Workers' Party (PKK)</a:t>
+                      </a:r>
+                    </a:p>
+                  </a:txBody>
+                  <a:tcPr marL="38100" marR="38100" marT="30480" marB="30480" anchor="ctr"/>
+                </a:tc>
+                <a:tc>
+                  <a:txBody>
+                    <a:bodyPr/>
+                    <a:lstStyle/>
+                    <a:p>
+                      <a:pPr algn="r"/>
+                      <a:r>
+                        <a:rPr lang="en-US" sz="1800" dirty="0">
+                          <a:effectLst/>
+                        </a:rPr>
+                        <a:t>1,080</a:t>
+                      </a:r>
+                    </a:p>
+                  </a:txBody>
+                  <a:tcPr marL="38100" marR="38100" marT="30480" marB="30480" anchor="ctr"/>
+                </a:tc>
+                <a:extLst>
+                  <a:ext uri="{0D108BD9-81ED-4DB2-BD59-A6C34878D82A}">
+                    <a16:rowId xmlns:a16="http://schemas.microsoft.com/office/drawing/2014/main" val="2598815013"/>
+                  </a:ext>
+                </a:extLst>
+              </a:tr>
+              <a:tr h="370840">
+                <a:tc>
+                  <a:txBody>
+                    <a:bodyPr/>
+                    <a:lstStyle/>
+                    <a:p>
+                      <a:r>
+                        <a:rPr lang="en-US" sz="1800">
+                          <a:effectLst/>
+                        </a:rPr>
+                        <a:t>Liberation Tigers of Tamil Eelam (LTTE)</a:t>
+                      </a:r>
+                    </a:p>
+                  </a:txBody>
+                  <a:tcPr marL="38100" marR="38100" marT="30480" marB="30480" anchor="ctr"/>
+                </a:tc>
+                <a:tc>
+                  <a:txBody>
+                    <a:bodyPr/>
+                    <a:lstStyle/>
+                    <a:p>
+                      <a:pPr algn="r"/>
+                      <a:r>
+                        <a:rPr lang="en-US" sz="1800" dirty="0">
+                          <a:effectLst/>
+                        </a:rPr>
+                        <a:t>591</a:t>
+                      </a:r>
+                    </a:p>
+                  </a:txBody>
+                  <a:tcPr marL="38100" marR="38100" marT="30480" marB="30480" anchor="ctr"/>
+                </a:tc>
+                <a:extLst>
+                  <a:ext uri="{0D108BD9-81ED-4DB2-BD59-A6C34878D82A}">
+                    <a16:rowId xmlns:a16="http://schemas.microsoft.com/office/drawing/2014/main" val="4158578469"/>
+                  </a:ext>
+                </a:extLst>
+              </a:tr>
+              <a:tr h="370840">
+                <a:tc>
+                  <a:txBody>
+                    <a:bodyPr/>
+                    <a:lstStyle/>
+                    <a:p>
+                      <a:r>
+                        <a:rPr lang="en-US" sz="1800">
+                          <a:effectLst/>
+                        </a:rPr>
+                        <a:t>New People's Army (NPA)</a:t>
+                      </a:r>
+                    </a:p>
+                  </a:txBody>
+                  <a:tcPr marL="38100" marR="38100" marT="30480" marB="30480" anchor="ctr"/>
+                </a:tc>
+                <a:tc>
+                  <a:txBody>
+                    <a:bodyPr/>
+                    <a:lstStyle/>
+                    <a:p>
+                      <a:pPr algn="r"/>
+                      <a:r>
+                        <a:rPr lang="en-US" sz="1800" dirty="0">
+                          <a:effectLst/>
+                        </a:rPr>
+                        <a:t>1,560</a:t>
+                      </a:r>
+                    </a:p>
+                  </a:txBody>
+                  <a:tcPr marL="38100" marR="38100" marT="30480" marB="30480" anchor="ctr"/>
+                </a:tc>
+                <a:extLst>
+                  <a:ext uri="{0D108BD9-81ED-4DB2-BD59-A6C34878D82A}">
+                    <a16:rowId xmlns:a16="http://schemas.microsoft.com/office/drawing/2014/main" val="3014755430"/>
+                  </a:ext>
+                </a:extLst>
+              </a:tr>
+              <a:tr h="370840">
+                <a:tc>
+                  <a:txBody>
+                    <a:bodyPr/>
+                    <a:lstStyle/>
+                    <a:p>
+                      <a:r>
+                        <a:rPr lang="en-US" sz="1800">
+                          <a:effectLst/>
+                        </a:rPr>
+                        <a:t>Revolutionary Armed Forces of Colombia (FARC)</a:t>
+                      </a:r>
+                    </a:p>
+                  </a:txBody>
+                  <a:tcPr marL="38100" marR="38100" marT="30480" marB="30480" anchor="ctr"/>
+                </a:tc>
+                <a:tc>
+                  <a:txBody>
+                    <a:bodyPr/>
+                    <a:lstStyle/>
+                    <a:p>
+                      <a:pPr algn="r"/>
+                      <a:r>
+                        <a:rPr lang="en-US" sz="1800">
+                          <a:effectLst/>
+                        </a:rPr>
+                        <a:t>1124</a:t>
+                      </a:r>
+                    </a:p>
+                  </a:txBody>
+                  <a:tcPr marL="38100" marR="38100" marT="30480" marB="30480" anchor="ctr"/>
+                </a:tc>
+                <a:extLst>
+                  <a:ext uri="{0D108BD9-81ED-4DB2-BD59-A6C34878D82A}">
+                    <a16:rowId xmlns:a16="http://schemas.microsoft.com/office/drawing/2014/main" val="240249486"/>
+                  </a:ext>
+                </a:extLst>
+              </a:tr>
+              <a:tr h="370840">
+                <a:tc>
+                  <a:txBody>
+                    <a:bodyPr/>
+                    <a:lstStyle/>
+                    <a:p>
+                      <a:r>
+                        <a:rPr lang="en-US" sz="1800">
+                          <a:effectLst/>
+                        </a:rPr>
+                        <a:t>Salafist Group for Preaching and Fighting (GSPC)</a:t>
+                      </a:r>
+                    </a:p>
+                  </a:txBody>
+                  <a:tcPr marL="38100" marR="38100" marT="30480" marB="30480" anchor="ctr"/>
+                </a:tc>
+                <a:tc>
+                  <a:txBody>
+                    <a:bodyPr/>
+                    <a:lstStyle/>
+                    <a:p>
+                      <a:pPr algn="r"/>
+                      <a:r>
+                        <a:rPr lang="en-US" sz="1800">
+                          <a:effectLst/>
+                        </a:rPr>
+                        <a:t>182</a:t>
+                      </a:r>
+                    </a:p>
+                  </a:txBody>
+                  <a:tcPr marL="38100" marR="38100" marT="30480" marB="30480" anchor="ctr"/>
+                </a:tc>
+                <a:extLst>
+                  <a:ext uri="{0D108BD9-81ED-4DB2-BD59-A6C34878D82A}">
+                    <a16:rowId xmlns:a16="http://schemas.microsoft.com/office/drawing/2014/main" val="2866686463"/>
+                  </a:ext>
+                </a:extLst>
+              </a:tr>
+              <a:tr h="370840">
+                <a:tc>
+                  <a:txBody>
+                    <a:bodyPr/>
+                    <a:lstStyle/>
+                    <a:p>
+                      <a:r>
+                        <a:rPr lang="en-US" sz="1800">
+                          <a:effectLst/>
+                        </a:rPr>
+                        <a:t>Taliban</a:t>
+                      </a:r>
+                    </a:p>
+                  </a:txBody>
+                  <a:tcPr marL="38100" marR="38100" marT="30480" marB="30480" anchor="ctr"/>
+                </a:tc>
+                <a:tc>
+                  <a:txBody>
+                    <a:bodyPr/>
+                    <a:lstStyle/>
+                    <a:p>
+                      <a:pPr algn="r"/>
+                      <a:r>
+                        <a:rPr lang="en-US" sz="1800" dirty="0">
+                          <a:effectLst/>
+                        </a:rPr>
+                        <a:t>5,877</a:t>
+                      </a:r>
+                    </a:p>
+                  </a:txBody>
+                  <a:tcPr marL="38100" marR="38100" marT="30480" marB="30480" anchor="ctr"/>
+                </a:tc>
+                <a:extLst>
+                  <a:ext uri="{0D108BD9-81ED-4DB2-BD59-A6C34878D82A}">
+                    <a16:rowId xmlns:a16="http://schemas.microsoft.com/office/drawing/2014/main" val="1624249066"/>
+                  </a:ext>
+                </a:extLst>
+              </a:tr>
+              <a:tr h="370840">
+                <a:tc>
+                  <a:txBody>
+                    <a:bodyPr/>
+                    <a:lstStyle/>
+                    <a:p>
+                      <a:r>
+                        <a:rPr lang="en-US" sz="1800" dirty="0" err="1">
+                          <a:effectLst/>
+                        </a:rPr>
+                        <a:t>Tehrik</a:t>
+                      </a:r>
+                      <a:r>
+                        <a:rPr lang="en-US" sz="1800" dirty="0">
+                          <a:effectLst/>
+                        </a:rPr>
+                        <a:t>-</a:t>
+                      </a:r>
+                      <a:r>
+                        <a:rPr lang="en-US" sz="1800" dirty="0" err="1">
+                          <a:effectLst/>
+                        </a:rPr>
+                        <a:t>i</a:t>
+                      </a:r>
+                      <a:r>
+                        <a:rPr lang="en-US" sz="1800" dirty="0">
+                          <a:effectLst/>
+                        </a:rPr>
+                        <a:t>-Taliban Pakistan (TTP)</a:t>
+                      </a:r>
+                    </a:p>
+                  </a:txBody>
+                  <a:tcPr marL="38100" marR="38100" marT="30480" marB="30480" anchor="ctr"/>
+                </a:tc>
+                <a:tc>
+                  <a:txBody>
+                    <a:bodyPr/>
+                    <a:lstStyle/>
+                    <a:p>
+                      <a:pPr algn="r"/>
+                      <a:r>
+                        <a:rPr lang="en-US" sz="1800" dirty="0">
+                          <a:effectLst/>
+                        </a:rPr>
+                        <a:t>1239</a:t>
+                      </a:r>
+                    </a:p>
+                  </a:txBody>
+                  <a:tcPr marL="38100" marR="38100" marT="30480" marB="30480" anchor="ctr"/>
+                </a:tc>
+                <a:extLst>
+                  <a:ext uri="{0D108BD9-81ED-4DB2-BD59-A6C34878D82A}">
+                    <a16:rowId xmlns:a16="http://schemas.microsoft.com/office/drawing/2014/main" val="3550190277"/>
+                  </a:ext>
+                </a:extLst>
+              </a:tr>
+            </a:tbl>
+          </a:graphicData>
+        </a:graphic>
+      </p:graphicFrame>
     </p:spTree>
     <p:extLst>
       <p:ext uri="{BB962C8B-B14F-4D97-AF65-F5344CB8AC3E}">

</xml_diff>

<commit_message>
Updates graphics and adds LDA plot following as.factor correction to cluster_id
</commit_message>
<xml_diff>
--- a/presentation/gtdb-final-presentation.pptx
+++ b/presentation/gtdb-final-presentation.pptx
@@ -5,7 +5,7 @@
     <p:sldMasterId id="2147483803" r:id="rId1"/>
   </p:sldMasterIdLst>
   <p:notesMasterIdLst>
-    <p:notesMasterId r:id="rId52"/>
+    <p:notesMasterId r:id="rId53"/>
   </p:notesMasterIdLst>
   <p:sldIdLst>
     <p:sldId id="256" r:id="rId2"/>
@@ -55,9 +55,10 @@
     <p:sldId id="315" r:id="rId46"/>
     <p:sldId id="316" r:id="rId47"/>
     <p:sldId id="319" r:id="rId48"/>
-    <p:sldId id="314" r:id="rId49"/>
-    <p:sldId id="265" r:id="rId50"/>
-    <p:sldId id="318" r:id="rId51"/>
+    <p:sldId id="320" r:id="rId49"/>
+    <p:sldId id="314" r:id="rId50"/>
+    <p:sldId id="265" r:id="rId51"/>
+    <p:sldId id="318" r:id="rId52"/>
   </p:sldIdLst>
   <p:sldSz cx="9144000" cy="6858000" type="screen4x3"/>
   <p:notesSz cx="6858000" cy="9144000"/>
@@ -216,6 +217,7 @@
             <p14:sldId id="315"/>
             <p14:sldId id="316"/>
             <p14:sldId id="319"/>
+            <p14:sldId id="320"/>
             <p14:sldId id="314"/>
           </p14:sldIdLst>
         </p14:section>
@@ -7491,7 +7493,7 @@
           <a:graphicData uri="http://schemas.openxmlformats.org/presentationml/2006/ole">
             <mc:AlternateContent xmlns:mc="http://schemas.openxmlformats.org/markup-compatibility/2006">
               <mc:Choice xmlns:v="urn:schemas-microsoft-com:vml" Requires="v">
-                <p:oleObj spid="_x0000_s2146" name="Worksheet" r:id="rId4" imgW="1923884" imgH="933476" progId="Excel.Sheet.12">
+                <p:oleObj spid="_x0000_s2155" name="Worksheet" r:id="rId4" imgW="1923884" imgH="933476" progId="Excel.Sheet.12">
                   <p:embed/>
                 </p:oleObj>
               </mc:Choice>
@@ -7915,7 +7917,7 @@
           <a:graphicData uri="http://schemas.openxmlformats.org/presentationml/2006/ole">
             <mc:AlternateContent xmlns:mc="http://schemas.openxmlformats.org/markup-compatibility/2006">
               <mc:Choice xmlns:v="urn:schemas-microsoft-com:vml" Requires="v">
-                <p:oleObj spid="_x0000_s1224" name="Worksheet" r:id="rId3" imgW="1466857" imgH="771525" progId="Excel.Sheet.12">
+                <p:oleObj spid="_x0000_s1242" name="Worksheet" r:id="rId3" imgW="1466857" imgH="771525" progId="Excel.Sheet.12">
                   <p:embed/>
                 </p:oleObj>
               </mc:Choice>
@@ -7978,7 +7980,7 @@
           <a:graphicData uri="http://schemas.openxmlformats.org/presentationml/2006/ole">
             <mc:AlternateContent xmlns:mc="http://schemas.openxmlformats.org/markup-compatibility/2006">
               <mc:Choice xmlns:v="urn:schemas-microsoft-com:vml" Requires="v">
-                <p:oleObj spid="_x0000_s1225" name="Worksheet" r:id="rId5" imgW="1466857" imgH="771525" progId="Excel.Sheet.12">
+                <p:oleObj spid="_x0000_s1243" name="Worksheet" r:id="rId5" imgW="1466857" imgH="771525" progId="Excel.Sheet.12">
                   <p:embed/>
                 </p:oleObj>
               </mc:Choice>
@@ -8678,7 +8680,7 @@
           <a:graphicData uri="http://schemas.openxmlformats.org/presentationml/2006/ole">
             <mc:AlternateContent xmlns:mc="http://schemas.openxmlformats.org/markup-compatibility/2006">
               <mc:Choice xmlns:v="urn:schemas-microsoft-com:vml" Requires="v">
-                <p:oleObj spid="_x0000_s3167" name="Worksheet" r:id="rId5" imgW="1923884" imgH="933476" progId="Excel.Sheet.12">
+                <p:oleObj spid="_x0000_s3176" name="Worksheet" r:id="rId5" imgW="1923884" imgH="933476" progId="Excel.Sheet.12">
                   <p:embed/>
                 </p:oleObj>
               </mc:Choice>
@@ -32802,10 +32804,10 @@
       </p:sp>
       <p:pic>
         <p:nvPicPr>
-          <p:cNvPr id="9" name="Content Placeholder 8" descr="A close up of a map&#10;&#10;Description automatically generated">
+          <p:cNvPr id="13" name="Content Placeholder 12" descr="A close up of a map&#10;&#10;Description automatically generated">
             <a:extLst>
               <a:ext uri="{FF2B5EF4-FFF2-40B4-BE49-F238E27FC236}">
-                <a16:creationId xmlns:a16="http://schemas.microsoft.com/office/drawing/2014/main" id="{B07A9827-4AE4-4874-BC67-80FEE7F8FAC2}"/>
+                <a16:creationId xmlns:a16="http://schemas.microsoft.com/office/drawing/2014/main" id="{05349F50-A4CA-44EE-A3A0-B4029551595A}"/>
               </a:ext>
             </a:extLst>
           </p:cNvPr>
@@ -32830,8 +32832,8 @@
         </p:blipFill>
         <p:spPr>
           <a:xfrm>
-            <a:off x="723900" y="965200"/>
-            <a:ext cx="8267700" cy="5511800"/>
+            <a:off x="619625" y="990600"/>
+            <a:ext cx="8458200" cy="5638800"/>
           </a:xfrm>
         </p:spPr>
       </p:pic>
@@ -32902,22 +32904,20 @@
       </p:sp>
       <p:pic>
         <p:nvPicPr>
-          <p:cNvPr id="5" name="Content Placeholder 4" descr="A close up of a map&#10;&#10;Description automatically generated">
+          <p:cNvPr id="10" name="Picture 9" descr="A screenshot of a cell phone&#10;&#10;Description automatically generated">
             <a:extLst>
               <a:ext uri="{FF2B5EF4-FFF2-40B4-BE49-F238E27FC236}">
-                <a16:creationId xmlns:a16="http://schemas.microsoft.com/office/drawing/2014/main" id="{35B7291A-A79E-4C24-810B-42A44B0A84C6}"/>
+                <a16:creationId xmlns:a16="http://schemas.microsoft.com/office/drawing/2014/main" id="{DAE8C101-5AC4-4E72-9F21-F972CB5E644A}"/>
               </a:ext>
             </a:extLst>
           </p:cNvPr>
           <p:cNvPicPr>
-            <a:picLocks noGrp="1" noChangeAspect="1"/>
+            <a:picLocks noChangeAspect="1"/>
           </p:cNvPicPr>
-          <p:nvPr>
-            <p:ph idx="1"/>
-          </p:nvPr>
+          <p:nvPr/>
         </p:nvPicPr>
-        <p:blipFill>
-          <a:blip r:embed="rId2" cstate="print">
+        <p:blipFill rotWithShape="1">
+          <a:blip r:embed="rId2">
             <a:clrChange>
               <a:clrFrom>
                 <a:srgbClr val="FFFFFF"/>
@@ -32934,23 +32934,25 @@
               </a:ext>
             </a:extLst>
           </a:blip>
-          <a:stretch>
-            <a:fillRect/>
-          </a:stretch>
+          <a:srcRect l="12667" t="28889" r="13555" b="30000"/>
+          <a:stretch/>
         </p:blipFill>
         <p:spPr>
           <a:xfrm>
-            <a:off x="1219200" y="1336123"/>
-            <a:ext cx="7391400" cy="5445677"/>
+            <a:off x="1214267" y="2133600"/>
+            <a:ext cx="7350211" cy="3276600"/>
           </a:xfrm>
+          <a:prstGeom prst="rect">
+            <a:avLst/>
+          </a:prstGeom>
         </p:spPr>
       </p:pic>
       <p:sp>
         <p:nvSpPr>
-          <p:cNvPr id="6" name="TextBox 5">
+          <p:cNvPr id="11" name="TextBox 10">
             <a:extLst>
               <a:ext uri="{FF2B5EF4-FFF2-40B4-BE49-F238E27FC236}">
-                <a16:creationId xmlns:a16="http://schemas.microsoft.com/office/drawing/2014/main" id="{097F2A16-D018-43C2-A8E1-EBF952D70D0F}"/>
+                <a16:creationId xmlns:a16="http://schemas.microsoft.com/office/drawing/2014/main" id="{4ACD9757-A057-408B-B6A3-661C9CC56CB3}"/>
               </a:ext>
             </a:extLst>
           </p:cNvPr>
@@ -32959,29 +32961,13 @@
         </p:nvSpPr>
         <p:spPr>
           <a:xfrm>
-            <a:off x="5486400" y="2819400"/>
-            <a:ext cx="2209800" cy="369332"/>
+            <a:off x="6799305" y="1563263"/>
+            <a:ext cx="1130428" cy="584775"/>
           </a:xfrm>
           <a:prstGeom prst="rect">
             <a:avLst/>
           </a:prstGeom>
-          <a:solidFill>
-            <a:schemeClr val="bg1">
-              <a:lumMod val="85000"/>
-            </a:schemeClr>
-          </a:solidFill>
-          <a:ln>
-            <a:solidFill>
-              <a:schemeClr val="tx1"/>
-            </a:solidFill>
-          </a:ln>
-          <a:effectLst>
-            <a:outerShdw blurRad="76200" dist="12700" dir="8100000" sy="-23000" kx="800400" algn="br" rotWithShape="0">
-              <a:prstClr val="black">
-                <a:alpha val="20000"/>
-              </a:prstClr>
-            </a:outerShdw>
-          </a:effectLst>
+          <a:noFill/>
         </p:spPr>
         <p:txBody>
           <a:bodyPr wrap="square" rtlCol="0">
@@ -32990,12 +32976,12 @@
           <a:lstStyle/>
           <a:p>
             <a:r>
-              <a:rPr lang="en-US" b="1" dirty="0">
+              <a:rPr lang="en-US" sz="3200" dirty="0">
                 <a:solidFill>
                   <a:srgbClr val="FF0000"/>
                 </a:solidFill>
               </a:rPr>
-              <a:t>Only Uses Cluster Id!</a:t>
+              <a:t>Yuck!</a:t>
             </a:r>
           </a:p>
         </p:txBody>
@@ -33125,6 +33111,322 @@
           <p:cNvPr id="2" name="Title 1">
             <a:extLst>
               <a:ext uri="{FF2B5EF4-FFF2-40B4-BE49-F238E27FC236}">
+                <a16:creationId xmlns:a16="http://schemas.microsoft.com/office/drawing/2014/main" id="{325ACEB5-C8FD-42CA-A5AD-4958821DA483}"/>
+              </a:ext>
+            </a:extLst>
+          </p:cNvPr>
+          <p:cNvSpPr>
+            <a:spLocks noGrp="1"/>
+          </p:cNvSpPr>
+          <p:nvPr>
+            <p:ph type="title"/>
+          </p:nvPr>
+        </p:nvSpPr>
+        <p:spPr/>
+        <p:txBody>
+          <a:bodyPr/>
+          <a:lstStyle/>
+          <a:p>
+            <a:r>
+              <a:rPr lang="en-US" dirty="0"/>
+              <a:t>LDA Results</a:t>
+            </a:r>
+          </a:p>
+        </p:txBody>
+      </p:sp>
+      <p:pic>
+        <p:nvPicPr>
+          <p:cNvPr id="5" name="Picture 4">
+            <a:extLst>
+              <a:ext uri="{FF2B5EF4-FFF2-40B4-BE49-F238E27FC236}">
+                <a16:creationId xmlns:a16="http://schemas.microsoft.com/office/drawing/2014/main" id="{0000F699-8FFA-4343-BEC1-014AB74CD93F}"/>
+              </a:ext>
+            </a:extLst>
+          </p:cNvPr>
+          <p:cNvPicPr>
+            <a:picLocks noChangeAspect="1"/>
+          </p:cNvPicPr>
+          <p:nvPr/>
+        </p:nvPicPr>
+        <p:blipFill>
+          <a:blip r:embed="rId2">
+            <a:extLst>
+              <a:ext uri="{BEBA8EAE-BF5A-486C-A8C5-ECC9F3942E4B}">
+                <a14:imgProps xmlns:a14="http://schemas.microsoft.com/office/drawing/2010/main">
+                  <a14:imgLayer r:embed="rId3">
+                    <a14:imgEffect>
+                      <a14:saturation sat="400000"/>
+                    </a14:imgEffect>
+                  </a14:imgLayer>
+                </a14:imgProps>
+              </a:ext>
+            </a:extLst>
+          </a:blip>
+          <a:stretch>
+            <a:fillRect/>
+          </a:stretch>
+        </p:blipFill>
+        <p:spPr>
+          <a:xfrm>
+            <a:off x="609600" y="1371600"/>
+            <a:ext cx="8458200" cy="2562507"/>
+          </a:xfrm>
+          <a:prstGeom prst="rect">
+            <a:avLst/>
+          </a:prstGeom>
+        </p:spPr>
+      </p:pic>
+      <p:sp>
+        <p:nvSpPr>
+          <p:cNvPr id="6" name="Rectangle 5">
+            <a:extLst>
+              <a:ext uri="{FF2B5EF4-FFF2-40B4-BE49-F238E27FC236}">
+                <a16:creationId xmlns:a16="http://schemas.microsoft.com/office/drawing/2014/main" id="{0B5B5843-4EA4-469D-9D10-EAFD070A0D43}"/>
+              </a:ext>
+            </a:extLst>
+          </p:cNvPr>
+          <p:cNvSpPr/>
+          <p:nvPr/>
+        </p:nvSpPr>
+        <p:spPr>
+          <a:xfrm>
+            <a:off x="7086600" y="3429001"/>
+            <a:ext cx="913197" cy="395148"/>
+          </a:xfrm>
+          <a:prstGeom prst="rect">
+            <a:avLst/>
+          </a:prstGeom>
+          <a:solidFill>
+            <a:srgbClr val="FFFF00">
+              <a:alpha val="25098"/>
+            </a:srgbClr>
+          </a:solidFill>
+          <a:ln>
+            <a:noFill/>
+          </a:ln>
+        </p:spPr>
+        <p:style>
+          <a:lnRef idx="2">
+            <a:schemeClr val="accent1">
+              <a:shade val="50000"/>
+            </a:schemeClr>
+          </a:lnRef>
+          <a:fillRef idx="1">
+            <a:schemeClr val="accent1"/>
+          </a:fillRef>
+          <a:effectRef idx="0">
+            <a:schemeClr val="accent1"/>
+          </a:effectRef>
+          <a:fontRef idx="minor">
+            <a:schemeClr val="lt1"/>
+          </a:fontRef>
+        </p:style>
+        <p:txBody>
+          <a:bodyPr rtlCol="0" anchor="ctr"/>
+          <a:lstStyle/>
+          <a:p>
+            <a:pPr algn="ctr"/>
+            <a:endParaRPr lang="en-US"/>
+          </a:p>
+        </p:txBody>
+      </p:sp>
+      <p:sp>
+        <p:nvSpPr>
+          <p:cNvPr id="7" name="Rectangle 6">
+            <a:extLst>
+              <a:ext uri="{FF2B5EF4-FFF2-40B4-BE49-F238E27FC236}">
+                <a16:creationId xmlns:a16="http://schemas.microsoft.com/office/drawing/2014/main" id="{5DB2B41F-F36E-4DFD-BA87-865DE4CE193B}"/>
+              </a:ext>
+            </a:extLst>
+          </p:cNvPr>
+          <p:cNvSpPr/>
+          <p:nvPr/>
+        </p:nvSpPr>
+        <p:spPr>
+          <a:xfrm>
+            <a:off x="8077200" y="3429001"/>
+            <a:ext cx="913197" cy="395148"/>
+          </a:xfrm>
+          <a:prstGeom prst="rect">
+            <a:avLst/>
+          </a:prstGeom>
+          <a:solidFill>
+            <a:srgbClr val="FFFF00">
+              <a:alpha val="25098"/>
+            </a:srgbClr>
+          </a:solidFill>
+          <a:ln>
+            <a:noFill/>
+          </a:ln>
+        </p:spPr>
+        <p:style>
+          <a:lnRef idx="2">
+            <a:schemeClr val="accent1">
+              <a:shade val="50000"/>
+            </a:schemeClr>
+          </a:lnRef>
+          <a:fillRef idx="1">
+            <a:schemeClr val="accent1"/>
+          </a:fillRef>
+          <a:effectRef idx="0">
+            <a:schemeClr val="accent1"/>
+          </a:effectRef>
+          <a:fontRef idx="minor">
+            <a:schemeClr val="lt1"/>
+          </a:fontRef>
+        </p:style>
+        <p:txBody>
+          <a:bodyPr rtlCol="0" anchor="ctr"/>
+          <a:lstStyle/>
+          <a:p>
+            <a:pPr algn="ctr"/>
+            <a:endParaRPr lang="en-US"/>
+          </a:p>
+        </p:txBody>
+      </p:sp>
+      <p:sp>
+        <p:nvSpPr>
+          <p:cNvPr id="8" name="Rectangle 7">
+            <a:extLst>
+              <a:ext uri="{FF2B5EF4-FFF2-40B4-BE49-F238E27FC236}">
+                <a16:creationId xmlns:a16="http://schemas.microsoft.com/office/drawing/2014/main" id="{EB7519C9-77C9-45D3-84E5-420E7521B7DB}"/>
+              </a:ext>
+            </a:extLst>
+          </p:cNvPr>
+          <p:cNvSpPr/>
+          <p:nvPr/>
+        </p:nvSpPr>
+        <p:spPr>
+          <a:xfrm>
+            <a:off x="8009422" y="2572351"/>
+            <a:ext cx="913197" cy="395148"/>
+          </a:xfrm>
+          <a:prstGeom prst="rect">
+            <a:avLst/>
+          </a:prstGeom>
+          <a:solidFill>
+            <a:srgbClr val="FFFF00">
+              <a:alpha val="25098"/>
+            </a:srgbClr>
+          </a:solidFill>
+          <a:ln>
+            <a:noFill/>
+          </a:ln>
+        </p:spPr>
+        <p:style>
+          <a:lnRef idx="2">
+            <a:schemeClr val="accent1">
+              <a:shade val="50000"/>
+            </a:schemeClr>
+          </a:lnRef>
+          <a:fillRef idx="1">
+            <a:schemeClr val="accent1"/>
+          </a:fillRef>
+          <a:effectRef idx="0">
+            <a:schemeClr val="accent1"/>
+          </a:effectRef>
+          <a:fontRef idx="minor">
+            <a:schemeClr val="lt1"/>
+          </a:fontRef>
+        </p:style>
+        <p:txBody>
+          <a:bodyPr rtlCol="0" anchor="ctr"/>
+          <a:lstStyle/>
+          <a:p>
+            <a:pPr algn="ctr"/>
+            <a:endParaRPr lang="en-US"/>
+          </a:p>
+        </p:txBody>
+      </p:sp>
+      <p:sp>
+        <p:nvSpPr>
+          <p:cNvPr id="9" name="Rectangle 8">
+            <a:extLst>
+              <a:ext uri="{FF2B5EF4-FFF2-40B4-BE49-F238E27FC236}">
+                <a16:creationId xmlns:a16="http://schemas.microsoft.com/office/drawing/2014/main" id="{7E3F4E9A-DA4E-42D5-9354-55CD7D484F0C}"/>
+              </a:ext>
+            </a:extLst>
+          </p:cNvPr>
+          <p:cNvSpPr/>
+          <p:nvPr/>
+        </p:nvSpPr>
+        <p:spPr>
+          <a:xfrm>
+            <a:off x="1028700" y="2585478"/>
+            <a:ext cx="913197" cy="395148"/>
+          </a:xfrm>
+          <a:prstGeom prst="rect">
+            <a:avLst/>
+          </a:prstGeom>
+          <a:solidFill>
+            <a:srgbClr val="FFFF00">
+              <a:alpha val="25098"/>
+            </a:srgbClr>
+          </a:solidFill>
+          <a:ln>
+            <a:noFill/>
+          </a:ln>
+        </p:spPr>
+        <p:style>
+          <a:lnRef idx="2">
+            <a:schemeClr val="accent1">
+              <a:shade val="50000"/>
+            </a:schemeClr>
+          </a:lnRef>
+          <a:fillRef idx="1">
+            <a:schemeClr val="accent1"/>
+          </a:fillRef>
+          <a:effectRef idx="0">
+            <a:schemeClr val="accent1"/>
+          </a:effectRef>
+          <a:fontRef idx="minor">
+            <a:schemeClr val="lt1"/>
+          </a:fontRef>
+        </p:style>
+        <p:txBody>
+          <a:bodyPr rtlCol="0" anchor="ctr"/>
+          <a:lstStyle/>
+          <a:p>
+            <a:pPr algn="ctr"/>
+            <a:endParaRPr lang="en-US"/>
+          </a:p>
+        </p:txBody>
+      </p:sp>
+    </p:spTree>
+    <p:extLst>
+      <p:ext uri="{BB962C8B-B14F-4D97-AF65-F5344CB8AC3E}">
+        <p14:creationId xmlns:p14="http://schemas.microsoft.com/office/powerpoint/2010/main" val="2576541705"/>
+      </p:ext>
+    </p:extLst>
+  </p:cSld>
+  <p:clrMapOvr>
+    <a:masterClrMapping/>
+  </p:clrMapOvr>
+</p:sld>
+</file>
+
+<file path=ppt/slides/slide49.xml><?xml version="1.0" encoding="utf-8"?>
+<p:sld xmlns:a="http://schemas.openxmlformats.org/drawingml/2006/main" xmlns:r="http://schemas.openxmlformats.org/officeDocument/2006/relationships" xmlns:p="http://schemas.openxmlformats.org/presentationml/2006/main">
+  <p:cSld>
+    <p:spTree>
+      <p:nvGrpSpPr>
+        <p:cNvPr id="1" name=""/>
+        <p:cNvGrpSpPr/>
+        <p:nvPr/>
+      </p:nvGrpSpPr>
+      <p:grpSpPr>
+        <a:xfrm>
+          <a:off x="0" y="0"/>
+          <a:ext cx="0" cy="0"/>
+          <a:chOff x="0" y="0"/>
+          <a:chExt cx="0" cy="0"/>
+        </a:xfrm>
+      </p:grpSpPr>
+      <p:sp>
+        <p:nvSpPr>
+          <p:cNvPr id="2" name="Title 1">
+            <a:extLst>
+              <a:ext uri="{FF2B5EF4-FFF2-40B4-BE49-F238E27FC236}">
                 <a16:creationId xmlns:a16="http://schemas.microsoft.com/office/drawing/2014/main" id="{E62E5D45-30DB-442B-9BA1-2117314EB5E5}"/>
               </a:ext>
             </a:extLst>
@@ -33148,8 +33450,8 @@
           </a:p>
         </p:txBody>
       </p:sp>
-      <mc:AlternateContent xmlns:mc="http://schemas.openxmlformats.org/markup-compatibility/2006" xmlns:a14="http://schemas.microsoft.com/office/drawing/2010/main">
-        <mc:Choice Requires="a14">
+      <mc:AlternateContent xmlns:mc="http://schemas.openxmlformats.org/markup-compatibility/2006">
+        <mc:Choice xmlns:a14="http://schemas.microsoft.com/office/drawing/2010/main" Requires="a14">
           <p:sp>
             <p:nvSpPr>
               <p:cNvPr id="3" name="Content Placeholder 2">
@@ -33177,6 +33479,12 @@
                 <a:normAutofit/>
               </a:bodyPr>
               <a:lstStyle/>
+              <a:p>
+                <a:r>
+                  <a:rPr lang="en-US" dirty="0"/>
+                  <a:t>QDA failed with “rank deficiency” error</a:t>
+                </a:r>
+              </a:p>
               <a:p>
                 <a:r>
                   <a:rPr lang="en-US" dirty="0"/>
@@ -33213,7 +33521,7 @@
             </p:txBody>
           </p:sp>
         </mc:Choice>
-        <mc:Fallback xmlns="">
+        <mc:Fallback>
           <p:sp>
             <p:nvSpPr>
               <p:cNvPr id="3" name="Content Placeholder 2">
@@ -33261,86 +33569,6 @@
     <p:extLst>
       <p:ext uri="{BB962C8B-B14F-4D97-AF65-F5344CB8AC3E}">
         <p14:creationId xmlns:p14="http://schemas.microsoft.com/office/powerpoint/2010/main" val="2546379718"/>
-      </p:ext>
-    </p:extLst>
-  </p:cSld>
-  <p:clrMapOvr>
-    <a:masterClrMapping/>
-  </p:clrMapOvr>
-</p:sld>
-</file>
-
-<file path=ppt/slides/slide49.xml><?xml version="1.0" encoding="utf-8"?>
-<p:sld xmlns:a="http://schemas.openxmlformats.org/drawingml/2006/main" xmlns:r="http://schemas.openxmlformats.org/officeDocument/2006/relationships" xmlns:p="http://schemas.openxmlformats.org/presentationml/2006/main">
-  <p:cSld>
-    <p:spTree>
-      <p:nvGrpSpPr>
-        <p:cNvPr id="1" name=""/>
-        <p:cNvGrpSpPr/>
-        <p:nvPr/>
-      </p:nvGrpSpPr>
-      <p:grpSpPr>
-        <a:xfrm>
-          <a:off x="0" y="0"/>
-          <a:ext cx="0" cy="0"/>
-          <a:chOff x="0" y="0"/>
-          <a:chExt cx="0" cy="0"/>
-        </a:xfrm>
-      </p:grpSpPr>
-      <p:sp>
-        <p:nvSpPr>
-          <p:cNvPr id="2" name="Title 1">
-            <a:extLst>
-              <a:ext uri="{FF2B5EF4-FFF2-40B4-BE49-F238E27FC236}">
-                <a16:creationId xmlns:a16="http://schemas.microsoft.com/office/drawing/2014/main" id="{68036183-F8B1-4928-A184-069233BF2AE7}"/>
-              </a:ext>
-            </a:extLst>
-          </p:cNvPr>
-          <p:cNvSpPr>
-            <a:spLocks noGrp="1"/>
-          </p:cNvSpPr>
-          <p:nvPr>
-            <p:ph type="title"/>
-          </p:nvPr>
-        </p:nvSpPr>
-        <p:spPr/>
-        <p:txBody>
-          <a:bodyPr/>
-          <a:lstStyle/>
-          <a:p>
-            <a:endParaRPr lang="en-US"/>
-          </a:p>
-        </p:txBody>
-      </p:sp>
-      <p:sp>
-        <p:nvSpPr>
-          <p:cNvPr id="3" name="Content Placeholder 2">
-            <a:extLst>
-              <a:ext uri="{FF2B5EF4-FFF2-40B4-BE49-F238E27FC236}">
-                <a16:creationId xmlns:a16="http://schemas.microsoft.com/office/drawing/2014/main" id="{7CA6673B-21BE-406F-BE8D-8A7E80804C8F}"/>
-              </a:ext>
-            </a:extLst>
-          </p:cNvPr>
-          <p:cNvSpPr>
-            <a:spLocks noGrp="1"/>
-          </p:cNvSpPr>
-          <p:nvPr>
-            <p:ph idx="1"/>
-          </p:nvPr>
-        </p:nvSpPr>
-        <p:spPr/>
-        <p:txBody>
-          <a:bodyPr/>
-          <a:lstStyle/>
-          <a:p>
-            <a:endParaRPr lang="en-US"/>
-          </a:p>
-        </p:txBody>
-      </p:sp>
-    </p:spTree>
-    <p:extLst>
-      <p:ext uri="{BB962C8B-B14F-4D97-AF65-F5344CB8AC3E}">
-        <p14:creationId xmlns:p14="http://schemas.microsoft.com/office/powerpoint/2010/main" val="3074269825"/>
       </p:ext>
     </p:extLst>
   </p:cSld>
@@ -33516,6 +33744,86 @@
 </file>
 
 <file path=ppt/slides/slide50.xml><?xml version="1.0" encoding="utf-8"?>
+<p:sld xmlns:a="http://schemas.openxmlformats.org/drawingml/2006/main" xmlns:r="http://schemas.openxmlformats.org/officeDocument/2006/relationships" xmlns:p="http://schemas.openxmlformats.org/presentationml/2006/main">
+  <p:cSld>
+    <p:spTree>
+      <p:nvGrpSpPr>
+        <p:cNvPr id="1" name=""/>
+        <p:cNvGrpSpPr/>
+        <p:nvPr/>
+      </p:nvGrpSpPr>
+      <p:grpSpPr>
+        <a:xfrm>
+          <a:off x="0" y="0"/>
+          <a:ext cx="0" cy="0"/>
+          <a:chOff x="0" y="0"/>
+          <a:chExt cx="0" cy="0"/>
+        </a:xfrm>
+      </p:grpSpPr>
+      <p:sp>
+        <p:nvSpPr>
+          <p:cNvPr id="2" name="Title 1">
+            <a:extLst>
+              <a:ext uri="{FF2B5EF4-FFF2-40B4-BE49-F238E27FC236}">
+                <a16:creationId xmlns:a16="http://schemas.microsoft.com/office/drawing/2014/main" id="{68036183-F8B1-4928-A184-069233BF2AE7}"/>
+              </a:ext>
+            </a:extLst>
+          </p:cNvPr>
+          <p:cNvSpPr>
+            <a:spLocks noGrp="1"/>
+          </p:cNvSpPr>
+          <p:nvPr>
+            <p:ph type="title"/>
+          </p:nvPr>
+        </p:nvSpPr>
+        <p:spPr/>
+        <p:txBody>
+          <a:bodyPr/>
+          <a:lstStyle/>
+          <a:p>
+            <a:endParaRPr lang="en-US"/>
+          </a:p>
+        </p:txBody>
+      </p:sp>
+      <p:sp>
+        <p:nvSpPr>
+          <p:cNvPr id="3" name="Content Placeholder 2">
+            <a:extLst>
+              <a:ext uri="{FF2B5EF4-FFF2-40B4-BE49-F238E27FC236}">
+                <a16:creationId xmlns:a16="http://schemas.microsoft.com/office/drawing/2014/main" id="{7CA6673B-21BE-406F-BE8D-8A7E80804C8F}"/>
+              </a:ext>
+            </a:extLst>
+          </p:cNvPr>
+          <p:cNvSpPr>
+            <a:spLocks noGrp="1"/>
+          </p:cNvSpPr>
+          <p:nvPr>
+            <p:ph idx="1"/>
+          </p:nvPr>
+        </p:nvSpPr>
+        <p:spPr/>
+        <p:txBody>
+          <a:bodyPr/>
+          <a:lstStyle/>
+          <a:p>
+            <a:endParaRPr lang="en-US"/>
+          </a:p>
+        </p:txBody>
+      </p:sp>
+    </p:spTree>
+    <p:extLst>
+      <p:ext uri="{BB962C8B-B14F-4D97-AF65-F5344CB8AC3E}">
+        <p14:creationId xmlns:p14="http://schemas.microsoft.com/office/powerpoint/2010/main" val="3074269825"/>
+      </p:ext>
+    </p:extLst>
+  </p:cSld>
+  <p:clrMapOvr>
+    <a:masterClrMapping/>
+  </p:clrMapOvr>
+</p:sld>
+</file>
+
+<file path=ppt/slides/slide51.xml><?xml version="1.0" encoding="utf-8"?>
 <p:sld xmlns:a="http://schemas.openxmlformats.org/drawingml/2006/main" xmlns:r="http://schemas.openxmlformats.org/officeDocument/2006/relationships" xmlns:p="http://schemas.openxmlformats.org/presentationml/2006/main">
   <p:cSld>
     <p:bg>

</xml_diff>

<commit_message>
Added images of terrorist groups to title slide
</commit_message>
<xml_diff>
--- a/presentation/gtdb-final-presentation.pptx
+++ b/presentation/gtdb-final-presentation.pptx
@@ -339,7 +339,7 @@
           <a:p>
             <a:fld id="{5FFFC3A9-8065-47C2-8225-E4C63BB2D22D}" type="datetimeFigureOut">
               <a:rPr lang="en-US" smtClean="0"/>
-              <a:t>11/25/2019</a:t>
+              <a:t>11/26/2019</a:t>
             </a:fld>
             <a:endParaRPr lang="en-US"/>
           </a:p>
@@ -3462,7 +3462,7 @@
             <a:fld id="{1D8BD707-D9CF-40AE-B4C6-C98DA3205C09}" type="datetimeFigureOut">
               <a:rPr lang="en-US" smtClean="0"/>
               <a:pPr/>
-              <a:t>11/25/2019</a:t>
+              <a:t>11/26/2019</a:t>
             </a:fld>
             <a:endParaRPr lang="en-US"/>
           </a:p>
@@ -3799,7 +3799,7 @@
             <a:fld id="{1D8BD707-D9CF-40AE-B4C6-C98DA3205C09}" type="datetimeFigureOut">
               <a:rPr lang="en-US" smtClean="0"/>
               <a:pPr/>
-              <a:t>11/25/2019</a:t>
+              <a:t>11/26/2019</a:t>
             </a:fld>
             <a:endParaRPr lang="en-US"/>
           </a:p>
@@ -3981,7 +3981,7 @@
             <a:fld id="{1D8BD707-D9CF-40AE-B4C6-C98DA3205C09}" type="datetimeFigureOut">
               <a:rPr lang="en-US" smtClean="0"/>
               <a:pPr/>
-              <a:t>11/25/2019</a:t>
+              <a:t>11/26/2019</a:t>
             </a:fld>
             <a:endParaRPr lang="en-US"/>
           </a:p>
@@ -4153,7 +4153,7 @@
             <a:fld id="{1D8BD707-D9CF-40AE-B4C6-C98DA3205C09}" type="datetimeFigureOut">
               <a:rPr lang="en-US" smtClean="0"/>
               <a:pPr/>
-              <a:t>11/25/2019</a:t>
+              <a:t>11/26/2019</a:t>
             </a:fld>
             <a:endParaRPr lang="en-US"/>
           </a:p>
@@ -4432,7 +4432,7 @@
             <a:fld id="{1D8BD707-D9CF-40AE-B4C6-C98DA3205C09}" type="datetimeFigureOut">
               <a:rPr lang="en-US" smtClean="0"/>
               <a:pPr/>
-              <a:t>11/25/2019</a:t>
+              <a:t>11/26/2019</a:t>
             </a:fld>
             <a:endParaRPr lang="en-US"/>
           </a:p>
@@ -4884,7 +4884,7 @@
             <a:fld id="{1D8BD707-D9CF-40AE-B4C6-C98DA3205C09}" type="datetimeFigureOut">
               <a:rPr lang="en-US" smtClean="0"/>
               <a:pPr/>
-              <a:t>11/25/2019</a:t>
+              <a:t>11/26/2019</a:t>
             </a:fld>
             <a:endParaRPr lang="en-US"/>
           </a:p>
@@ -5363,7 +5363,7 @@
             <a:fld id="{1D8BD707-D9CF-40AE-B4C6-C98DA3205C09}" type="datetimeFigureOut">
               <a:rPr lang="en-US" smtClean="0"/>
               <a:pPr/>
-              <a:t>11/25/2019</a:t>
+              <a:t>11/26/2019</a:t>
             </a:fld>
             <a:endParaRPr lang="en-US"/>
           </a:p>
@@ -5483,7 +5483,7 @@
             <a:fld id="{1D8BD707-D9CF-40AE-B4C6-C98DA3205C09}" type="datetimeFigureOut">
               <a:rPr lang="en-US" smtClean="0"/>
               <a:pPr/>
-              <a:t>11/25/2019</a:t>
+              <a:t>11/26/2019</a:t>
             </a:fld>
             <a:endParaRPr lang="en-US"/>
           </a:p>
@@ -5580,7 +5580,7 @@
             <a:fld id="{1D8BD707-D9CF-40AE-B4C6-C98DA3205C09}" type="datetimeFigureOut">
               <a:rPr lang="en-US" smtClean="0"/>
               <a:pPr/>
-              <a:t>11/25/2019</a:t>
+              <a:t>11/26/2019</a:t>
             </a:fld>
             <a:endParaRPr lang="en-US"/>
           </a:p>
@@ -5935,7 +5935,7 @@
             <a:fld id="{1D8BD707-D9CF-40AE-B4C6-C98DA3205C09}" type="datetimeFigureOut">
               <a:rPr lang="en-US" smtClean="0"/>
               <a:pPr/>
-              <a:t>11/25/2019</a:t>
+              <a:t>11/26/2019</a:t>
             </a:fld>
             <a:endParaRPr lang="en-US"/>
           </a:p>
@@ -6365,7 +6365,7 @@
             <a:fld id="{1D8BD707-D9CF-40AE-B4C6-C98DA3205C09}" type="datetimeFigureOut">
               <a:rPr lang="en-US" smtClean="0"/>
               <a:pPr/>
-              <a:t>11/25/2019</a:t>
+              <a:t>11/26/2019</a:t>
             </a:fld>
             <a:endParaRPr lang="en-US"/>
           </a:p>
@@ -6683,7 +6683,7 @@
             <a:fld id="{1D8BD707-D9CF-40AE-B4C6-C98DA3205C09}" type="datetimeFigureOut">
               <a:rPr lang="en-US" smtClean="0"/>
               <a:pPr/>
-              <a:t>11/25/2019</a:t>
+              <a:t>11/26/2019</a:t>
             </a:fld>
             <a:endParaRPr lang="en-US"/>
           </a:p>
@@ -7273,7 +7273,7 @@
             <a:r>
               <a:rPr lang="en-US" dirty="0">
                 <a:solidFill>
-                  <a:schemeClr val="tx1"/>
+                  <a:srgbClr val="FF0000"/>
                 </a:solidFill>
               </a:rPr>
               <a:t>Global Terrorism</a:t>
@@ -7333,6 +7333,185 @@
           </a:p>
         </p:txBody>
       </p:sp>
+      <p:pic>
+        <p:nvPicPr>
+          <p:cNvPr id="4" name="Picture 3">
+            <a:extLst>
+              <a:ext uri="{FF2B5EF4-FFF2-40B4-BE49-F238E27FC236}">
+                <a16:creationId xmlns:a16="http://schemas.microsoft.com/office/drawing/2014/main" id="{45B68530-1AC4-4094-81CB-297D3AC7109B}"/>
+              </a:ext>
+            </a:extLst>
+          </p:cNvPr>
+          <p:cNvPicPr>
+            <a:picLocks noChangeAspect="1"/>
+          </p:cNvPicPr>
+          <p:nvPr/>
+        </p:nvPicPr>
+        <p:blipFill>
+          <a:blip r:embed="rId2"/>
+          <a:stretch>
+            <a:fillRect/>
+          </a:stretch>
+        </p:blipFill>
+        <p:spPr>
+          <a:xfrm>
+            <a:off x="966943" y="1111386"/>
+            <a:ext cx="1552575" cy="1035050"/>
+          </a:xfrm>
+          <a:prstGeom prst="rect">
+            <a:avLst/>
+          </a:prstGeom>
+        </p:spPr>
+      </p:pic>
+      <p:pic>
+        <p:nvPicPr>
+          <p:cNvPr id="5" name="Picture 4">
+            <a:extLst>
+              <a:ext uri="{FF2B5EF4-FFF2-40B4-BE49-F238E27FC236}">
+                <a16:creationId xmlns:a16="http://schemas.microsoft.com/office/drawing/2014/main" id="{57A82091-FA36-4B89-A4F8-CE685115CA25}"/>
+              </a:ext>
+            </a:extLst>
+          </p:cNvPr>
+          <p:cNvPicPr>
+            <a:picLocks noChangeAspect="1"/>
+          </p:cNvPicPr>
+          <p:nvPr/>
+        </p:nvPicPr>
+        <p:blipFill>
+          <a:blip r:embed="rId3"/>
+          <a:stretch>
+            <a:fillRect/>
+          </a:stretch>
+        </p:blipFill>
+        <p:spPr>
+          <a:xfrm>
+            <a:off x="6624483" y="219211"/>
+            <a:ext cx="1285875" cy="1409700"/>
+          </a:xfrm>
+          <a:prstGeom prst="rect">
+            <a:avLst/>
+          </a:prstGeom>
+        </p:spPr>
+      </p:pic>
+      <p:pic>
+        <p:nvPicPr>
+          <p:cNvPr id="6" name="Picture 5">
+            <a:extLst>
+              <a:ext uri="{FF2B5EF4-FFF2-40B4-BE49-F238E27FC236}">
+                <a16:creationId xmlns:a16="http://schemas.microsoft.com/office/drawing/2014/main" id="{CE4CC510-01EC-4E9E-AE8C-FB29E43ADCEC}"/>
+              </a:ext>
+            </a:extLst>
+          </p:cNvPr>
+          <p:cNvPicPr>
+            <a:picLocks noChangeAspect="1"/>
+          </p:cNvPicPr>
+          <p:nvPr/>
+        </p:nvPicPr>
+        <p:blipFill>
+          <a:blip r:embed="rId4"/>
+          <a:stretch>
+            <a:fillRect/>
+          </a:stretch>
+        </p:blipFill>
+        <p:spPr>
+          <a:xfrm>
+            <a:off x="6362545" y="4849975"/>
+            <a:ext cx="1809750" cy="892810"/>
+          </a:xfrm>
+          <a:prstGeom prst="rect">
+            <a:avLst/>
+          </a:prstGeom>
+        </p:spPr>
+      </p:pic>
+      <p:pic>
+        <p:nvPicPr>
+          <p:cNvPr id="7" name="Picture 6">
+            <a:extLst>
+              <a:ext uri="{FF2B5EF4-FFF2-40B4-BE49-F238E27FC236}">
+                <a16:creationId xmlns:a16="http://schemas.microsoft.com/office/drawing/2014/main" id="{C0DAC993-D76F-41BD-BCE8-BC20081082FB}"/>
+              </a:ext>
+            </a:extLst>
+          </p:cNvPr>
+          <p:cNvPicPr>
+            <a:picLocks noChangeAspect="1"/>
+          </p:cNvPicPr>
+          <p:nvPr/>
+        </p:nvPicPr>
+        <p:blipFill>
+          <a:blip r:embed="rId5">
+            <a:extLst>
+              <a:ext uri="{BEBA8EAE-BF5A-486C-A8C5-ECC9F3942E4B}">
+                <a14:imgProps xmlns:a14="http://schemas.microsoft.com/office/drawing/2010/main">
+                  <a14:imgLayer r:embed="rId6">
+                    <a14:imgEffect>
+                      <a14:brightnessContrast bright="20000" contrast="-40000"/>
+                    </a14:imgEffect>
+                  </a14:imgLayer>
+                </a14:imgProps>
+              </a:ext>
+            </a:extLst>
+          </a:blip>
+          <a:stretch>
+            <a:fillRect/>
+          </a:stretch>
+        </p:blipFill>
+        <p:spPr>
+          <a:xfrm>
+            <a:off x="1100293" y="4455799"/>
+            <a:ext cx="1285875" cy="1681162"/>
+          </a:xfrm>
+          <a:prstGeom prst="rect">
+            <a:avLst/>
+          </a:prstGeom>
+        </p:spPr>
+      </p:pic>
+      <p:pic>
+        <p:nvPicPr>
+          <p:cNvPr id="6146" name="Picture 2" descr="NPA logo.svg">
+            <a:extLst>
+              <a:ext uri="{FF2B5EF4-FFF2-40B4-BE49-F238E27FC236}">
+                <a16:creationId xmlns:a16="http://schemas.microsoft.com/office/drawing/2014/main" id="{21F20B65-04B4-4401-A7D5-A8AD7DBB4426}"/>
+              </a:ext>
+            </a:extLst>
+          </p:cNvPr>
+          <p:cNvPicPr>
+            <a:picLocks noChangeAspect="1" noChangeArrowheads="1"/>
+          </p:cNvPicPr>
+          <p:nvPr/>
+        </p:nvPicPr>
+        <p:blipFill>
+          <a:blip r:embed="rId7">
+            <a:extLst>
+              <a:ext uri="{28A0092B-C50C-407E-A947-70E740481C1C}">
+                <a14:useLocalDpi xmlns:a14="http://schemas.microsoft.com/office/drawing/2010/main" val="0"/>
+              </a:ext>
+            </a:extLst>
+          </a:blip>
+          <a:srcRect/>
+          <a:stretch>
+            <a:fillRect/>
+          </a:stretch>
+        </p:blipFill>
+        <p:spPr bwMode="auto">
+          <a:xfrm>
+            <a:off x="3969452" y="824842"/>
+            <a:ext cx="1205097" cy="1090613"/>
+          </a:xfrm>
+          <a:prstGeom prst="rect">
+            <a:avLst/>
+          </a:prstGeom>
+          <a:noFill/>
+          <a:extLst>
+            <a:ext uri="{909E8E84-426E-40DD-AFC4-6F175D3DCCD1}">
+              <a14:hiddenFill xmlns:a14="http://schemas.microsoft.com/office/drawing/2010/main">
+                <a:solidFill>
+                  <a:srgbClr val="FFFFFF"/>
+                </a:solidFill>
+              </a14:hiddenFill>
+            </a:ext>
+          </a:extLst>
+        </p:spPr>
+      </p:pic>
     </p:spTree>
     <p:extLst>
       <p:ext uri="{BB962C8B-B14F-4D97-AF65-F5344CB8AC3E}">
@@ -7952,7 +8131,7 @@
           <a:graphicData uri="http://schemas.openxmlformats.org/presentationml/2006/ole">
             <mc:AlternateContent xmlns:mc="http://schemas.openxmlformats.org/markup-compatibility/2006">
               <mc:Choice xmlns:v="urn:schemas-microsoft-com:vml" Requires="v">
-                <p:oleObj spid="_x0000_s2270" name="Worksheet" r:id="rId4" imgW="1923884" imgH="933476" progId="Excel.Sheet.12">
+                <p:oleObj spid="_x0000_s2277" name="Worksheet" r:id="rId4" imgW="1923884" imgH="933476" progId="Excel.Sheet.12">
                   <p:embed/>
                 </p:oleObj>
               </mc:Choice>
@@ -8376,7 +8555,7 @@
           <a:graphicData uri="http://schemas.openxmlformats.org/presentationml/2006/ole">
             <mc:AlternateContent xmlns:mc="http://schemas.openxmlformats.org/markup-compatibility/2006">
               <mc:Choice xmlns:v="urn:schemas-microsoft-com:vml" Requires="v">
-                <p:oleObj spid="_x0000_s1472" name="Worksheet" r:id="rId3" imgW="1466857" imgH="771525" progId="Excel.Sheet.12">
+                <p:oleObj spid="_x0000_s1486" name="Worksheet" r:id="rId3" imgW="1466857" imgH="771525" progId="Excel.Sheet.12">
                   <p:embed/>
                 </p:oleObj>
               </mc:Choice>
@@ -8439,7 +8618,7 @@
           <a:graphicData uri="http://schemas.openxmlformats.org/presentationml/2006/ole">
             <mc:AlternateContent xmlns:mc="http://schemas.openxmlformats.org/markup-compatibility/2006">
               <mc:Choice xmlns:v="urn:schemas-microsoft-com:vml" Requires="v">
-                <p:oleObj spid="_x0000_s1473" name="Worksheet" r:id="rId5" imgW="1466857" imgH="771525" progId="Excel.Sheet.12">
+                <p:oleObj spid="_x0000_s1487" name="Worksheet" r:id="rId5" imgW="1466857" imgH="771525" progId="Excel.Sheet.12">
                   <p:embed/>
                 </p:oleObj>
               </mc:Choice>
@@ -9139,7 +9318,7 @@
           <a:graphicData uri="http://schemas.openxmlformats.org/presentationml/2006/ole">
             <mc:AlternateContent xmlns:mc="http://schemas.openxmlformats.org/markup-compatibility/2006">
               <mc:Choice xmlns:v="urn:schemas-microsoft-com:vml" Requires="v">
-                <p:oleObj spid="_x0000_s3291" name="Worksheet" r:id="rId5" imgW="1923884" imgH="933476" progId="Excel.Sheet.12">
+                <p:oleObj spid="_x0000_s3298" name="Worksheet" r:id="rId5" imgW="1923884" imgH="933476" progId="Excel.Sheet.12">
                   <p:embed/>
                 </p:oleObj>
               </mc:Choice>
@@ -13926,7 +14105,7 @@
           <a:graphicData uri="http://schemas.openxmlformats.org/presentationml/2006/ole">
             <mc:AlternateContent xmlns:mc="http://schemas.openxmlformats.org/markup-compatibility/2006">
               <mc:Choice xmlns:v="urn:schemas-microsoft-com:vml" Requires="v">
-                <p:oleObj spid="_x0000_s5219" name="Worksheet" r:id="rId3" imgW="2505144" imgH="1219149" progId="Excel.Sheet.12">
+                <p:oleObj spid="_x0000_s5226" name="Worksheet" r:id="rId3" imgW="2505144" imgH="1219149" progId="Excel.Sheet.12">
                   <p:embed/>
                 </p:oleObj>
               </mc:Choice>
@@ -14551,8 +14730,8 @@
           </a:p>
         </p:txBody>
       </p:sp>
-      <mc:AlternateContent xmlns:mc="http://schemas.openxmlformats.org/markup-compatibility/2006">
-        <mc:Choice xmlns:a14="http://schemas.microsoft.com/office/drawing/2010/main" Requires="a14">
+      <mc:AlternateContent xmlns:mc="http://schemas.openxmlformats.org/markup-compatibility/2006" xmlns:a14="http://schemas.microsoft.com/office/drawing/2010/main">
+        <mc:Choice Requires="a14">
           <p:sp>
             <p:nvSpPr>
               <p:cNvPr id="3" name="Content Placeholder 2">
@@ -14698,7 +14877,7 @@
             </p:txBody>
           </p:sp>
         </mc:Choice>
-        <mc:Fallback>
+        <mc:Fallback xmlns="">
           <p:sp>
             <p:nvSpPr>
               <p:cNvPr id="3" name="Content Placeholder 2">
@@ -14807,8 +14986,8 @@
           </a:p>
         </p:txBody>
       </p:sp>
-      <mc:AlternateContent xmlns:mc="http://schemas.openxmlformats.org/markup-compatibility/2006">
-        <mc:Choice xmlns:a14="http://schemas.microsoft.com/office/drawing/2010/main" Requires="a14">
+      <mc:AlternateContent xmlns:mc="http://schemas.openxmlformats.org/markup-compatibility/2006" xmlns:a14="http://schemas.microsoft.com/office/drawing/2010/main">
+        <mc:Choice Requires="a14">
           <p:sp>
             <p:nvSpPr>
               <p:cNvPr id="3" name="Content Placeholder 2">
@@ -14922,7 +15101,7 @@
             </p:txBody>
           </p:sp>
         </mc:Choice>
-        <mc:Fallback>
+        <mc:Fallback xmlns="">
           <p:sp>
             <p:nvSpPr>
               <p:cNvPr id="3" name="Content Placeholder 2">
@@ -34099,8 +34278,8 @@
           </a:p>
         </p:txBody>
       </p:sp>
-      <mc:AlternateContent xmlns:mc="http://schemas.openxmlformats.org/markup-compatibility/2006">
-        <mc:Choice xmlns:a14="http://schemas.microsoft.com/office/drawing/2010/main" Requires="a14">
+      <mc:AlternateContent xmlns:mc="http://schemas.openxmlformats.org/markup-compatibility/2006" xmlns:a14="http://schemas.microsoft.com/office/drawing/2010/main">
+        <mc:Choice Requires="a14">
           <p:sp>
             <p:nvSpPr>
               <p:cNvPr id="20" name="TextBox 19">
@@ -34152,13 +34331,7 @@
                       <a:rPr lang="en-US" b="0" i="1" smtClean="0">
                         <a:latin typeface="Cambria Math" panose="02040503050406030204" pitchFamily="18" charset="0"/>
                       </a:rPr>
-                      <m:t>≈</m:t>
-                    </m:r>
-                    <m:r>
-                      <a:rPr lang="en-US" b="0" i="1" smtClean="0">
-                        <a:latin typeface="Cambria Math" panose="02040503050406030204" pitchFamily="18" charset="0"/>
-                      </a:rPr>
-                      <m:t>33</m:t>
+                      <m:t>≈33</m:t>
                     </m:r>
                   </m:oMath>
                 </a14:m>
@@ -34178,13 +34351,7 @@
                       <a:rPr lang="en-US" b="0" i="1" smtClean="0">
                         <a:latin typeface="Cambria Math" panose="02040503050406030204" pitchFamily="18" charset="0"/>
                       </a:rPr>
-                      <m:t>≈</m:t>
-                    </m:r>
-                    <m:r>
-                      <a:rPr lang="en-US" b="0" i="1" smtClean="0">
-                        <a:latin typeface="Cambria Math" panose="02040503050406030204" pitchFamily="18" charset="0"/>
-                      </a:rPr>
-                      <m:t>38</m:t>
+                      <m:t>≈38</m:t>
                     </m:r>
                   </m:oMath>
                 </a14:m>
@@ -34196,7 +34363,7 @@
             </p:txBody>
           </p:sp>
         </mc:Choice>
-        <mc:Fallback>
+        <mc:Fallback xmlns="">
           <p:sp>
             <p:nvSpPr>
               <p:cNvPr id="20" name="TextBox 19">
@@ -34305,8 +34472,8 @@
           </a:effectLst>
         </p:spPr>
       </p:pic>
-      <mc:AlternateContent xmlns:mc="http://schemas.openxmlformats.org/markup-compatibility/2006">
-        <mc:Choice xmlns:a14="http://schemas.microsoft.com/office/drawing/2010/main" Requires="a14">
+      <mc:AlternateContent xmlns:mc="http://schemas.openxmlformats.org/markup-compatibility/2006" xmlns:a14="http://schemas.microsoft.com/office/drawing/2010/main">
+        <mc:Choice Requires="a14">
           <p:sp>
             <p:nvSpPr>
               <p:cNvPr id="8" name="TextBox 7">
@@ -34366,7 +34533,7 @@
             </p:txBody>
           </p:sp>
         </mc:Choice>
-        <mc:Fallback>
+        <mc:Fallback xmlns="">
           <p:sp>
             <p:nvSpPr>
               <p:cNvPr id="8" name="TextBox 7">
@@ -34641,8 +34808,8 @@
           </a:p>
         </p:txBody>
       </p:sp>
-      <mc:AlternateContent xmlns:mc="http://schemas.openxmlformats.org/markup-compatibility/2006">
-        <mc:Choice xmlns:a14="http://schemas.microsoft.com/office/drawing/2010/main" Requires="a14">
+      <mc:AlternateContent xmlns:mc="http://schemas.openxmlformats.org/markup-compatibility/2006" xmlns:a14="http://schemas.microsoft.com/office/drawing/2010/main">
+        <mc:Choice Requires="a14">
           <p:sp>
             <p:nvSpPr>
               <p:cNvPr id="3" name="Content Placeholder 2">
@@ -34761,7 +34928,7 @@
             </p:txBody>
           </p:sp>
         </mc:Choice>
-        <mc:Fallback>
+        <mc:Fallback xmlns="">
           <p:sp>
             <p:nvSpPr>
               <p:cNvPr id="3" name="Content Placeholder 2">

</xml_diff>

<commit_message>
Add summary slides for Sean's q1/q2
</commit_message>
<xml_diff>
--- a/presentation/gtdb-final-presentation.pptx
+++ b/presentation/gtdb-final-presentation.pptx
@@ -5,7 +5,7 @@
     <p:sldMasterId id="2147483803" r:id="rId1"/>
   </p:sldMasterIdLst>
   <p:notesMasterIdLst>
-    <p:notesMasterId r:id="rId58"/>
+    <p:notesMasterId r:id="rId60"/>
   </p:notesMasterIdLst>
   <p:sldIdLst>
     <p:sldId id="256" r:id="rId2"/>
@@ -52,18 +52,20 @@
     <p:sldId id="278" r:id="rId43"/>
     <p:sldId id="283" r:id="rId44"/>
     <p:sldId id="277" r:id="rId45"/>
-    <p:sldId id="305" r:id="rId46"/>
-    <p:sldId id="317" r:id="rId47"/>
-    <p:sldId id="306" r:id="rId48"/>
-    <p:sldId id="308" r:id="rId49"/>
-    <p:sldId id="292" r:id="rId50"/>
-    <p:sldId id="312" r:id="rId51"/>
-    <p:sldId id="328" r:id="rId52"/>
-    <p:sldId id="315" r:id="rId53"/>
-    <p:sldId id="320" r:id="rId54"/>
-    <p:sldId id="316" r:id="rId55"/>
-    <p:sldId id="319" r:id="rId56"/>
-    <p:sldId id="265" r:id="rId57"/>
+    <p:sldId id="330" r:id="rId46"/>
+    <p:sldId id="305" r:id="rId47"/>
+    <p:sldId id="317" r:id="rId48"/>
+    <p:sldId id="306" r:id="rId49"/>
+    <p:sldId id="308" r:id="rId50"/>
+    <p:sldId id="292" r:id="rId51"/>
+    <p:sldId id="312" r:id="rId52"/>
+    <p:sldId id="328" r:id="rId53"/>
+    <p:sldId id="315" r:id="rId54"/>
+    <p:sldId id="320" r:id="rId55"/>
+    <p:sldId id="316" r:id="rId56"/>
+    <p:sldId id="319" r:id="rId57"/>
+    <p:sldId id="331" r:id="rId58"/>
+    <p:sldId id="265" r:id="rId59"/>
   </p:sldIdLst>
   <p:sldSz cx="9144000" cy="6858000" type="screen4x3"/>
   <p:notesSz cx="6858000" cy="9144000"/>
@@ -219,6 +221,7 @@
             <p14:sldId id="278"/>
             <p14:sldId id="283"/>
             <p14:sldId id="277"/>
+            <p14:sldId id="330"/>
             <p14:sldId id="305"/>
             <p14:sldId id="317"/>
             <p14:sldId id="306"/>
@@ -230,6 +233,7 @@
             <p14:sldId id="320"/>
             <p14:sldId id="316"/>
             <p14:sldId id="319"/>
+            <p14:sldId id="331"/>
           </p14:sldIdLst>
         </p14:section>
         <p14:section name="Summary and Conclusion" id="{A2B1DDA9-9FDD-4663-A154-79354B6BCDF3}">
@@ -835,6 +839,10 @@
           <a:bodyPr/>
           <a:lstStyle/>
           <a:p>
+            <a:r>
+              <a:rPr lang="en-US" dirty="0" err="1"/>
+              <a:t>prp</a:t>
+            </a:r>
             <a:endParaRPr lang="en-US" dirty="0"/>
           </a:p>
         </p:txBody>
@@ -919,10 +927,27 @@
           <a:bodyPr/>
           <a:lstStyle/>
           <a:p>
+            <a:pPr marL="171450" indent="-171450">
+              <a:buFont typeface="Arial" panose="020B0604020202020204" pitchFamily="34" charset="0"/>
+              <a:buChar char="•"/>
+            </a:pPr>
             <a:r>
               <a:rPr lang="en-US" dirty="0"/>
-              <a:t>19 Variables</a:t>
-            </a:r>
+              <a:t>What if a terrorist group becomes active in a new region / geography?</a:t>
+            </a:r>
+          </a:p>
+          <a:p>
+            <a:pPr marL="171450" indent="-171450">
+              <a:buFont typeface="Arial" panose="020B0604020202020204" pitchFamily="34" charset="0"/>
+              <a:buChar char="•"/>
+            </a:pPr>
+            <a:r>
+              <a:rPr lang="en-US" dirty="0"/>
+              <a:t>Try to determine groups attack patterns…</a:t>
+            </a:r>
+          </a:p>
+          <a:p>
+            <a:endParaRPr lang="en-US" dirty="0"/>
           </a:p>
         </p:txBody>
       </p:sp>
@@ -1613,7 +1638,7 @@
           <a:p>
             <a:fld id="{58F5E0F1-AB47-4A7A-BA35-9463FCF91331}" type="slidenum">
               <a:rPr lang="en-US" smtClean="0"/>
-              <a:t>47</a:t>
+              <a:t>48</a:t>
             </a:fld>
             <a:endParaRPr lang="en-US"/>
           </a:p>
@@ -1697,7 +1722,7 @@
           <a:p>
             <a:fld id="{58F5E0F1-AB47-4A7A-BA35-9463FCF91331}" type="slidenum">
               <a:rPr lang="en-US" smtClean="0"/>
-              <a:t>48</a:t>
+              <a:t>49</a:t>
             </a:fld>
             <a:endParaRPr lang="en-US"/>
           </a:p>
@@ -1793,7 +1818,7 @@
           <a:p>
             <a:fld id="{58F5E0F1-AB47-4A7A-BA35-9463FCF91331}" type="slidenum">
               <a:rPr lang="en-US" smtClean="0"/>
-              <a:t>49</a:t>
+              <a:t>50</a:t>
             </a:fld>
             <a:endParaRPr lang="en-US"/>
           </a:p>
@@ -1856,108 +1881,6 @@
           <a:bodyPr/>
           <a:lstStyle/>
           <a:p>
-            <a:r>
-              <a:rPr lang="en-US" sz="1200" kern="1200" dirty="0" err="1">
-                <a:solidFill>
-                  <a:schemeClr val="tx1"/>
-                </a:solidFill>
-                <a:effectLst/>
-                <a:latin typeface="+mn-lt"/>
-                <a:ea typeface="+mn-ea"/>
-                <a:cs typeface="+mn-cs"/>
-              </a:rPr>
-              <a:t>lda</a:t>
-            </a:r>
-            <a:r>
-              <a:rPr lang="en-US" sz="1200" kern="1200" dirty="0">
-                <a:solidFill>
-                  <a:schemeClr val="tx1"/>
-                </a:solidFill>
-                <a:effectLst/>
-                <a:latin typeface="+mn-lt"/>
-                <a:ea typeface="+mn-ea"/>
-                <a:cs typeface="+mn-cs"/>
-              </a:rPr>
-              <a:t> </a:t>
-            </a:r>
-            <a:r>
-              <a:rPr lang="en-US" dirty="0">
-                <a:effectLst/>
-              </a:rPr>
-              <a:t>0.973</a:t>
-            </a:r>
-          </a:p>
-          <a:p>
-            <a:r>
-              <a:rPr lang="en-US" sz="1200" kern="1200" dirty="0">
-                <a:solidFill>
-                  <a:schemeClr val="tx1"/>
-                </a:solidFill>
-                <a:effectLst/>
-                <a:latin typeface="+mn-lt"/>
-                <a:ea typeface="+mn-ea"/>
-                <a:cs typeface="+mn-cs"/>
-              </a:rPr>
-              <a:t>tree</a:t>
-            </a:r>
-            <a:r>
-              <a:rPr lang="en-US" dirty="0">
-                <a:effectLst/>
-              </a:rPr>
-              <a:t> 0.925</a:t>
-            </a:r>
-          </a:p>
-          <a:p>
-            <a:r>
-              <a:rPr lang="en-US" sz="1200" kern="1200" dirty="0">
-                <a:solidFill>
-                  <a:schemeClr val="tx1"/>
-                </a:solidFill>
-                <a:effectLst/>
-                <a:latin typeface="+mn-lt"/>
-                <a:ea typeface="+mn-ea"/>
-                <a:cs typeface="+mn-cs"/>
-              </a:rPr>
-              <a:t>rf </a:t>
-            </a:r>
-            <a:r>
-              <a:rPr lang="en-US" dirty="0">
-                <a:effectLst/>
-              </a:rPr>
-              <a:t>0.981</a:t>
-            </a:r>
-          </a:p>
-          <a:p>
-            <a:r>
-              <a:rPr lang="en-US" sz="1200" kern="1200" dirty="0" err="1">
-                <a:solidFill>
-                  <a:schemeClr val="tx1"/>
-                </a:solidFill>
-                <a:effectLst/>
-                <a:latin typeface="+mn-lt"/>
-                <a:ea typeface="+mn-ea"/>
-                <a:cs typeface="+mn-cs"/>
-              </a:rPr>
-              <a:t>svm</a:t>
-            </a:r>
-            <a:r>
-              <a:rPr lang="en-US" sz="1200" kern="1200" dirty="0">
-                <a:solidFill>
-                  <a:schemeClr val="tx1"/>
-                </a:solidFill>
-                <a:effectLst/>
-                <a:latin typeface="+mn-lt"/>
-                <a:ea typeface="+mn-ea"/>
-                <a:cs typeface="+mn-cs"/>
-              </a:rPr>
-              <a:t> </a:t>
-            </a:r>
-            <a:r>
-              <a:rPr lang="en-US" dirty="0">
-                <a:effectLst/>
-              </a:rPr>
-              <a:t>0.962</a:t>
-            </a:r>
             <a:endParaRPr lang="en-US" dirty="0"/>
           </a:p>
         </p:txBody>
@@ -1979,7 +1902,7 @@
           <a:p>
             <a:fld id="{58F5E0F1-AB47-4A7A-BA35-9463FCF91331}" type="slidenum">
               <a:rPr lang="en-US" smtClean="0"/>
-              <a:t>52</a:t>
+              <a:t>53</a:t>
             </a:fld>
             <a:endParaRPr lang="en-US"/>
           </a:p>
@@ -1989,6 +1912,94 @@
     <p:extLst>
       <p:ext uri="{BB962C8B-B14F-4D97-AF65-F5344CB8AC3E}">
         <p14:creationId xmlns:p14="http://schemas.microsoft.com/office/powerpoint/2010/main" val="1756405409"/>
+      </p:ext>
+    </p:extLst>
+  </p:cSld>
+  <p:clrMapOvr>
+    <a:masterClrMapping/>
+  </p:clrMapOvr>
+</p:notes>
+</file>
+
+<file path=ppt/notesSlides/notesSlide19.xml><?xml version="1.0" encoding="utf-8"?>
+<p:notes xmlns:a="http://schemas.openxmlformats.org/drawingml/2006/main" xmlns:r="http://schemas.openxmlformats.org/officeDocument/2006/relationships" xmlns:p="http://schemas.openxmlformats.org/presentationml/2006/main">
+  <p:cSld>
+    <p:spTree>
+      <p:nvGrpSpPr>
+        <p:cNvPr id="1" name=""/>
+        <p:cNvGrpSpPr/>
+        <p:nvPr/>
+      </p:nvGrpSpPr>
+      <p:grpSpPr>
+        <a:xfrm>
+          <a:off x="0" y="0"/>
+          <a:ext cx="0" cy="0"/>
+          <a:chOff x="0" y="0"/>
+          <a:chExt cx="0" cy="0"/>
+        </a:xfrm>
+      </p:grpSpPr>
+      <p:sp>
+        <p:nvSpPr>
+          <p:cNvPr id="2" name="Slide Image Placeholder 1"/>
+          <p:cNvSpPr>
+            <a:spLocks noGrp="1" noRot="1" noChangeAspect="1"/>
+          </p:cNvSpPr>
+          <p:nvPr>
+            <p:ph type="sldImg"/>
+          </p:nvPr>
+        </p:nvSpPr>
+        <p:spPr/>
+      </p:sp>
+      <p:sp>
+        <p:nvSpPr>
+          <p:cNvPr id="3" name="Notes Placeholder 2"/>
+          <p:cNvSpPr>
+            <a:spLocks noGrp="1"/>
+          </p:cNvSpPr>
+          <p:nvPr>
+            <p:ph type="body" idx="1"/>
+          </p:nvPr>
+        </p:nvSpPr>
+        <p:spPr/>
+        <p:txBody>
+          <a:bodyPr/>
+          <a:lstStyle/>
+          <a:p>
+            <a:r>
+              <a:rPr lang="en-US" dirty="0" err="1"/>
+              <a:t>fancyRpartPlot</a:t>
+            </a:r>
+            <a:endParaRPr lang="en-US" dirty="0"/>
+          </a:p>
+        </p:txBody>
+      </p:sp>
+      <p:sp>
+        <p:nvSpPr>
+          <p:cNvPr id="4" name="Slide Number Placeholder 3"/>
+          <p:cNvSpPr>
+            <a:spLocks noGrp="1"/>
+          </p:cNvSpPr>
+          <p:nvPr>
+            <p:ph type="sldNum" sz="quarter" idx="5"/>
+          </p:nvPr>
+        </p:nvSpPr>
+        <p:spPr/>
+        <p:txBody>
+          <a:bodyPr/>
+          <a:lstStyle/>
+          <a:p>
+            <a:fld id="{58F5E0F1-AB47-4A7A-BA35-9463FCF91331}" type="slidenum">
+              <a:rPr lang="en-US" smtClean="0"/>
+              <a:t>55</a:t>
+            </a:fld>
+            <a:endParaRPr lang="en-US"/>
+          </a:p>
+        </p:txBody>
+      </p:sp>
+    </p:spTree>
+    <p:extLst>
+      <p:ext uri="{BB962C8B-B14F-4D97-AF65-F5344CB8AC3E}">
+        <p14:creationId xmlns:p14="http://schemas.microsoft.com/office/powerpoint/2010/main" val="4163206603"/>
       </p:ext>
     </p:extLst>
   </p:cSld>
@@ -2076,6 +2087,208 @@
     <p:extLst>
       <p:ext uri="{BB962C8B-B14F-4D97-AF65-F5344CB8AC3E}">
         <p14:creationId xmlns:p14="http://schemas.microsoft.com/office/powerpoint/2010/main" val="2759362589"/>
+      </p:ext>
+    </p:extLst>
+  </p:cSld>
+  <p:clrMapOvr>
+    <a:masterClrMapping/>
+  </p:clrMapOvr>
+</p:notes>
+</file>
+
+<file path=ppt/notesSlides/notesSlide20.xml><?xml version="1.0" encoding="utf-8"?>
+<p:notes xmlns:a="http://schemas.openxmlformats.org/drawingml/2006/main" xmlns:r="http://schemas.openxmlformats.org/officeDocument/2006/relationships" xmlns:p="http://schemas.openxmlformats.org/presentationml/2006/main">
+  <p:cSld>
+    <p:spTree>
+      <p:nvGrpSpPr>
+        <p:cNvPr id="1" name=""/>
+        <p:cNvGrpSpPr/>
+        <p:nvPr/>
+      </p:nvGrpSpPr>
+      <p:grpSpPr>
+        <a:xfrm>
+          <a:off x="0" y="0"/>
+          <a:ext cx="0" cy="0"/>
+          <a:chOff x="0" y="0"/>
+          <a:chExt cx="0" cy="0"/>
+        </a:xfrm>
+      </p:grpSpPr>
+      <p:sp>
+        <p:nvSpPr>
+          <p:cNvPr id="2" name="Slide Image Placeholder 1"/>
+          <p:cNvSpPr>
+            <a:spLocks noGrp="1" noRot="1" noChangeAspect="1"/>
+          </p:cNvSpPr>
+          <p:nvPr>
+            <p:ph type="sldImg"/>
+          </p:nvPr>
+        </p:nvSpPr>
+        <p:spPr/>
+      </p:sp>
+      <p:sp>
+        <p:nvSpPr>
+          <p:cNvPr id="3" name="Notes Placeholder 2"/>
+          <p:cNvSpPr>
+            <a:spLocks noGrp="1"/>
+          </p:cNvSpPr>
+          <p:nvPr>
+            <p:ph type="body" idx="1"/>
+          </p:nvPr>
+        </p:nvSpPr>
+        <p:spPr/>
+        <p:txBody>
+          <a:bodyPr/>
+          <a:lstStyle/>
+          <a:p>
+            <a:endParaRPr lang="en-US" dirty="0"/>
+          </a:p>
+        </p:txBody>
+      </p:sp>
+      <p:sp>
+        <p:nvSpPr>
+          <p:cNvPr id="4" name="Slide Number Placeholder 3"/>
+          <p:cNvSpPr>
+            <a:spLocks noGrp="1"/>
+          </p:cNvSpPr>
+          <p:nvPr>
+            <p:ph type="sldNum" sz="quarter" idx="5"/>
+          </p:nvPr>
+        </p:nvSpPr>
+        <p:spPr/>
+        <p:txBody>
+          <a:bodyPr/>
+          <a:lstStyle/>
+          <a:p>
+            <a:fld id="{58F5E0F1-AB47-4A7A-BA35-9463FCF91331}" type="slidenum">
+              <a:rPr lang="en-US" smtClean="0"/>
+              <a:t>57</a:t>
+            </a:fld>
+            <a:endParaRPr lang="en-US"/>
+          </a:p>
+        </p:txBody>
+      </p:sp>
+    </p:spTree>
+    <p:extLst>
+      <p:ext uri="{BB962C8B-B14F-4D97-AF65-F5344CB8AC3E}">
+        <p14:creationId xmlns:p14="http://schemas.microsoft.com/office/powerpoint/2010/main" val="723301279"/>
+      </p:ext>
+    </p:extLst>
+  </p:cSld>
+  <p:clrMapOvr>
+    <a:masterClrMapping/>
+  </p:clrMapOvr>
+</p:notes>
+</file>
+
+<file path=ppt/notesSlides/notesSlide21.xml><?xml version="1.0" encoding="utf-8"?>
+<p:notes xmlns:a="http://schemas.openxmlformats.org/drawingml/2006/main" xmlns:r="http://schemas.openxmlformats.org/officeDocument/2006/relationships" xmlns:p="http://schemas.openxmlformats.org/presentationml/2006/main">
+  <p:cSld>
+    <p:spTree>
+      <p:nvGrpSpPr>
+        <p:cNvPr id="1" name=""/>
+        <p:cNvGrpSpPr/>
+        <p:nvPr/>
+      </p:nvGrpSpPr>
+      <p:grpSpPr>
+        <a:xfrm>
+          <a:off x="0" y="0"/>
+          <a:ext cx="0" cy="0"/>
+          <a:chOff x="0" y="0"/>
+          <a:chExt cx="0" cy="0"/>
+        </a:xfrm>
+      </p:grpSpPr>
+      <p:sp>
+        <p:nvSpPr>
+          <p:cNvPr id="2" name="Slide Image Placeholder 1"/>
+          <p:cNvSpPr>
+            <a:spLocks noGrp="1" noRot="1" noChangeAspect="1"/>
+          </p:cNvSpPr>
+          <p:nvPr>
+            <p:ph type="sldImg"/>
+          </p:nvPr>
+        </p:nvSpPr>
+        <p:spPr/>
+      </p:sp>
+      <p:sp>
+        <p:nvSpPr>
+          <p:cNvPr id="3" name="Notes Placeholder 2"/>
+          <p:cNvSpPr>
+            <a:spLocks noGrp="1"/>
+          </p:cNvSpPr>
+          <p:nvPr>
+            <p:ph type="body" idx="1"/>
+          </p:nvPr>
+        </p:nvSpPr>
+        <p:spPr/>
+        <p:txBody>
+          <a:bodyPr/>
+          <a:lstStyle/>
+          <a:p>
+            <a:pPr marL="171450" indent="-171450">
+              <a:buFont typeface="Arial" panose="020B0604020202020204" pitchFamily="34" charset="0"/>
+              <a:buChar char="•"/>
+            </a:pPr>
+            <a:r>
+              <a:rPr lang="en-US" dirty="0"/>
+              <a:t>Impact of data balancing (i.e., oversampling)</a:t>
+            </a:r>
+          </a:p>
+          <a:p>
+            <a:pPr marL="171450" indent="-171450">
+              <a:buFont typeface="Arial" panose="020B0604020202020204" pitchFamily="34" charset="0"/>
+              <a:buChar char="•"/>
+            </a:pPr>
+            <a:r>
+              <a:rPr lang="en-US" dirty="0"/>
+              <a:t>Slowness of SVMs</a:t>
+            </a:r>
+          </a:p>
+          <a:p>
+            <a:pPr marL="171450" indent="-171450">
+              <a:buFont typeface="Arial" panose="020B0604020202020204" pitchFamily="34" charset="0"/>
+              <a:buChar char="•"/>
+            </a:pPr>
+            <a:r>
+              <a:rPr lang="en-US" dirty="0"/>
+              <a:t>Amount of effort needed for data cleansing</a:t>
+            </a:r>
+          </a:p>
+          <a:p>
+            <a:pPr marL="171450" indent="-171450">
+              <a:buFont typeface="Arial" panose="020B0604020202020204" pitchFamily="34" charset="0"/>
+              <a:buChar char="•"/>
+            </a:pPr>
+            <a:endParaRPr lang="en-US" dirty="0"/>
+          </a:p>
+        </p:txBody>
+      </p:sp>
+      <p:sp>
+        <p:nvSpPr>
+          <p:cNvPr id="4" name="Slide Number Placeholder 3"/>
+          <p:cNvSpPr>
+            <a:spLocks noGrp="1"/>
+          </p:cNvSpPr>
+          <p:nvPr>
+            <p:ph type="sldNum" sz="quarter" idx="5"/>
+          </p:nvPr>
+        </p:nvSpPr>
+        <p:spPr/>
+        <p:txBody>
+          <a:bodyPr/>
+          <a:lstStyle/>
+          <a:p>
+            <a:fld id="{58F5E0F1-AB47-4A7A-BA35-9463FCF91331}" type="slidenum">
+              <a:rPr lang="en-US" smtClean="0"/>
+              <a:t>58</a:t>
+            </a:fld>
+            <a:endParaRPr lang="en-US"/>
+          </a:p>
+        </p:txBody>
+      </p:sp>
+    </p:spTree>
+    <p:extLst>
+      <p:ext uri="{BB962C8B-B14F-4D97-AF65-F5344CB8AC3E}">
+        <p14:creationId xmlns:p14="http://schemas.microsoft.com/office/powerpoint/2010/main" val="3880292605"/>
       </p:ext>
     </p:extLst>
   </p:cSld>
@@ -8266,7 +8479,7 @@
           <a:graphicData uri="http://schemas.openxmlformats.org/presentationml/2006/ole">
             <mc:AlternateContent xmlns:mc="http://schemas.openxmlformats.org/markup-compatibility/2006">
               <mc:Choice xmlns:v="urn:schemas-microsoft-com:vml" Requires="v">
-                <p:oleObj spid="_x0000_s2332" name="Worksheet" r:id="rId4" imgW="1923884" imgH="933476" progId="Excel.Sheet.12">
+                <p:oleObj spid="_x0000_s2375" name="Worksheet" r:id="rId4" imgW="1923884" imgH="933476" progId="Excel.Sheet.12">
                   <p:embed/>
                 </p:oleObj>
               </mc:Choice>
@@ -8690,7 +8903,7 @@
           <a:graphicData uri="http://schemas.openxmlformats.org/presentationml/2006/ole">
             <mc:AlternateContent xmlns:mc="http://schemas.openxmlformats.org/markup-compatibility/2006">
               <mc:Choice xmlns:v="urn:schemas-microsoft-com:vml" Requires="v">
-                <p:oleObj spid="_x0000_s1596" name="Worksheet" r:id="rId3" imgW="1466857" imgH="771525" progId="Excel.Sheet.12">
+                <p:oleObj spid="_x0000_s1682" name="Worksheet" r:id="rId3" imgW="1466857" imgH="771525" progId="Excel.Sheet.12">
                   <p:embed/>
                 </p:oleObj>
               </mc:Choice>
@@ -8753,7 +8966,7 @@
           <a:graphicData uri="http://schemas.openxmlformats.org/presentationml/2006/ole">
             <mc:AlternateContent xmlns:mc="http://schemas.openxmlformats.org/markup-compatibility/2006">
               <mc:Choice xmlns:v="urn:schemas-microsoft-com:vml" Requires="v">
-                <p:oleObj spid="_x0000_s1597" name="Worksheet" r:id="rId5" imgW="1466857" imgH="771525" progId="Excel.Sheet.12">
+                <p:oleObj spid="_x0000_s1683" name="Worksheet" r:id="rId5" imgW="1466857" imgH="771525" progId="Excel.Sheet.12">
                   <p:embed/>
                 </p:oleObj>
               </mc:Choice>
@@ -9453,7 +9666,7 @@
           <a:graphicData uri="http://schemas.openxmlformats.org/presentationml/2006/ole">
             <mc:AlternateContent xmlns:mc="http://schemas.openxmlformats.org/markup-compatibility/2006">
               <mc:Choice xmlns:v="urn:schemas-microsoft-com:vml" Requires="v">
-                <p:oleObj spid="_x0000_s3353" name="Worksheet" r:id="rId5" imgW="1923884" imgH="933476" progId="Excel.Sheet.12">
+                <p:oleObj spid="_x0000_s3396" name="Worksheet" r:id="rId5" imgW="1923884" imgH="933476" progId="Excel.Sheet.12">
                   <p:embed/>
                 </p:oleObj>
               </mc:Choice>
@@ -14240,7 +14453,7 @@
           <a:graphicData uri="http://schemas.openxmlformats.org/presentationml/2006/ole">
             <mc:AlternateContent xmlns:mc="http://schemas.openxmlformats.org/markup-compatibility/2006">
               <mc:Choice xmlns:v="urn:schemas-microsoft-com:vml" Requires="v">
-                <p:oleObj spid="_x0000_s5281" name="Worksheet" r:id="rId3" imgW="2505144" imgH="1219149" progId="Excel.Sheet.12">
+                <p:oleObj spid="_x0000_s5324" name="Worksheet" r:id="rId3" imgW="2505144" imgH="1219149" progId="Excel.Sheet.12">
                   <p:embed/>
                 </p:oleObj>
               </mc:Choice>
@@ -21182,6 +21395,66 @@
           </a:effectLst>
         </p:spPr>
       </p:pic>
+      <p:sp>
+        <p:nvSpPr>
+          <p:cNvPr id="3" name="TextBox 2">
+            <a:extLst>
+              <a:ext uri="{FF2B5EF4-FFF2-40B4-BE49-F238E27FC236}">
+                <a16:creationId xmlns:a16="http://schemas.microsoft.com/office/drawing/2014/main" id="{47CD5062-A256-4429-A931-304134E708A8}"/>
+              </a:ext>
+            </a:extLst>
+          </p:cNvPr>
+          <p:cNvSpPr txBox="1"/>
+          <p:nvPr/>
+        </p:nvSpPr>
+        <p:spPr>
+          <a:xfrm>
+            <a:off x="6781800" y="5410200"/>
+            <a:ext cx="2133600" cy="1200329"/>
+          </a:xfrm>
+          <a:prstGeom prst="rect">
+            <a:avLst/>
+          </a:prstGeom>
+          <a:effectLst>
+            <a:outerShdw blurRad="50800" dist="38100" dir="5400000" algn="t" rotWithShape="0">
+              <a:prstClr val="black">
+                <a:alpha val="40000"/>
+              </a:prstClr>
+            </a:outerShdw>
+          </a:effectLst>
+        </p:spPr>
+        <p:style>
+          <a:lnRef idx="2">
+            <a:schemeClr val="dk1"/>
+          </a:lnRef>
+          <a:fillRef idx="1">
+            <a:schemeClr val="lt1"/>
+          </a:fillRef>
+          <a:effectRef idx="0">
+            <a:schemeClr val="dk1"/>
+          </a:effectRef>
+          <a:fontRef idx="minor">
+            <a:schemeClr val="dk1"/>
+          </a:fontRef>
+        </p:style>
+        <p:txBody>
+          <a:bodyPr wrap="square" rtlCol="0">
+            <a:spAutoFit/>
+          </a:bodyPr>
+          <a:lstStyle/>
+          <a:p>
+            <a:pPr algn="ctr"/>
+            <a:r>
+              <a:rPr lang="en-US" dirty="0">
+                <a:solidFill>
+                  <a:srgbClr val="FF0000"/>
+                </a:solidFill>
+              </a:rPr>
+              <a:t>time-dependent bounding boxes to determine group membership!</a:t>
+            </a:r>
+          </a:p>
+        </p:txBody>
+      </p:sp>
     </p:spTree>
     <p:extLst>
       <p:ext uri="{BB962C8B-B14F-4D97-AF65-F5344CB8AC3E}">
@@ -23293,7 +23566,7 @@
                     <a:p>
                       <a:pPr algn="ctr" fontAlgn="b"/>
                       <a:r>
-                        <a:rPr lang="en-US" sz="1500" b="1" i="0" u="none" strike="noStrike">
+                        <a:rPr lang="en-US" sz="1500" b="1" i="0" u="none" strike="noStrike" dirty="0">
                           <a:solidFill>
                             <a:srgbClr val="000000"/>
                           </a:solidFill>
@@ -32035,6 +32308,205 @@
           <p:cNvPr id="2" name="Title 1">
             <a:extLst>
               <a:ext uri="{FF2B5EF4-FFF2-40B4-BE49-F238E27FC236}">
+                <a16:creationId xmlns:a16="http://schemas.microsoft.com/office/drawing/2014/main" id="{478CE89F-9364-4783-A80D-58F8EFD3AA60}"/>
+              </a:ext>
+            </a:extLst>
+          </p:cNvPr>
+          <p:cNvSpPr>
+            <a:spLocks noGrp="1"/>
+          </p:cNvSpPr>
+          <p:nvPr>
+            <p:ph type="title"/>
+          </p:nvPr>
+        </p:nvSpPr>
+        <p:spPr/>
+        <p:txBody>
+          <a:bodyPr/>
+          <a:lstStyle/>
+          <a:p>
+            <a:r>
+              <a:rPr lang="en-US" dirty="0"/>
+              <a:t>Summary</a:t>
+            </a:r>
+            <a:br>
+              <a:rPr lang="en-US" dirty="0"/>
+            </a:br>
+            <a:r>
+              <a:rPr lang="en-US" dirty="0"/>
+              <a:t>(Predicting Terrorist Group)</a:t>
+            </a:r>
+          </a:p>
+        </p:txBody>
+      </p:sp>
+      <p:sp>
+        <p:nvSpPr>
+          <p:cNvPr id="3" name="Content Placeholder 2">
+            <a:extLst>
+              <a:ext uri="{FF2B5EF4-FFF2-40B4-BE49-F238E27FC236}">
+                <a16:creationId xmlns:a16="http://schemas.microsoft.com/office/drawing/2014/main" id="{117F6BE4-533B-48CD-82D1-FA311DDD8E59}"/>
+              </a:ext>
+            </a:extLst>
+          </p:cNvPr>
+          <p:cNvSpPr>
+            <a:spLocks noGrp="1"/>
+          </p:cNvSpPr>
+          <p:nvPr>
+            <p:ph idx="1"/>
+          </p:nvPr>
+        </p:nvSpPr>
+        <p:spPr>
+          <a:xfrm>
+            <a:off x="1028700" y="2171700"/>
+            <a:ext cx="7200900" cy="4457700"/>
+          </a:xfrm>
+        </p:spPr>
+        <p:txBody>
+          <a:bodyPr>
+            <a:normAutofit fontScale="92500" lnSpcReduction="20000"/>
+          </a:bodyPr>
+          <a:lstStyle/>
+          <a:p>
+            <a:r>
+              <a:rPr lang="en-US" sz="2400" dirty="0"/>
+              <a:t>Geographic variables (lat. / long.) highly predictive of terrorist group </a:t>
+            </a:r>
+            <a:r>
+              <a:rPr lang="en-US" sz="1800" dirty="0"/>
+              <a:t>(but not very interesting…)</a:t>
+            </a:r>
+          </a:p>
+          <a:p>
+            <a:r>
+              <a:rPr lang="en-US" sz="2400" dirty="0"/>
+              <a:t>Random forests outperformed other algorithms on both model sets (with/without geographic variables)</a:t>
+            </a:r>
+          </a:p>
+          <a:p>
+            <a:r>
+              <a:rPr lang="en-US" sz="2400" dirty="0"/>
+              <a:t>SVM’s performance limited by inability to use entire training set</a:t>
+            </a:r>
+          </a:p>
+          <a:p>
+            <a:r>
+              <a:rPr lang="en-US" sz="2400" dirty="0"/>
+              <a:t>QDA generated errors on most non-binary categorical variables</a:t>
+            </a:r>
+          </a:p>
+          <a:p>
+            <a:r>
+              <a:rPr lang="en-US" sz="2400" dirty="0"/>
+              <a:t>targtype1, </a:t>
+            </a:r>
+            <a:r>
+              <a:rPr lang="en-US" sz="2400" dirty="0" err="1"/>
+              <a:t>iday</a:t>
+            </a:r>
+            <a:r>
+              <a:rPr lang="en-US" sz="2400" dirty="0"/>
+              <a:t>, </a:t>
+            </a:r>
+            <a:r>
+              <a:rPr lang="en-US" sz="2400" dirty="0" err="1"/>
+              <a:t>imonth</a:t>
+            </a:r>
+            <a:r>
+              <a:rPr lang="en-US" sz="2400" dirty="0"/>
+              <a:t>, claimed most predictive of terrorist group in non-geographic model set</a:t>
+            </a:r>
+          </a:p>
+          <a:p>
+            <a:pPr lvl="1"/>
+            <a:r>
+              <a:rPr lang="en-US" sz="2400" i="0" dirty="0"/>
+              <a:t>additional analysis needed to understand </a:t>
+            </a:r>
+            <a:r>
+              <a:rPr lang="en-US" sz="2400" i="0" dirty="0" err="1">
+                <a:solidFill>
+                  <a:srgbClr val="FF0000"/>
+                </a:solidFill>
+              </a:rPr>
+              <a:t>iday</a:t>
+            </a:r>
+            <a:r>
+              <a:rPr lang="en-US" sz="2400" i="0" dirty="0">
+                <a:solidFill>
+                  <a:srgbClr val="FF0000"/>
+                </a:solidFill>
+              </a:rPr>
+              <a:t> + </a:t>
+            </a:r>
+            <a:r>
+              <a:rPr lang="en-US" sz="2400" i="0" dirty="0" err="1">
+                <a:solidFill>
+                  <a:srgbClr val="FF0000"/>
+                </a:solidFill>
+              </a:rPr>
+              <a:t>imonth</a:t>
+            </a:r>
+            <a:r>
+              <a:rPr lang="en-US" sz="2400" i="0" dirty="0">
+                <a:solidFill>
+                  <a:srgbClr val="FF0000"/>
+                </a:solidFill>
+              </a:rPr>
+              <a:t> pattern</a:t>
+            </a:r>
+          </a:p>
+          <a:p>
+            <a:r>
+              <a:rPr lang="en-US" sz="2400" dirty="0"/>
+              <a:t>ROC alternative for non-binary classification???</a:t>
+            </a:r>
+            <a:endParaRPr lang="en-US" sz="2400" i="0" dirty="0"/>
+          </a:p>
+          <a:p>
+            <a:endParaRPr lang="en-US" sz="2400" dirty="0"/>
+          </a:p>
+          <a:p>
+            <a:endParaRPr lang="en-US" sz="2400" dirty="0"/>
+          </a:p>
+          <a:p>
+            <a:endParaRPr lang="en-US" dirty="0"/>
+          </a:p>
+        </p:txBody>
+      </p:sp>
+    </p:spTree>
+    <p:extLst>
+      <p:ext uri="{BB962C8B-B14F-4D97-AF65-F5344CB8AC3E}">
+        <p14:creationId xmlns:p14="http://schemas.microsoft.com/office/powerpoint/2010/main" val="2986263541"/>
+      </p:ext>
+    </p:extLst>
+  </p:cSld>
+  <p:clrMapOvr>
+    <a:masterClrMapping/>
+  </p:clrMapOvr>
+</p:sld>
+</file>
+
+<file path=ppt/slides/slide46.xml><?xml version="1.0" encoding="utf-8"?>
+<p:sld xmlns:a="http://schemas.openxmlformats.org/drawingml/2006/main" xmlns:r="http://schemas.openxmlformats.org/officeDocument/2006/relationships" xmlns:p="http://schemas.openxmlformats.org/presentationml/2006/main">
+  <p:cSld>
+    <p:spTree>
+      <p:nvGrpSpPr>
+        <p:cNvPr id="1" name=""/>
+        <p:cNvGrpSpPr/>
+        <p:nvPr/>
+      </p:nvGrpSpPr>
+      <p:grpSpPr>
+        <a:xfrm>
+          <a:off x="0" y="0"/>
+          <a:ext cx="0" cy="0"/>
+          <a:chOff x="0" y="0"/>
+          <a:chExt cx="0" cy="0"/>
+        </a:xfrm>
+      </p:grpSpPr>
+      <p:sp>
+        <p:nvSpPr>
+          <p:cNvPr id="2" name="Title 1">
+            <a:extLst>
+              <a:ext uri="{FF2B5EF4-FFF2-40B4-BE49-F238E27FC236}">
                 <a16:creationId xmlns:a16="http://schemas.microsoft.com/office/drawing/2014/main" id="{82C2F060-9C3E-40DA-AD53-DFA2CC09C580}"/>
               </a:ext>
             </a:extLst>
@@ -32134,7 +32606,7 @@
 </p:sld>
 </file>
 
-<file path=ppt/slides/slide46.xml><?xml version="1.0" encoding="utf-8"?>
+<file path=ppt/slides/slide47.xml><?xml version="1.0" encoding="utf-8"?>
 <p:sld xmlns:a="http://schemas.openxmlformats.org/drawingml/2006/main" xmlns:r="http://schemas.openxmlformats.org/officeDocument/2006/relationships" xmlns:p="http://schemas.openxmlformats.org/presentationml/2006/main">
   <p:cSld>
     <p:spTree>
@@ -32288,7 +32760,7 @@
 </p:sld>
 </file>
 
-<file path=ppt/slides/slide47.xml><?xml version="1.0" encoding="utf-8"?>
+<file path=ppt/slides/slide48.xml><?xml version="1.0" encoding="utf-8"?>
 <p:sld xmlns:a="http://schemas.openxmlformats.org/drawingml/2006/main" xmlns:r="http://schemas.openxmlformats.org/officeDocument/2006/relationships" xmlns:p="http://schemas.openxmlformats.org/presentationml/2006/main">
   <p:cSld>
     <p:spTree>
@@ -34139,7 +34611,7 @@
 </p:sld>
 </file>
 
-<file path=ppt/slides/slide48.xml><?xml version="1.0" encoding="utf-8"?>
+<file path=ppt/slides/slide49.xml><?xml version="1.0" encoding="utf-8"?>
 <p:sld xmlns:a="http://schemas.openxmlformats.org/drawingml/2006/main" xmlns:r="http://schemas.openxmlformats.org/officeDocument/2006/relationships" xmlns:p="http://schemas.openxmlformats.org/presentationml/2006/main">
   <p:cSld>
     <p:spTree>
@@ -34264,7 +34736,172 @@
 </p:sld>
 </file>
 
-<file path=ppt/slides/slide49.xml><?xml version="1.0" encoding="utf-8"?>
+<file path=ppt/slides/slide5.xml><?xml version="1.0" encoding="utf-8"?>
+<p:sld xmlns:a="http://schemas.openxmlformats.org/drawingml/2006/main" xmlns:r="http://schemas.openxmlformats.org/officeDocument/2006/relationships" xmlns:p="http://schemas.openxmlformats.org/presentationml/2006/main">
+  <p:cSld>
+    <p:spTree>
+      <p:nvGrpSpPr>
+        <p:cNvPr id="1" name=""/>
+        <p:cNvGrpSpPr/>
+        <p:nvPr/>
+      </p:nvGrpSpPr>
+      <p:grpSpPr>
+        <a:xfrm>
+          <a:off x="0" y="0"/>
+          <a:ext cx="0" cy="0"/>
+          <a:chOff x="0" y="0"/>
+          <a:chExt cx="0" cy="0"/>
+        </a:xfrm>
+      </p:grpSpPr>
+      <p:sp>
+        <p:nvSpPr>
+          <p:cNvPr id="2" name="Title 1">
+            <a:extLst>
+              <a:ext uri="{FF2B5EF4-FFF2-40B4-BE49-F238E27FC236}">
+                <a16:creationId xmlns:a16="http://schemas.microsoft.com/office/drawing/2014/main" id="{9BB04737-5B5E-4061-9F4E-F1DEB1C647DE}"/>
+              </a:ext>
+            </a:extLst>
+          </p:cNvPr>
+          <p:cNvSpPr>
+            <a:spLocks noGrp="1"/>
+          </p:cNvSpPr>
+          <p:nvPr>
+            <p:ph type="title"/>
+          </p:nvPr>
+        </p:nvSpPr>
+        <p:spPr>
+          <a:xfrm>
+            <a:off x="1028700" y="685800"/>
+            <a:ext cx="7200900" cy="685800"/>
+          </a:xfrm>
+        </p:spPr>
+        <p:txBody>
+          <a:bodyPr>
+            <a:normAutofit/>
+          </a:bodyPr>
+          <a:lstStyle/>
+          <a:p>
+            <a:r>
+              <a:rPr lang="en-US" sz="3600" dirty="0"/>
+              <a:t>Observations (Summary)</a:t>
+            </a:r>
+          </a:p>
+        </p:txBody>
+      </p:sp>
+      <p:pic>
+        <p:nvPicPr>
+          <p:cNvPr id="10" name="Picture 9" descr="A close up of a map&#10;&#10;Description automatically generated">
+            <a:extLst>
+              <a:ext uri="{FF2B5EF4-FFF2-40B4-BE49-F238E27FC236}">
+                <a16:creationId xmlns:a16="http://schemas.microsoft.com/office/drawing/2014/main" id="{CC1A4140-F4C3-4EC1-8A6F-784197D81A1B}"/>
+              </a:ext>
+            </a:extLst>
+          </p:cNvPr>
+          <p:cNvPicPr>
+            <a:picLocks/>
+          </p:cNvPicPr>
+          <p:nvPr/>
+        </p:nvPicPr>
+        <p:blipFill rotWithShape="1">
+          <a:blip r:embed="rId3">
+            <a:extLst>
+              <a:ext uri="{28A0092B-C50C-407E-A947-70E740481C1C}">
+                <a14:useLocalDpi xmlns:a14="http://schemas.microsoft.com/office/drawing/2010/main" val="0"/>
+              </a:ext>
+            </a:extLst>
+          </a:blip>
+          <a:srcRect l="30833" t="6779" b="15625"/>
+          <a:stretch/>
+        </p:blipFill>
+        <p:spPr>
+          <a:xfrm>
+            <a:off x="1371600" y="2054520"/>
+            <a:ext cx="7616952" cy="4572000"/>
+          </a:xfrm>
+          <a:prstGeom prst="rect">
+            <a:avLst/>
+          </a:prstGeom>
+          <a:solidFill>
+            <a:srgbClr val="FFFFFF">
+              <a:shade val="85000"/>
+            </a:srgbClr>
+          </a:solidFill>
+          <a:ln w="88900" cap="sq">
+            <a:solidFill>
+              <a:srgbClr val="FFFFFF"/>
+            </a:solidFill>
+            <a:miter lim="800000"/>
+          </a:ln>
+          <a:effectLst>
+            <a:outerShdw blurRad="55000" dist="18000" dir="5400000" algn="tl" rotWithShape="0">
+              <a:srgbClr val="000000">
+                <a:alpha val="40000"/>
+              </a:srgbClr>
+            </a:outerShdw>
+          </a:effectLst>
+          <a:scene3d>
+            <a:camera prst="orthographicFront"/>
+            <a:lightRig rig="twoPt" dir="t">
+              <a:rot lat="0" lon="0" rev="7200000"/>
+            </a:lightRig>
+          </a:scene3d>
+          <a:sp3d>
+            <a:bevelT w="25400" h="19050"/>
+            <a:contourClr>
+              <a:srgbClr val="FFFFFF"/>
+            </a:contourClr>
+          </a:sp3d>
+        </p:spPr>
+      </p:pic>
+      <p:sp>
+        <p:nvSpPr>
+          <p:cNvPr id="11" name="TextBox 10">
+            <a:extLst>
+              <a:ext uri="{FF2B5EF4-FFF2-40B4-BE49-F238E27FC236}">
+                <a16:creationId xmlns:a16="http://schemas.microsoft.com/office/drawing/2014/main" id="{E61925C7-D817-43EA-8456-CDBEF70E3EAF}"/>
+              </a:ext>
+            </a:extLst>
+          </p:cNvPr>
+          <p:cNvSpPr txBox="1"/>
+          <p:nvPr/>
+        </p:nvSpPr>
+        <p:spPr>
+          <a:xfrm>
+            <a:off x="1219200" y="1524000"/>
+            <a:ext cx="3009900" cy="461665"/>
+          </a:xfrm>
+          <a:prstGeom prst="rect">
+            <a:avLst/>
+          </a:prstGeom>
+          <a:noFill/>
+        </p:spPr>
+        <p:txBody>
+          <a:bodyPr wrap="square" rtlCol="0">
+            <a:spAutoFit/>
+          </a:bodyPr>
+          <a:lstStyle/>
+          <a:p>
+            <a:r>
+              <a:rPr lang="en-US" sz="2400" b="1" dirty="0"/>
+              <a:t>Incidents by Region</a:t>
+            </a:r>
+          </a:p>
+        </p:txBody>
+      </p:sp>
+    </p:spTree>
+    <p:extLst>
+      <p:ext uri="{BB962C8B-B14F-4D97-AF65-F5344CB8AC3E}">
+        <p14:creationId xmlns:p14="http://schemas.microsoft.com/office/powerpoint/2010/main" val="3382637159"/>
+      </p:ext>
+    </p:extLst>
+  </p:cSld>
+  <p:clrMapOvr>
+    <a:masterClrMapping/>
+  </p:clrMapOvr>
+</p:sld>
+</file>
+
+<file path=ppt/slides/slide50.xml><?xml version="1.0" encoding="utf-8"?>
 <p:sld xmlns:a="http://schemas.openxmlformats.org/drawingml/2006/main" xmlns:r="http://schemas.openxmlformats.org/officeDocument/2006/relationships" xmlns:p="http://schemas.openxmlformats.org/presentationml/2006/main">
   <p:cSld>
     <p:spTree>
@@ -34895,172 +35532,7 @@
 </p:sld>
 </file>
 
-<file path=ppt/slides/slide5.xml><?xml version="1.0" encoding="utf-8"?>
-<p:sld xmlns:a="http://schemas.openxmlformats.org/drawingml/2006/main" xmlns:r="http://schemas.openxmlformats.org/officeDocument/2006/relationships" xmlns:p="http://schemas.openxmlformats.org/presentationml/2006/main">
-  <p:cSld>
-    <p:spTree>
-      <p:nvGrpSpPr>
-        <p:cNvPr id="1" name=""/>
-        <p:cNvGrpSpPr/>
-        <p:nvPr/>
-      </p:nvGrpSpPr>
-      <p:grpSpPr>
-        <a:xfrm>
-          <a:off x="0" y="0"/>
-          <a:ext cx="0" cy="0"/>
-          <a:chOff x="0" y="0"/>
-          <a:chExt cx="0" cy="0"/>
-        </a:xfrm>
-      </p:grpSpPr>
-      <p:sp>
-        <p:nvSpPr>
-          <p:cNvPr id="2" name="Title 1">
-            <a:extLst>
-              <a:ext uri="{FF2B5EF4-FFF2-40B4-BE49-F238E27FC236}">
-                <a16:creationId xmlns:a16="http://schemas.microsoft.com/office/drawing/2014/main" id="{9BB04737-5B5E-4061-9F4E-F1DEB1C647DE}"/>
-              </a:ext>
-            </a:extLst>
-          </p:cNvPr>
-          <p:cNvSpPr>
-            <a:spLocks noGrp="1"/>
-          </p:cNvSpPr>
-          <p:nvPr>
-            <p:ph type="title"/>
-          </p:nvPr>
-        </p:nvSpPr>
-        <p:spPr>
-          <a:xfrm>
-            <a:off x="1028700" y="685800"/>
-            <a:ext cx="7200900" cy="685800"/>
-          </a:xfrm>
-        </p:spPr>
-        <p:txBody>
-          <a:bodyPr>
-            <a:normAutofit/>
-          </a:bodyPr>
-          <a:lstStyle/>
-          <a:p>
-            <a:r>
-              <a:rPr lang="en-US" sz="3600" dirty="0"/>
-              <a:t>Observations (Summary)</a:t>
-            </a:r>
-          </a:p>
-        </p:txBody>
-      </p:sp>
-      <p:pic>
-        <p:nvPicPr>
-          <p:cNvPr id="10" name="Picture 9" descr="A close up of a map&#10;&#10;Description automatically generated">
-            <a:extLst>
-              <a:ext uri="{FF2B5EF4-FFF2-40B4-BE49-F238E27FC236}">
-                <a16:creationId xmlns:a16="http://schemas.microsoft.com/office/drawing/2014/main" id="{CC1A4140-F4C3-4EC1-8A6F-784197D81A1B}"/>
-              </a:ext>
-            </a:extLst>
-          </p:cNvPr>
-          <p:cNvPicPr>
-            <a:picLocks/>
-          </p:cNvPicPr>
-          <p:nvPr/>
-        </p:nvPicPr>
-        <p:blipFill rotWithShape="1">
-          <a:blip r:embed="rId3">
-            <a:extLst>
-              <a:ext uri="{28A0092B-C50C-407E-A947-70E740481C1C}">
-                <a14:useLocalDpi xmlns:a14="http://schemas.microsoft.com/office/drawing/2010/main" val="0"/>
-              </a:ext>
-            </a:extLst>
-          </a:blip>
-          <a:srcRect l="30833" t="6779" b="15625"/>
-          <a:stretch/>
-        </p:blipFill>
-        <p:spPr>
-          <a:xfrm>
-            <a:off x="1371600" y="2054520"/>
-            <a:ext cx="7616952" cy="4572000"/>
-          </a:xfrm>
-          <a:prstGeom prst="rect">
-            <a:avLst/>
-          </a:prstGeom>
-          <a:solidFill>
-            <a:srgbClr val="FFFFFF">
-              <a:shade val="85000"/>
-            </a:srgbClr>
-          </a:solidFill>
-          <a:ln w="88900" cap="sq">
-            <a:solidFill>
-              <a:srgbClr val="FFFFFF"/>
-            </a:solidFill>
-            <a:miter lim="800000"/>
-          </a:ln>
-          <a:effectLst>
-            <a:outerShdw blurRad="55000" dist="18000" dir="5400000" algn="tl" rotWithShape="0">
-              <a:srgbClr val="000000">
-                <a:alpha val="40000"/>
-              </a:srgbClr>
-            </a:outerShdw>
-          </a:effectLst>
-          <a:scene3d>
-            <a:camera prst="orthographicFront"/>
-            <a:lightRig rig="twoPt" dir="t">
-              <a:rot lat="0" lon="0" rev="7200000"/>
-            </a:lightRig>
-          </a:scene3d>
-          <a:sp3d>
-            <a:bevelT w="25400" h="19050"/>
-            <a:contourClr>
-              <a:srgbClr val="FFFFFF"/>
-            </a:contourClr>
-          </a:sp3d>
-        </p:spPr>
-      </p:pic>
-      <p:sp>
-        <p:nvSpPr>
-          <p:cNvPr id="11" name="TextBox 10">
-            <a:extLst>
-              <a:ext uri="{FF2B5EF4-FFF2-40B4-BE49-F238E27FC236}">
-                <a16:creationId xmlns:a16="http://schemas.microsoft.com/office/drawing/2014/main" id="{E61925C7-D817-43EA-8456-CDBEF70E3EAF}"/>
-              </a:ext>
-            </a:extLst>
-          </p:cNvPr>
-          <p:cNvSpPr txBox="1"/>
-          <p:nvPr/>
-        </p:nvSpPr>
-        <p:spPr>
-          <a:xfrm>
-            <a:off x="1219200" y="1524000"/>
-            <a:ext cx="3009900" cy="461665"/>
-          </a:xfrm>
-          <a:prstGeom prst="rect">
-            <a:avLst/>
-          </a:prstGeom>
-          <a:noFill/>
-        </p:spPr>
-        <p:txBody>
-          <a:bodyPr wrap="square" rtlCol="0">
-            <a:spAutoFit/>
-          </a:bodyPr>
-          <a:lstStyle/>
-          <a:p>
-            <a:r>
-              <a:rPr lang="en-US" sz="2400" b="1" dirty="0"/>
-              <a:t>Incidents by Region</a:t>
-            </a:r>
-          </a:p>
-        </p:txBody>
-      </p:sp>
-    </p:spTree>
-    <p:extLst>
-      <p:ext uri="{BB962C8B-B14F-4D97-AF65-F5344CB8AC3E}">
-        <p14:creationId xmlns:p14="http://schemas.microsoft.com/office/powerpoint/2010/main" val="3382637159"/>
-      </p:ext>
-    </p:extLst>
-  </p:cSld>
-  <p:clrMapOvr>
-    <a:masterClrMapping/>
-  </p:clrMapOvr>
-</p:sld>
-</file>
-
-<file path=ppt/slides/slide50.xml><?xml version="1.0" encoding="utf-8"?>
+<file path=ppt/slides/slide51.xml><?xml version="1.0" encoding="utf-8"?>
 <p:sld xmlns:a="http://schemas.openxmlformats.org/drawingml/2006/main" xmlns:r="http://schemas.openxmlformats.org/officeDocument/2006/relationships" xmlns:p="http://schemas.openxmlformats.org/presentationml/2006/main">
   <p:cSld>
     <p:spTree>
@@ -35291,7 +35763,7 @@
           <p:nvPr>
             <p:extLst>
               <p:ext uri="{D42A27DB-BD31-4B8C-83A1-F6EECF244321}">
-                <p14:modId xmlns:p14="http://schemas.microsoft.com/office/powerpoint/2010/main" val="1767494937"/>
+                <p14:modId xmlns:p14="http://schemas.microsoft.com/office/powerpoint/2010/main" val="1049737487"/>
               </p:ext>
             </p:extLst>
           </p:nvPr>
@@ -35601,7 +36073,7 @@
 </p:sld>
 </file>
 
-<file path=ppt/slides/slide51.xml><?xml version="1.0" encoding="utf-8"?>
+<file path=ppt/slides/slide52.xml><?xml version="1.0" encoding="utf-8"?>
 <p:sld xmlns:a="http://schemas.openxmlformats.org/drawingml/2006/main" xmlns:r="http://schemas.openxmlformats.org/officeDocument/2006/relationships" xmlns:p="http://schemas.openxmlformats.org/presentationml/2006/main">
   <p:cSld>
     <p:spTree>
@@ -35706,8 +36178,21 @@
                   <a:srgbClr val="FF0000"/>
                 </a:solidFill>
               </a:rPr>
-              <a:t> ("rank deficiency in group high" error)</a:t>
-            </a:r>
+              <a:t> </a:t>
+            </a:r>
+            <a:r>
+              <a:rPr lang="en-US" sz="2400" dirty="0">
+                <a:solidFill>
+                  <a:schemeClr val="tx1"/>
+                </a:solidFill>
+              </a:rPr>
+              <a:t>("rank deficiency in group" error)</a:t>
+            </a:r>
+            <a:endParaRPr lang="en-US" sz="2800" dirty="0">
+              <a:solidFill>
+                <a:schemeClr val="tx1"/>
+              </a:solidFill>
+            </a:endParaRPr>
           </a:p>
           <a:p>
             <a:pPr marL="514350" indent="-514350">
@@ -35778,7 +36263,7 @@
 </p:sld>
 </file>
 
-<file path=ppt/slides/slide52.xml><?xml version="1.0" encoding="utf-8"?>
+<file path=ppt/slides/slide53.xml><?xml version="1.0" encoding="utf-8"?>
 <p:sld xmlns:a="http://schemas.openxmlformats.org/drawingml/2006/main" xmlns:r="http://schemas.openxmlformats.org/officeDocument/2006/relationships" xmlns:p="http://schemas.openxmlformats.org/presentationml/2006/main">
   <p:cSld>
     <p:spTree>
@@ -35990,7 +36475,7 @@
 </p:sld>
 </file>
 
-<file path=ppt/slides/slide53.xml><?xml version="1.0" encoding="utf-8"?>
+<file path=ppt/slides/slide54.xml><?xml version="1.0" encoding="utf-8"?>
 <p:sld xmlns:a="http://schemas.openxmlformats.org/drawingml/2006/main" xmlns:r="http://schemas.openxmlformats.org/officeDocument/2006/relationships" xmlns:p="http://schemas.openxmlformats.org/presentationml/2006/main">
   <p:cSld>
     <p:spTree>
@@ -37913,7 +38398,7 @@
 </p:sld>
 </file>
 
-<file path=ppt/slides/slide54.xml><?xml version="1.0" encoding="utf-8"?>
+<file path=ppt/slides/slide55.xml><?xml version="1.0" encoding="utf-8"?>
 <p:sld xmlns:a="http://schemas.openxmlformats.org/drawingml/2006/main" xmlns:r="http://schemas.openxmlformats.org/officeDocument/2006/relationships" xmlns:p="http://schemas.openxmlformats.org/presentationml/2006/main">
   <p:cSld>
     <p:spTree>
@@ -37980,7 +38465,7 @@
           <p:nvPr/>
         </p:nvPicPr>
         <p:blipFill rotWithShape="1">
-          <a:blip r:embed="rId2">
+          <a:blip r:embed="rId3">
             <a:clrChange>
               <a:clrFrom>
                 <a:srgbClr val="FFFFFF"/>
@@ -38023,7 +38508,7 @@
 </p:sld>
 </file>
 
-<file path=ppt/slides/slide55.xml><?xml version="1.0" encoding="utf-8"?>
+<file path=ppt/slides/slide56.xml><?xml version="1.0" encoding="utf-8"?>
 <p:sld xmlns:a="http://schemas.openxmlformats.org/drawingml/2006/main" xmlns:r="http://schemas.openxmlformats.org/officeDocument/2006/relationships" xmlns:p="http://schemas.openxmlformats.org/presentationml/2006/main">
   <p:cSld>
     <p:spTree>
@@ -38124,7 +38609,1393 @@
 </p:sld>
 </file>
 
-<file path=ppt/slides/slide56.xml><?xml version="1.0" encoding="utf-8"?>
+<file path=ppt/slides/slide57.xml><?xml version="1.0" encoding="utf-8"?>
+<p:sld xmlns:a="http://schemas.openxmlformats.org/drawingml/2006/main" xmlns:r="http://schemas.openxmlformats.org/officeDocument/2006/relationships" xmlns:p="http://schemas.openxmlformats.org/presentationml/2006/main">
+  <p:cSld>
+    <p:spTree>
+      <p:nvGrpSpPr>
+        <p:cNvPr id="1" name=""/>
+        <p:cNvGrpSpPr/>
+        <p:nvPr/>
+      </p:nvGrpSpPr>
+      <p:grpSpPr>
+        <a:xfrm>
+          <a:off x="0" y="0"/>
+          <a:ext cx="0" cy="0"/>
+          <a:chOff x="0" y="0"/>
+          <a:chExt cx="0" cy="0"/>
+        </a:xfrm>
+      </p:grpSpPr>
+      <p:sp>
+        <p:nvSpPr>
+          <p:cNvPr id="7" name="Rectangle 6">
+            <a:extLst>
+              <a:ext uri="{FF2B5EF4-FFF2-40B4-BE49-F238E27FC236}">
+                <a16:creationId xmlns:a16="http://schemas.microsoft.com/office/drawing/2014/main" id="{5A8A3B92-3EFC-45E6-A663-675E388F7AA8}"/>
+              </a:ext>
+            </a:extLst>
+          </p:cNvPr>
+          <p:cNvSpPr/>
+          <p:nvPr/>
+        </p:nvSpPr>
+        <p:spPr>
+          <a:xfrm>
+            <a:off x="4038600" y="5257800"/>
+            <a:ext cx="4953000" cy="1558290"/>
+          </a:xfrm>
+          <a:prstGeom prst="rect">
+            <a:avLst/>
+          </a:prstGeom>
+        </p:spPr>
+        <p:style>
+          <a:lnRef idx="1">
+            <a:schemeClr val="accent3"/>
+          </a:lnRef>
+          <a:fillRef idx="2">
+            <a:schemeClr val="accent3"/>
+          </a:fillRef>
+          <a:effectRef idx="1">
+            <a:schemeClr val="accent3"/>
+          </a:effectRef>
+          <a:fontRef idx="minor">
+            <a:schemeClr val="dk1"/>
+          </a:fontRef>
+        </p:style>
+        <p:txBody>
+          <a:bodyPr rtlCol="0" anchor="ctr"/>
+          <a:lstStyle/>
+          <a:p>
+            <a:pPr algn="ctr"/>
+            <a:endParaRPr lang="en-US"/>
+          </a:p>
+        </p:txBody>
+      </p:sp>
+      <p:sp>
+        <p:nvSpPr>
+          <p:cNvPr id="2" name="Title 1">
+            <a:extLst>
+              <a:ext uri="{FF2B5EF4-FFF2-40B4-BE49-F238E27FC236}">
+                <a16:creationId xmlns:a16="http://schemas.microsoft.com/office/drawing/2014/main" id="{478CE89F-9364-4783-A80D-58F8EFD3AA60}"/>
+              </a:ext>
+            </a:extLst>
+          </p:cNvPr>
+          <p:cNvSpPr>
+            <a:spLocks noGrp="1"/>
+          </p:cNvSpPr>
+          <p:nvPr>
+            <p:ph type="title"/>
+          </p:nvPr>
+        </p:nvSpPr>
+        <p:spPr/>
+        <p:txBody>
+          <a:bodyPr/>
+          <a:lstStyle/>
+          <a:p>
+            <a:r>
+              <a:rPr lang="en-US" dirty="0"/>
+              <a:t>Summary </a:t>
+            </a:r>
+            <a:br>
+              <a:rPr lang="en-US" dirty="0"/>
+            </a:br>
+            <a:r>
+              <a:rPr lang="en-US" dirty="0"/>
+              <a:t>(Predicting Risk of Attack)</a:t>
+            </a:r>
+          </a:p>
+        </p:txBody>
+      </p:sp>
+      <p:sp>
+        <p:nvSpPr>
+          <p:cNvPr id="3" name="Content Placeholder 2">
+            <a:extLst>
+              <a:ext uri="{FF2B5EF4-FFF2-40B4-BE49-F238E27FC236}">
+                <a16:creationId xmlns:a16="http://schemas.microsoft.com/office/drawing/2014/main" id="{117F6BE4-533B-48CD-82D1-FA311DDD8E59}"/>
+              </a:ext>
+            </a:extLst>
+          </p:cNvPr>
+          <p:cNvSpPr>
+            <a:spLocks noGrp="1"/>
+          </p:cNvSpPr>
+          <p:nvPr>
+            <p:ph idx="1"/>
+          </p:nvPr>
+        </p:nvSpPr>
+        <p:spPr>
+          <a:xfrm>
+            <a:off x="1028700" y="2286000"/>
+            <a:ext cx="7200900" cy="3242310"/>
+          </a:xfrm>
+        </p:spPr>
+        <p:txBody>
+          <a:bodyPr/>
+          <a:lstStyle/>
+          <a:p>
+            <a:r>
+              <a:rPr lang="en-US" dirty="0"/>
+              <a:t>Geographic variables highly predictive of risk</a:t>
+            </a:r>
+          </a:p>
+          <a:p>
+            <a:r>
+              <a:rPr lang="en-US" dirty="0" err="1"/>
+              <a:t>Kmeans</a:t>
+            </a:r>
+            <a:r>
+              <a:rPr lang="en-US" dirty="0"/>
+              <a:t> worked very well for determining highly predictive geographic clusters</a:t>
+            </a:r>
+          </a:p>
+          <a:p>
+            <a:pPr lvl="1"/>
+            <a:r>
+              <a:rPr lang="en-US" dirty="0"/>
+              <a:t>additional experimentation with cluster size needed</a:t>
+            </a:r>
+          </a:p>
+          <a:p>
+            <a:r>
+              <a:rPr lang="en-US" dirty="0"/>
+              <a:t>Most algorithms performed well (other than QDA), but Random Forest was the winner based on AUC</a:t>
+            </a:r>
+          </a:p>
+          <a:p>
+            <a:r>
+              <a:rPr lang="en-US" dirty="0"/>
+              <a:t>Confusion matrices for Random Forest vs SVM suggest that SVM may be superior if we want to minimize misclassification of high-risk as low-risk</a:t>
+            </a:r>
+          </a:p>
+          <a:p>
+            <a:endParaRPr lang="en-US" dirty="0"/>
+          </a:p>
+          <a:p>
+            <a:endParaRPr lang="en-US" dirty="0"/>
+          </a:p>
+        </p:txBody>
+      </p:sp>
+      <p:graphicFrame>
+        <p:nvGraphicFramePr>
+          <p:cNvPr id="5" name="Table 4">
+            <a:extLst>
+              <a:ext uri="{FF2B5EF4-FFF2-40B4-BE49-F238E27FC236}">
+                <a16:creationId xmlns:a16="http://schemas.microsoft.com/office/drawing/2014/main" id="{470FCEBF-74CB-4289-8A5A-CD79ECD1205C}"/>
+              </a:ext>
+            </a:extLst>
+          </p:cNvPr>
+          <p:cNvGraphicFramePr>
+            <a:graphicFrameLocks noGrp="1"/>
+          </p:cNvGraphicFramePr>
+          <p:nvPr>
+            <p:extLst>
+              <p:ext uri="{D42A27DB-BD31-4B8C-83A1-F6EECF244321}">
+                <p14:modId xmlns:p14="http://schemas.microsoft.com/office/powerpoint/2010/main" val="2685582460"/>
+              </p:ext>
+            </p:extLst>
+          </p:nvPr>
+        </p:nvGraphicFramePr>
+        <p:xfrm>
+          <a:off x="5029200" y="5429934"/>
+          <a:ext cx="3721100" cy="1396950"/>
+        </p:xfrm>
+        <a:graphic>
+          <a:graphicData uri="http://schemas.openxmlformats.org/drawingml/2006/table">
+            <a:tbl>
+              <a:tblPr/>
+              <a:tblGrid>
+                <a:gridCol w="482600">
+                  <a:extLst>
+                    <a:ext uri="{9D8B030D-6E8A-4147-A177-3AD203B41FA5}">
+                      <a16:colId xmlns:a16="http://schemas.microsoft.com/office/drawing/2014/main" val="1597401106"/>
+                    </a:ext>
+                  </a:extLst>
+                </a:gridCol>
+                <a:gridCol w="546100">
+                  <a:extLst>
+                    <a:ext uri="{9D8B030D-6E8A-4147-A177-3AD203B41FA5}">
+                      <a16:colId xmlns:a16="http://schemas.microsoft.com/office/drawing/2014/main" val="3636374955"/>
+                    </a:ext>
+                  </a:extLst>
+                </a:gridCol>
+                <a:gridCol w="508000">
+                  <a:extLst>
+                    <a:ext uri="{9D8B030D-6E8A-4147-A177-3AD203B41FA5}">
+                      <a16:colId xmlns:a16="http://schemas.microsoft.com/office/drawing/2014/main" val="58648250"/>
+                    </a:ext>
+                  </a:extLst>
+                </a:gridCol>
+                <a:gridCol w="546100">
+                  <a:extLst>
+                    <a:ext uri="{9D8B030D-6E8A-4147-A177-3AD203B41FA5}">
+                      <a16:colId xmlns:a16="http://schemas.microsoft.com/office/drawing/2014/main" val="1824869407"/>
+                    </a:ext>
+                  </a:extLst>
+                </a:gridCol>
+                <a:gridCol w="546100">
+                  <a:extLst>
+                    <a:ext uri="{9D8B030D-6E8A-4147-A177-3AD203B41FA5}">
+                      <a16:colId xmlns:a16="http://schemas.microsoft.com/office/drawing/2014/main" val="3589537482"/>
+                    </a:ext>
+                  </a:extLst>
+                </a:gridCol>
+                <a:gridCol w="546100">
+                  <a:extLst>
+                    <a:ext uri="{9D8B030D-6E8A-4147-A177-3AD203B41FA5}">
+                      <a16:colId xmlns:a16="http://schemas.microsoft.com/office/drawing/2014/main" val="2368826060"/>
+                    </a:ext>
+                  </a:extLst>
+                </a:gridCol>
+                <a:gridCol w="546100">
+                  <a:extLst>
+                    <a:ext uri="{9D8B030D-6E8A-4147-A177-3AD203B41FA5}">
+                      <a16:colId xmlns:a16="http://schemas.microsoft.com/office/drawing/2014/main" val="1639210709"/>
+                    </a:ext>
+                  </a:extLst>
+                </a:gridCol>
+              </a:tblGrid>
+              <a:tr h="246063">
+                <a:tc>
+                  <a:txBody>
+                    <a:bodyPr/>
+                    <a:lstStyle/>
+                    <a:p>
+                      <a:pPr algn="ctr" fontAlgn="b"/>
+                      <a:endParaRPr lang="en-US" sz="1600" b="0" i="0" u="none" strike="noStrike">
+                        <a:solidFill>
+                          <a:srgbClr val="000000"/>
+                        </a:solidFill>
+                        <a:effectLst/>
+                        <a:latin typeface="Consolas" panose="020B0609020204030204" pitchFamily="49" charset="0"/>
+                      </a:endParaRPr>
+                    </a:p>
+                  </a:txBody>
+                  <a:tcPr marL="7620" marR="7620" marT="7620" marB="0" anchor="b">
+                    <a:lnL>
+                      <a:noFill/>
+                    </a:lnL>
+                    <a:lnR>
+                      <a:noFill/>
+                    </a:lnR>
+                    <a:lnT>
+                      <a:noFill/>
+                    </a:lnT>
+                    <a:lnB>
+                      <a:noFill/>
+                    </a:lnB>
+                  </a:tcPr>
+                </a:tc>
+                <a:tc>
+                  <a:txBody>
+                    <a:bodyPr/>
+                    <a:lstStyle/>
+                    <a:p>
+                      <a:pPr algn="ctr" fontAlgn="b"/>
+                      <a:r>
+                        <a:rPr lang="en-US" sz="1600" b="1" i="0" u="none" strike="noStrike" dirty="0">
+                          <a:solidFill>
+                            <a:srgbClr val="000000"/>
+                          </a:solidFill>
+                          <a:effectLst/>
+                          <a:latin typeface="Consolas" panose="020B0609020204030204" pitchFamily="49" charset="0"/>
+                        </a:rPr>
+                        <a:t>Low</a:t>
+                      </a:r>
+                    </a:p>
+                  </a:txBody>
+                  <a:tcPr marL="7620" marR="7620" marT="7620" marB="0" anchor="b">
+                    <a:lnL>
+                      <a:noFill/>
+                    </a:lnL>
+                    <a:lnR>
+                      <a:noFill/>
+                    </a:lnR>
+                    <a:lnT>
+                      <a:noFill/>
+                    </a:lnT>
+                    <a:lnB>
+                      <a:noFill/>
+                    </a:lnB>
+                  </a:tcPr>
+                </a:tc>
+                <a:tc>
+                  <a:txBody>
+                    <a:bodyPr/>
+                    <a:lstStyle/>
+                    <a:p>
+                      <a:pPr algn="ctr" fontAlgn="b"/>
+                      <a:r>
+                        <a:rPr lang="en-US" sz="1600" b="1" i="0" u="none" strike="noStrike" dirty="0">
+                          <a:solidFill>
+                            <a:srgbClr val="000000"/>
+                          </a:solidFill>
+                          <a:effectLst/>
+                          <a:latin typeface="Consolas" panose="020B0609020204030204" pitchFamily="49" charset="0"/>
+                        </a:rPr>
+                        <a:t>High</a:t>
+                      </a:r>
+                    </a:p>
+                  </a:txBody>
+                  <a:tcPr marL="7620" marR="7620" marT="7620" marB="0" anchor="b">
+                    <a:lnL>
+                      <a:noFill/>
+                    </a:lnL>
+                    <a:lnR>
+                      <a:noFill/>
+                    </a:lnR>
+                    <a:lnT>
+                      <a:noFill/>
+                    </a:lnT>
+                    <a:lnB>
+                      <a:noFill/>
+                    </a:lnB>
+                  </a:tcPr>
+                </a:tc>
+                <a:tc>
+                  <a:txBody>
+                    <a:bodyPr/>
+                    <a:lstStyle/>
+                    <a:p>
+                      <a:pPr algn="l" fontAlgn="b"/>
+                      <a:endParaRPr lang="en-US" sz="1600" b="0" i="0" u="none" strike="noStrike">
+                        <a:solidFill>
+                          <a:srgbClr val="000000"/>
+                        </a:solidFill>
+                        <a:effectLst/>
+                        <a:latin typeface="Calibri" panose="020F0502020204030204" pitchFamily="34" charset="0"/>
+                      </a:endParaRPr>
+                    </a:p>
+                  </a:txBody>
+                  <a:tcPr marL="7620" marR="7620" marT="7620" marB="0" anchor="b">
+                    <a:lnL>
+                      <a:noFill/>
+                    </a:lnL>
+                    <a:lnR>
+                      <a:noFill/>
+                    </a:lnR>
+                    <a:lnT>
+                      <a:noFill/>
+                    </a:lnT>
+                    <a:lnB>
+                      <a:noFill/>
+                    </a:lnB>
+                  </a:tcPr>
+                </a:tc>
+                <a:tc>
+                  <a:txBody>
+                    <a:bodyPr/>
+                    <a:lstStyle/>
+                    <a:p>
+                      <a:pPr algn="ctr" fontAlgn="b"/>
+                      <a:endParaRPr lang="en-US" sz="1600" b="0" i="0" u="none" strike="noStrike">
+                        <a:solidFill>
+                          <a:srgbClr val="000000"/>
+                        </a:solidFill>
+                        <a:effectLst/>
+                        <a:latin typeface="Consolas" panose="020B0609020204030204" pitchFamily="49" charset="0"/>
+                      </a:endParaRPr>
+                    </a:p>
+                  </a:txBody>
+                  <a:tcPr marL="7620" marR="7620" marT="7620" marB="0" anchor="b">
+                    <a:lnL>
+                      <a:noFill/>
+                    </a:lnL>
+                    <a:lnR>
+                      <a:noFill/>
+                    </a:lnR>
+                    <a:lnT>
+                      <a:noFill/>
+                    </a:lnT>
+                    <a:lnB>
+                      <a:noFill/>
+                    </a:lnB>
+                  </a:tcPr>
+                </a:tc>
+                <a:tc>
+                  <a:txBody>
+                    <a:bodyPr/>
+                    <a:lstStyle/>
+                    <a:p>
+                      <a:pPr algn="ctr" fontAlgn="b"/>
+                      <a:r>
+                        <a:rPr lang="en-US" sz="1600" b="1" i="0" u="none" strike="noStrike" dirty="0">
+                          <a:solidFill>
+                            <a:srgbClr val="000000"/>
+                          </a:solidFill>
+                          <a:effectLst/>
+                          <a:latin typeface="Consolas" panose="020B0609020204030204" pitchFamily="49" charset="0"/>
+                        </a:rPr>
+                        <a:t>Low</a:t>
+                      </a:r>
+                    </a:p>
+                  </a:txBody>
+                  <a:tcPr marL="7620" marR="7620" marT="7620" marB="0" anchor="b">
+                    <a:lnL>
+                      <a:noFill/>
+                    </a:lnL>
+                    <a:lnR>
+                      <a:noFill/>
+                    </a:lnR>
+                    <a:lnT>
+                      <a:noFill/>
+                    </a:lnT>
+                    <a:lnB>
+                      <a:noFill/>
+                    </a:lnB>
+                  </a:tcPr>
+                </a:tc>
+                <a:tc>
+                  <a:txBody>
+                    <a:bodyPr/>
+                    <a:lstStyle/>
+                    <a:p>
+                      <a:pPr algn="ctr" fontAlgn="b"/>
+                      <a:r>
+                        <a:rPr lang="en-US" sz="1600" b="1" i="0" u="none" strike="noStrike" dirty="0">
+                          <a:solidFill>
+                            <a:srgbClr val="000000"/>
+                          </a:solidFill>
+                          <a:effectLst/>
+                          <a:latin typeface="Consolas" panose="020B0609020204030204" pitchFamily="49" charset="0"/>
+                        </a:rPr>
+                        <a:t>High</a:t>
+                      </a:r>
+                    </a:p>
+                  </a:txBody>
+                  <a:tcPr marL="7620" marR="7620" marT="7620" marB="0" anchor="b">
+                    <a:lnL>
+                      <a:noFill/>
+                    </a:lnL>
+                    <a:lnR>
+                      <a:noFill/>
+                    </a:lnR>
+                    <a:lnT>
+                      <a:noFill/>
+                    </a:lnT>
+                    <a:lnB>
+                      <a:noFill/>
+                    </a:lnB>
+                  </a:tcPr>
+                </a:tc>
+                <a:extLst>
+                  <a:ext uri="{0D108BD9-81ED-4DB2-BD59-A6C34878D82A}">
+                    <a16:rowId xmlns:a16="http://schemas.microsoft.com/office/drawing/2014/main" val="1573212039"/>
+                  </a:ext>
+                </a:extLst>
+              </a:tr>
+              <a:tr h="319882">
+                <a:tc>
+                  <a:txBody>
+                    <a:bodyPr/>
+                    <a:lstStyle/>
+                    <a:p>
+                      <a:pPr algn="ctr" fontAlgn="b"/>
+                      <a:r>
+                        <a:rPr lang="en-US" sz="1600" b="1" i="0" u="none" strike="noStrike" dirty="0">
+                          <a:solidFill>
+                            <a:srgbClr val="000000"/>
+                          </a:solidFill>
+                          <a:effectLst/>
+                          <a:latin typeface="Consolas" panose="020B0609020204030204" pitchFamily="49" charset="0"/>
+                        </a:rPr>
+                        <a:t>Low</a:t>
+                      </a:r>
+                    </a:p>
+                  </a:txBody>
+                  <a:tcPr marL="7620" marR="7620" marT="7620" marB="0" anchor="b">
+                    <a:lnL>
+                      <a:noFill/>
+                    </a:lnL>
+                    <a:lnR>
+                      <a:noFill/>
+                    </a:lnR>
+                    <a:lnT>
+                      <a:noFill/>
+                    </a:lnT>
+                    <a:lnB>
+                      <a:noFill/>
+                    </a:lnB>
+                  </a:tcPr>
+                </a:tc>
+                <a:tc>
+                  <a:txBody>
+                    <a:bodyPr/>
+                    <a:lstStyle/>
+                    <a:p>
+                      <a:pPr algn="r" fontAlgn="ctr"/>
+                      <a:r>
+                        <a:rPr lang="en-US" sz="1600" b="0" i="0" u="none" strike="noStrike">
+                          <a:solidFill>
+                            <a:srgbClr val="000000"/>
+                          </a:solidFill>
+                          <a:effectLst/>
+                          <a:latin typeface="Calibri" panose="020F0502020204030204" pitchFamily="34" charset="0"/>
+                        </a:rPr>
+                        <a:t>451</a:t>
+                      </a:r>
+                    </a:p>
+                  </a:txBody>
+                  <a:tcPr marL="7620" marR="7620" marT="7620" marB="0" anchor="ctr">
+                    <a:lnL>
+                      <a:noFill/>
+                    </a:lnL>
+                    <a:lnR>
+                      <a:noFill/>
+                    </a:lnR>
+                    <a:lnT>
+                      <a:noFill/>
+                    </a:lnT>
+                    <a:lnB>
+                      <a:noFill/>
+                    </a:lnB>
+                    <a:solidFill>
+                      <a:srgbClr val="A9D08E"/>
+                    </a:solidFill>
+                  </a:tcPr>
+                </a:tc>
+                <a:tc>
+                  <a:txBody>
+                    <a:bodyPr/>
+                    <a:lstStyle/>
+                    <a:p>
+                      <a:pPr algn="r" fontAlgn="ctr"/>
+                      <a:r>
+                        <a:rPr lang="en-US" sz="1600" b="0" i="0" u="none" strike="noStrike" dirty="0">
+                          <a:solidFill>
+                            <a:srgbClr val="FFFFFF"/>
+                          </a:solidFill>
+                          <a:effectLst/>
+                          <a:latin typeface="Calibri" panose="020F0502020204030204" pitchFamily="34" charset="0"/>
+                        </a:rPr>
+                        <a:t>16</a:t>
+                      </a:r>
+                    </a:p>
+                  </a:txBody>
+                  <a:tcPr marL="7620" marR="7620" marT="7620" marB="0" anchor="ctr">
+                    <a:lnL>
+                      <a:noFill/>
+                    </a:lnL>
+                    <a:lnR>
+                      <a:noFill/>
+                    </a:lnR>
+                    <a:lnT>
+                      <a:noFill/>
+                    </a:lnT>
+                    <a:lnB>
+                      <a:noFill/>
+                    </a:lnB>
+                    <a:solidFill>
+                      <a:srgbClr val="D86A6A"/>
+                    </a:solidFill>
+                  </a:tcPr>
+                </a:tc>
+                <a:tc>
+                  <a:txBody>
+                    <a:bodyPr/>
+                    <a:lstStyle/>
+                    <a:p>
+                      <a:pPr algn="l" fontAlgn="b"/>
+                      <a:endParaRPr lang="en-US" sz="1600" b="0" i="0" u="none" strike="noStrike" dirty="0">
+                        <a:solidFill>
+                          <a:srgbClr val="000000"/>
+                        </a:solidFill>
+                        <a:effectLst/>
+                        <a:latin typeface="Calibri" panose="020F0502020204030204" pitchFamily="34" charset="0"/>
+                      </a:endParaRPr>
+                    </a:p>
+                  </a:txBody>
+                  <a:tcPr marL="7620" marR="7620" marT="7620" marB="0" anchor="b">
+                    <a:lnL>
+                      <a:noFill/>
+                    </a:lnL>
+                    <a:lnR>
+                      <a:noFill/>
+                    </a:lnR>
+                    <a:lnT>
+                      <a:noFill/>
+                    </a:lnT>
+                    <a:lnB>
+                      <a:noFill/>
+                    </a:lnB>
+                  </a:tcPr>
+                </a:tc>
+                <a:tc>
+                  <a:txBody>
+                    <a:bodyPr/>
+                    <a:lstStyle/>
+                    <a:p>
+                      <a:pPr algn="ctr" fontAlgn="b"/>
+                      <a:r>
+                        <a:rPr lang="en-US" sz="1600" b="1" i="0" u="none" strike="noStrike" dirty="0">
+                          <a:solidFill>
+                            <a:srgbClr val="000000"/>
+                          </a:solidFill>
+                          <a:effectLst/>
+                          <a:latin typeface="Consolas" panose="020B0609020204030204" pitchFamily="49" charset="0"/>
+                        </a:rPr>
+                        <a:t>Low</a:t>
+                      </a:r>
+                    </a:p>
+                  </a:txBody>
+                  <a:tcPr marL="7620" marR="7620" marT="7620" marB="0" anchor="b">
+                    <a:lnL>
+                      <a:noFill/>
+                    </a:lnL>
+                    <a:lnR>
+                      <a:noFill/>
+                    </a:lnR>
+                    <a:lnT>
+                      <a:noFill/>
+                    </a:lnT>
+                    <a:lnB>
+                      <a:noFill/>
+                    </a:lnB>
+                  </a:tcPr>
+                </a:tc>
+                <a:tc>
+                  <a:txBody>
+                    <a:bodyPr/>
+                    <a:lstStyle/>
+                    <a:p>
+                      <a:pPr algn="r" fontAlgn="ctr"/>
+                      <a:r>
+                        <a:rPr lang="en-US" sz="1600" b="0" i="0" u="none" strike="noStrike" dirty="0">
+                          <a:solidFill>
+                            <a:srgbClr val="000000"/>
+                          </a:solidFill>
+                          <a:effectLst/>
+                          <a:latin typeface="Calibri" panose="020F0502020204030204" pitchFamily="34" charset="0"/>
+                        </a:rPr>
+                        <a:t>457</a:t>
+                      </a:r>
+                    </a:p>
+                  </a:txBody>
+                  <a:tcPr marL="7620" marR="7620" marT="7620" marB="0" anchor="ctr">
+                    <a:lnL>
+                      <a:noFill/>
+                    </a:lnL>
+                    <a:lnR>
+                      <a:noFill/>
+                    </a:lnR>
+                    <a:lnT>
+                      <a:noFill/>
+                    </a:lnT>
+                    <a:lnB>
+                      <a:noFill/>
+                    </a:lnB>
+                    <a:solidFill>
+                      <a:srgbClr val="A9D08E"/>
+                    </a:solidFill>
+                  </a:tcPr>
+                </a:tc>
+                <a:tc>
+                  <a:txBody>
+                    <a:bodyPr/>
+                    <a:lstStyle/>
+                    <a:p>
+                      <a:pPr algn="r" fontAlgn="ctr"/>
+                      <a:r>
+                        <a:rPr lang="en-US" sz="1600" b="0" i="0" u="none" strike="noStrike" dirty="0">
+                          <a:solidFill>
+                            <a:srgbClr val="FFFFFF"/>
+                          </a:solidFill>
+                          <a:effectLst/>
+                          <a:latin typeface="Calibri" panose="020F0502020204030204" pitchFamily="34" charset="0"/>
+                        </a:rPr>
+                        <a:t>10</a:t>
+                      </a:r>
+                    </a:p>
+                  </a:txBody>
+                  <a:tcPr marL="7620" marR="7620" marT="7620" marB="0" anchor="ctr">
+                    <a:lnL>
+                      <a:noFill/>
+                    </a:lnL>
+                    <a:lnR>
+                      <a:noFill/>
+                    </a:lnR>
+                    <a:lnT>
+                      <a:noFill/>
+                    </a:lnT>
+                    <a:lnB>
+                      <a:noFill/>
+                    </a:lnB>
+                    <a:solidFill>
+                      <a:srgbClr val="D86A6A"/>
+                    </a:solidFill>
+                  </a:tcPr>
+                </a:tc>
+                <a:extLst>
+                  <a:ext uri="{0D108BD9-81ED-4DB2-BD59-A6C34878D82A}">
+                    <a16:rowId xmlns:a16="http://schemas.microsoft.com/office/drawing/2014/main" val="4101417980"/>
+                  </a:ext>
+                </a:extLst>
+              </a:tr>
+              <a:tr h="287074">
+                <a:tc>
+                  <a:txBody>
+                    <a:bodyPr/>
+                    <a:lstStyle/>
+                    <a:p>
+                      <a:pPr algn="ctr" fontAlgn="b"/>
+                      <a:r>
+                        <a:rPr lang="en-US" sz="1600" b="1" i="0" u="none" strike="noStrike">
+                          <a:solidFill>
+                            <a:srgbClr val="000000"/>
+                          </a:solidFill>
+                          <a:effectLst/>
+                          <a:latin typeface="Consolas" panose="020B0609020204030204" pitchFamily="49" charset="0"/>
+                        </a:rPr>
+                        <a:t>High</a:t>
+                      </a:r>
+                    </a:p>
+                  </a:txBody>
+                  <a:tcPr marL="7620" marR="7620" marT="7620" marB="0" anchor="b">
+                    <a:lnL>
+                      <a:noFill/>
+                    </a:lnL>
+                    <a:lnR>
+                      <a:noFill/>
+                    </a:lnR>
+                    <a:lnT>
+                      <a:noFill/>
+                    </a:lnT>
+                    <a:lnB>
+                      <a:noFill/>
+                    </a:lnB>
+                  </a:tcPr>
+                </a:tc>
+                <a:tc>
+                  <a:txBody>
+                    <a:bodyPr/>
+                    <a:lstStyle/>
+                    <a:p>
+                      <a:pPr algn="r" fontAlgn="ctr"/>
+                      <a:r>
+                        <a:rPr lang="en-US" sz="1600" b="0" i="0" u="none" strike="noStrike">
+                          <a:solidFill>
+                            <a:srgbClr val="FFFFFF"/>
+                          </a:solidFill>
+                          <a:effectLst/>
+                          <a:latin typeface="Calibri" panose="020F0502020204030204" pitchFamily="34" charset="0"/>
+                        </a:rPr>
+                        <a:t>14</a:t>
+                      </a:r>
+                    </a:p>
+                  </a:txBody>
+                  <a:tcPr marL="7620" marR="7620" marT="7620" marB="0" anchor="ctr">
+                    <a:lnL>
+                      <a:noFill/>
+                    </a:lnL>
+                    <a:lnR>
+                      <a:noFill/>
+                    </a:lnR>
+                    <a:lnT>
+                      <a:noFill/>
+                    </a:lnT>
+                    <a:lnB>
+                      <a:noFill/>
+                    </a:lnB>
+                    <a:solidFill>
+                      <a:srgbClr val="D86A6A"/>
+                    </a:solidFill>
+                  </a:tcPr>
+                </a:tc>
+                <a:tc>
+                  <a:txBody>
+                    <a:bodyPr/>
+                    <a:lstStyle/>
+                    <a:p>
+                      <a:pPr algn="r" fontAlgn="ctr"/>
+                      <a:r>
+                        <a:rPr lang="en-US" sz="1600" b="0" i="0" u="none" strike="noStrike">
+                          <a:solidFill>
+                            <a:srgbClr val="000000"/>
+                          </a:solidFill>
+                          <a:effectLst/>
+                          <a:latin typeface="Calibri" panose="020F0502020204030204" pitchFamily="34" charset="0"/>
+                        </a:rPr>
+                        <a:t>38</a:t>
+                      </a:r>
+                    </a:p>
+                  </a:txBody>
+                  <a:tcPr marL="7620" marR="7620" marT="7620" marB="0" anchor="ctr">
+                    <a:lnL>
+                      <a:noFill/>
+                    </a:lnL>
+                    <a:lnR>
+                      <a:noFill/>
+                    </a:lnR>
+                    <a:lnT>
+                      <a:noFill/>
+                    </a:lnT>
+                    <a:lnB>
+                      <a:noFill/>
+                    </a:lnB>
+                    <a:solidFill>
+                      <a:srgbClr val="A9D08E"/>
+                    </a:solidFill>
+                  </a:tcPr>
+                </a:tc>
+                <a:tc>
+                  <a:txBody>
+                    <a:bodyPr/>
+                    <a:lstStyle/>
+                    <a:p>
+                      <a:pPr algn="l" fontAlgn="b"/>
+                      <a:endParaRPr lang="en-US" sz="1600" b="0" i="0" u="none" strike="noStrike">
+                        <a:solidFill>
+                          <a:srgbClr val="000000"/>
+                        </a:solidFill>
+                        <a:effectLst/>
+                        <a:latin typeface="Calibri" panose="020F0502020204030204" pitchFamily="34" charset="0"/>
+                      </a:endParaRPr>
+                    </a:p>
+                  </a:txBody>
+                  <a:tcPr marL="7620" marR="7620" marT="7620" marB="0" anchor="b">
+                    <a:lnL>
+                      <a:noFill/>
+                    </a:lnL>
+                    <a:lnR>
+                      <a:noFill/>
+                    </a:lnR>
+                    <a:lnT>
+                      <a:noFill/>
+                    </a:lnT>
+                    <a:lnB>
+                      <a:noFill/>
+                    </a:lnB>
+                  </a:tcPr>
+                </a:tc>
+                <a:tc>
+                  <a:txBody>
+                    <a:bodyPr/>
+                    <a:lstStyle/>
+                    <a:p>
+                      <a:pPr algn="ctr" fontAlgn="b"/>
+                      <a:r>
+                        <a:rPr lang="en-US" sz="1600" b="1" i="0" u="none" strike="noStrike">
+                          <a:solidFill>
+                            <a:srgbClr val="000000"/>
+                          </a:solidFill>
+                          <a:effectLst/>
+                          <a:latin typeface="Consolas" panose="020B0609020204030204" pitchFamily="49" charset="0"/>
+                        </a:rPr>
+                        <a:t>High</a:t>
+                      </a:r>
+                    </a:p>
+                  </a:txBody>
+                  <a:tcPr marL="7620" marR="7620" marT="7620" marB="0" anchor="b">
+                    <a:lnL>
+                      <a:noFill/>
+                    </a:lnL>
+                    <a:lnR>
+                      <a:noFill/>
+                    </a:lnR>
+                    <a:lnT>
+                      <a:noFill/>
+                    </a:lnT>
+                    <a:lnB>
+                      <a:noFill/>
+                    </a:lnB>
+                  </a:tcPr>
+                </a:tc>
+                <a:tc>
+                  <a:txBody>
+                    <a:bodyPr/>
+                    <a:lstStyle/>
+                    <a:p>
+                      <a:pPr algn="r" fontAlgn="ctr"/>
+                      <a:r>
+                        <a:rPr lang="en-US" sz="1600" b="0" i="0" u="none" strike="noStrike">
+                          <a:solidFill>
+                            <a:srgbClr val="FFFFFF"/>
+                          </a:solidFill>
+                          <a:effectLst/>
+                          <a:latin typeface="Calibri" panose="020F0502020204030204" pitchFamily="34" charset="0"/>
+                        </a:rPr>
+                        <a:t>20</a:t>
+                      </a:r>
+                    </a:p>
+                  </a:txBody>
+                  <a:tcPr marL="7620" marR="7620" marT="7620" marB="0" anchor="ctr">
+                    <a:lnL>
+                      <a:noFill/>
+                    </a:lnL>
+                    <a:lnR>
+                      <a:noFill/>
+                    </a:lnR>
+                    <a:lnT>
+                      <a:noFill/>
+                    </a:lnT>
+                    <a:lnB>
+                      <a:noFill/>
+                    </a:lnB>
+                    <a:solidFill>
+                      <a:srgbClr val="D86A6A"/>
+                    </a:solidFill>
+                  </a:tcPr>
+                </a:tc>
+                <a:tc>
+                  <a:txBody>
+                    <a:bodyPr/>
+                    <a:lstStyle/>
+                    <a:p>
+                      <a:pPr algn="r" fontAlgn="ctr"/>
+                      <a:r>
+                        <a:rPr lang="en-US" sz="1600" b="0" i="0" u="none" strike="noStrike" dirty="0">
+                          <a:solidFill>
+                            <a:srgbClr val="000000"/>
+                          </a:solidFill>
+                          <a:effectLst/>
+                          <a:latin typeface="Calibri" panose="020F0502020204030204" pitchFamily="34" charset="0"/>
+                        </a:rPr>
+                        <a:t>32</a:t>
+                      </a:r>
+                    </a:p>
+                  </a:txBody>
+                  <a:tcPr marL="7620" marR="7620" marT="7620" marB="0" anchor="ctr">
+                    <a:lnL>
+                      <a:noFill/>
+                    </a:lnL>
+                    <a:lnR>
+                      <a:noFill/>
+                    </a:lnR>
+                    <a:lnT>
+                      <a:noFill/>
+                    </a:lnT>
+                    <a:lnB>
+                      <a:noFill/>
+                    </a:lnB>
+                    <a:solidFill>
+                      <a:srgbClr val="A9D08E"/>
+                    </a:solidFill>
+                  </a:tcPr>
+                </a:tc>
+                <a:extLst>
+                  <a:ext uri="{0D108BD9-81ED-4DB2-BD59-A6C34878D82A}">
+                    <a16:rowId xmlns:a16="http://schemas.microsoft.com/office/drawing/2014/main" val="1888466839"/>
+                  </a:ext>
+                </a:extLst>
+              </a:tr>
+              <a:tr h="246063">
+                <a:tc>
+                  <a:txBody>
+                    <a:bodyPr/>
+                    <a:lstStyle/>
+                    <a:p>
+                      <a:pPr algn="l" fontAlgn="b"/>
+                      <a:endParaRPr lang="en-US" sz="1600" b="0" i="0" u="none" strike="noStrike">
+                        <a:solidFill>
+                          <a:srgbClr val="000000"/>
+                        </a:solidFill>
+                        <a:effectLst/>
+                        <a:latin typeface="Calibri" panose="020F0502020204030204" pitchFamily="34" charset="0"/>
+                      </a:endParaRPr>
+                    </a:p>
+                  </a:txBody>
+                  <a:tcPr marL="7620" marR="7620" marT="7620" marB="0" anchor="b">
+                    <a:lnL>
+                      <a:noFill/>
+                    </a:lnL>
+                    <a:lnR>
+                      <a:noFill/>
+                    </a:lnR>
+                    <a:lnT>
+                      <a:noFill/>
+                    </a:lnT>
+                    <a:lnB>
+                      <a:noFill/>
+                    </a:lnB>
+                  </a:tcPr>
+                </a:tc>
+                <a:tc>
+                  <a:txBody>
+                    <a:bodyPr/>
+                    <a:lstStyle/>
+                    <a:p>
+                      <a:pPr algn="l" fontAlgn="b"/>
+                      <a:endParaRPr lang="en-US" sz="1600" b="0" i="0" u="none" strike="noStrike">
+                        <a:solidFill>
+                          <a:srgbClr val="000000"/>
+                        </a:solidFill>
+                        <a:effectLst/>
+                        <a:latin typeface="Calibri" panose="020F0502020204030204" pitchFamily="34" charset="0"/>
+                      </a:endParaRPr>
+                    </a:p>
+                  </a:txBody>
+                  <a:tcPr marL="7620" marR="7620" marT="7620" marB="0" anchor="b">
+                    <a:lnL>
+                      <a:noFill/>
+                    </a:lnL>
+                    <a:lnR>
+                      <a:noFill/>
+                    </a:lnR>
+                    <a:lnT>
+                      <a:noFill/>
+                    </a:lnT>
+                    <a:lnB>
+                      <a:noFill/>
+                    </a:lnB>
+                  </a:tcPr>
+                </a:tc>
+                <a:tc>
+                  <a:txBody>
+                    <a:bodyPr/>
+                    <a:lstStyle/>
+                    <a:p>
+                      <a:pPr algn="l" fontAlgn="b"/>
+                      <a:endParaRPr lang="en-US" sz="1600" b="0" i="0" u="none" strike="noStrike">
+                        <a:solidFill>
+                          <a:srgbClr val="000000"/>
+                        </a:solidFill>
+                        <a:effectLst/>
+                        <a:latin typeface="Calibri" panose="020F0502020204030204" pitchFamily="34" charset="0"/>
+                      </a:endParaRPr>
+                    </a:p>
+                  </a:txBody>
+                  <a:tcPr marL="7620" marR="7620" marT="7620" marB="0" anchor="b">
+                    <a:lnL>
+                      <a:noFill/>
+                    </a:lnL>
+                    <a:lnR>
+                      <a:noFill/>
+                    </a:lnR>
+                    <a:lnT>
+                      <a:noFill/>
+                    </a:lnT>
+                    <a:lnB>
+                      <a:noFill/>
+                    </a:lnB>
+                  </a:tcPr>
+                </a:tc>
+                <a:tc>
+                  <a:txBody>
+                    <a:bodyPr/>
+                    <a:lstStyle/>
+                    <a:p>
+                      <a:pPr algn="l" fontAlgn="b"/>
+                      <a:endParaRPr lang="en-US" sz="1600" b="0" i="0" u="none" strike="noStrike">
+                        <a:solidFill>
+                          <a:srgbClr val="000000"/>
+                        </a:solidFill>
+                        <a:effectLst/>
+                        <a:latin typeface="Calibri" panose="020F0502020204030204" pitchFamily="34" charset="0"/>
+                      </a:endParaRPr>
+                    </a:p>
+                  </a:txBody>
+                  <a:tcPr marL="7620" marR="7620" marT="7620" marB="0" anchor="b">
+                    <a:lnL>
+                      <a:noFill/>
+                    </a:lnL>
+                    <a:lnR>
+                      <a:noFill/>
+                    </a:lnR>
+                    <a:lnT>
+                      <a:noFill/>
+                    </a:lnT>
+                    <a:lnB>
+                      <a:noFill/>
+                    </a:lnB>
+                  </a:tcPr>
+                </a:tc>
+                <a:tc>
+                  <a:txBody>
+                    <a:bodyPr/>
+                    <a:lstStyle/>
+                    <a:p>
+                      <a:pPr algn="l" fontAlgn="b"/>
+                      <a:endParaRPr lang="en-US" sz="1600" b="0" i="0" u="none" strike="noStrike">
+                        <a:solidFill>
+                          <a:srgbClr val="000000"/>
+                        </a:solidFill>
+                        <a:effectLst/>
+                        <a:latin typeface="Calibri" panose="020F0502020204030204" pitchFamily="34" charset="0"/>
+                      </a:endParaRPr>
+                    </a:p>
+                  </a:txBody>
+                  <a:tcPr marL="7620" marR="7620" marT="7620" marB="0" anchor="b">
+                    <a:lnL>
+                      <a:noFill/>
+                    </a:lnL>
+                    <a:lnR>
+                      <a:noFill/>
+                    </a:lnR>
+                    <a:lnT>
+                      <a:noFill/>
+                    </a:lnT>
+                    <a:lnB>
+                      <a:noFill/>
+                    </a:lnB>
+                  </a:tcPr>
+                </a:tc>
+                <a:tc>
+                  <a:txBody>
+                    <a:bodyPr/>
+                    <a:lstStyle/>
+                    <a:p>
+                      <a:pPr algn="l" fontAlgn="b"/>
+                      <a:endParaRPr lang="en-US" sz="1600" b="0" i="0" u="none" strike="noStrike">
+                        <a:solidFill>
+                          <a:srgbClr val="000000"/>
+                        </a:solidFill>
+                        <a:effectLst/>
+                        <a:latin typeface="Calibri" panose="020F0502020204030204" pitchFamily="34" charset="0"/>
+                      </a:endParaRPr>
+                    </a:p>
+                  </a:txBody>
+                  <a:tcPr marL="7620" marR="7620" marT="7620" marB="0" anchor="b">
+                    <a:lnL>
+                      <a:noFill/>
+                    </a:lnL>
+                    <a:lnR>
+                      <a:noFill/>
+                    </a:lnR>
+                    <a:lnT>
+                      <a:noFill/>
+                    </a:lnT>
+                    <a:lnB>
+                      <a:noFill/>
+                    </a:lnB>
+                  </a:tcPr>
+                </a:tc>
+                <a:tc>
+                  <a:txBody>
+                    <a:bodyPr/>
+                    <a:lstStyle/>
+                    <a:p>
+                      <a:pPr algn="l" fontAlgn="b"/>
+                      <a:endParaRPr lang="en-US" sz="1600" b="0" i="0" u="none" strike="noStrike" dirty="0">
+                        <a:solidFill>
+                          <a:srgbClr val="000000"/>
+                        </a:solidFill>
+                        <a:effectLst/>
+                        <a:latin typeface="Calibri" panose="020F0502020204030204" pitchFamily="34" charset="0"/>
+                      </a:endParaRPr>
+                    </a:p>
+                  </a:txBody>
+                  <a:tcPr marL="7620" marR="7620" marT="7620" marB="0" anchor="b">
+                    <a:lnL>
+                      <a:noFill/>
+                    </a:lnL>
+                    <a:lnR>
+                      <a:noFill/>
+                    </a:lnR>
+                    <a:lnT>
+                      <a:noFill/>
+                    </a:lnT>
+                    <a:lnB>
+                      <a:noFill/>
+                    </a:lnB>
+                  </a:tcPr>
+                </a:tc>
+                <a:extLst>
+                  <a:ext uri="{0D108BD9-81ED-4DB2-BD59-A6C34878D82A}">
+                    <a16:rowId xmlns:a16="http://schemas.microsoft.com/office/drawing/2014/main" val="3216604544"/>
+                  </a:ext>
+                </a:extLst>
+              </a:tr>
+              <a:tr h="287074">
+                <a:tc gridSpan="3">
+                  <a:txBody>
+                    <a:bodyPr/>
+                    <a:lstStyle/>
+                    <a:p>
+                      <a:pPr algn="ctr" fontAlgn="b"/>
+                      <a:r>
+                        <a:rPr lang="en-US" sz="1600" b="1" i="0" u="none" strike="noStrike">
+                          <a:solidFill>
+                            <a:srgbClr val="000000"/>
+                          </a:solidFill>
+                          <a:effectLst/>
+                          <a:latin typeface="Calibri" panose="020F0502020204030204" pitchFamily="34" charset="0"/>
+                        </a:rPr>
+                        <a:t>Random Forest</a:t>
+                      </a:r>
+                    </a:p>
+                  </a:txBody>
+                  <a:tcPr marL="7620" marR="7620" marT="7620" marB="0" anchor="b">
+                    <a:lnL>
+                      <a:noFill/>
+                    </a:lnL>
+                    <a:lnR>
+                      <a:noFill/>
+                    </a:lnR>
+                    <a:lnT>
+                      <a:noFill/>
+                    </a:lnT>
+                    <a:lnB>
+                      <a:noFill/>
+                    </a:lnB>
+                  </a:tcPr>
+                </a:tc>
+                <a:tc hMerge="1">
+                  <a:txBody>
+                    <a:bodyPr/>
+                    <a:lstStyle/>
+                    <a:p>
+                      <a:endParaRPr lang="en-US"/>
+                    </a:p>
+                  </a:txBody>
+                  <a:tcPr/>
+                </a:tc>
+                <a:tc hMerge="1">
+                  <a:txBody>
+                    <a:bodyPr/>
+                    <a:lstStyle/>
+                    <a:p>
+                      <a:endParaRPr lang="en-US"/>
+                    </a:p>
+                  </a:txBody>
+                  <a:tcPr/>
+                </a:tc>
+                <a:tc>
+                  <a:txBody>
+                    <a:bodyPr/>
+                    <a:lstStyle/>
+                    <a:p>
+                      <a:pPr algn="l" fontAlgn="b"/>
+                      <a:endParaRPr lang="en-US" sz="1400" b="1" i="0" u="none" strike="noStrike">
+                        <a:solidFill>
+                          <a:srgbClr val="000000"/>
+                        </a:solidFill>
+                        <a:effectLst/>
+                        <a:latin typeface="Calibri" panose="020F0502020204030204" pitchFamily="34" charset="0"/>
+                      </a:endParaRPr>
+                    </a:p>
+                  </a:txBody>
+                  <a:tcPr marL="7620" marR="7620" marT="7620" marB="0" anchor="b">
+                    <a:lnL>
+                      <a:noFill/>
+                    </a:lnL>
+                    <a:lnR>
+                      <a:noFill/>
+                    </a:lnR>
+                    <a:lnT>
+                      <a:noFill/>
+                    </a:lnT>
+                    <a:lnB>
+                      <a:noFill/>
+                    </a:lnB>
+                  </a:tcPr>
+                </a:tc>
+                <a:tc gridSpan="3">
+                  <a:txBody>
+                    <a:bodyPr/>
+                    <a:lstStyle/>
+                    <a:p>
+                      <a:pPr algn="ctr" fontAlgn="b"/>
+                      <a:r>
+                        <a:rPr lang="en-US" sz="1600" b="1" i="0" u="none" strike="noStrike" dirty="0">
+                          <a:solidFill>
+                            <a:srgbClr val="000000"/>
+                          </a:solidFill>
+                          <a:effectLst/>
+                          <a:latin typeface="Calibri" panose="020F0502020204030204" pitchFamily="34" charset="0"/>
+                        </a:rPr>
+                        <a:t>SVMs</a:t>
+                      </a:r>
+                    </a:p>
+                  </a:txBody>
+                  <a:tcPr marL="7620" marR="7620" marT="7620" marB="0" anchor="b">
+                    <a:lnL>
+                      <a:noFill/>
+                    </a:lnL>
+                    <a:lnR>
+                      <a:noFill/>
+                    </a:lnR>
+                    <a:lnT>
+                      <a:noFill/>
+                    </a:lnT>
+                    <a:lnB>
+                      <a:noFill/>
+                    </a:lnB>
+                  </a:tcPr>
+                </a:tc>
+                <a:tc hMerge="1">
+                  <a:txBody>
+                    <a:bodyPr/>
+                    <a:lstStyle/>
+                    <a:p>
+                      <a:endParaRPr lang="en-US"/>
+                    </a:p>
+                  </a:txBody>
+                  <a:tcPr/>
+                </a:tc>
+                <a:tc hMerge="1">
+                  <a:txBody>
+                    <a:bodyPr/>
+                    <a:lstStyle/>
+                    <a:p>
+                      <a:endParaRPr lang="en-US"/>
+                    </a:p>
+                  </a:txBody>
+                  <a:tcPr/>
+                </a:tc>
+                <a:extLst>
+                  <a:ext uri="{0D108BD9-81ED-4DB2-BD59-A6C34878D82A}">
+                    <a16:rowId xmlns:a16="http://schemas.microsoft.com/office/drawing/2014/main" val="1800463083"/>
+                  </a:ext>
+                </a:extLst>
+              </a:tr>
+            </a:tbl>
+          </a:graphicData>
+        </a:graphic>
+      </p:graphicFrame>
+      <p:sp>
+        <p:nvSpPr>
+          <p:cNvPr id="6" name="TextBox 5">
+            <a:extLst>
+              <a:ext uri="{FF2B5EF4-FFF2-40B4-BE49-F238E27FC236}">
+                <a16:creationId xmlns:a16="http://schemas.microsoft.com/office/drawing/2014/main" id="{A847CAE7-FBC7-4F5B-87B0-1A15873963CB}"/>
+              </a:ext>
+            </a:extLst>
+          </p:cNvPr>
+          <p:cNvSpPr txBox="1"/>
+          <p:nvPr/>
+        </p:nvSpPr>
+        <p:spPr>
+          <a:xfrm>
+            <a:off x="4038600" y="5257800"/>
+            <a:ext cx="923330" cy="1558290"/>
+          </a:xfrm>
+          <a:prstGeom prst="rect">
+            <a:avLst/>
+          </a:prstGeom>
+          <a:noFill/>
+        </p:spPr>
+        <p:txBody>
+          <a:bodyPr vert="vert270" wrap="square" rtlCol="0">
+            <a:spAutoFit/>
+          </a:bodyPr>
+          <a:lstStyle/>
+          <a:p>
+            <a:pPr algn="ctr"/>
+            <a:r>
+              <a:rPr lang="en-US" sz="2400" b="1" dirty="0"/>
+              <a:t>Confusion</a:t>
+            </a:r>
+          </a:p>
+          <a:p>
+            <a:pPr algn="ctr"/>
+            <a:r>
+              <a:rPr lang="en-US" sz="2400" b="1" dirty="0"/>
+              <a:t>Matrices</a:t>
+            </a:r>
+          </a:p>
+        </p:txBody>
+      </p:sp>
+    </p:spTree>
+    <p:extLst>
+      <p:ext uri="{BB962C8B-B14F-4D97-AF65-F5344CB8AC3E}">
+        <p14:creationId xmlns:p14="http://schemas.microsoft.com/office/powerpoint/2010/main" val="2014314798"/>
+      </p:ext>
+    </p:extLst>
+  </p:cSld>
+  <p:clrMapOvr>
+    <a:masterClrMapping/>
+  </p:clrMapOvr>
+</p:sld>
+</file>
+
+<file path=ppt/slides/slide58.xml><?xml version="1.0" encoding="utf-8"?>
 <p:sld xmlns:a="http://schemas.openxmlformats.org/drawingml/2006/main" xmlns:r="http://schemas.openxmlformats.org/officeDocument/2006/relationships" xmlns:p="http://schemas.openxmlformats.org/presentationml/2006/main">
   <p:cSld>
     <p:spTree>
@@ -38171,45 +40042,6 @@
       </p:sp>
       <p:pic>
         <p:nvPicPr>
-          <p:cNvPr id="5" name="Graphic 4" descr="Question mark">
-            <a:extLst>
-              <a:ext uri="{FF2B5EF4-FFF2-40B4-BE49-F238E27FC236}">
-                <a16:creationId xmlns:a16="http://schemas.microsoft.com/office/drawing/2014/main" id="{BAFD7E4B-5FB1-4072-AC98-BBDF23AE1459}"/>
-              </a:ext>
-            </a:extLst>
-          </p:cNvPr>
-          <p:cNvPicPr>
-            <a:picLocks noChangeAspect="1"/>
-          </p:cNvPicPr>
-          <p:nvPr/>
-        </p:nvPicPr>
-        <p:blipFill>
-          <a:blip r:embed="rId2">
-            <a:extLst>
-              <a:ext uri="{28A0092B-C50C-407E-A947-70E740481C1C}">
-                <a14:useLocalDpi xmlns:a14="http://schemas.microsoft.com/office/drawing/2010/main" val="0"/>
-              </a:ext>
-              <a:ext uri="{96DAC541-7B7A-43D3-8B79-37D633B846F1}">
-                <asvg:svgBlip xmlns:asvg="http://schemas.microsoft.com/office/drawing/2016/SVG/main" r:embed="rId3"/>
-              </a:ext>
-            </a:extLst>
-          </a:blip>
-          <a:stretch>
-            <a:fillRect/>
-          </a:stretch>
-        </p:blipFill>
-        <p:spPr>
-          <a:xfrm>
-            <a:off x="4114800" y="3619499"/>
-            <a:ext cx="914400" cy="914400"/>
-          </a:xfrm>
-          <a:prstGeom prst="rect">
-            <a:avLst/>
-          </a:prstGeom>
-        </p:spPr>
-      </p:pic>
-      <p:pic>
-        <p:nvPicPr>
           <p:cNvPr id="7" name="Graphic 6" descr="Exclamation mark">
             <a:extLst>
               <a:ext uri="{FF2B5EF4-FFF2-40B4-BE49-F238E27FC236}">
@@ -38223,13 +40055,13 @@
           <p:nvPr/>
         </p:nvPicPr>
         <p:blipFill>
-          <a:blip r:embed="rId4">
+          <a:blip r:embed="rId3">
             <a:extLst>
               <a:ext uri="{28A0092B-C50C-407E-A947-70E740481C1C}">
                 <a14:useLocalDpi xmlns:a14="http://schemas.microsoft.com/office/drawing/2010/main" val="0"/>
               </a:ext>
               <a:ext uri="{96DAC541-7B7A-43D3-8B79-37D633B846F1}">
-                <asvg:svgBlip xmlns:asvg="http://schemas.microsoft.com/office/drawing/2016/SVG/main" r:embed="rId5"/>
+                <asvg:svgBlip xmlns:asvg="http://schemas.microsoft.com/office/drawing/2016/SVG/main" r:embed="rId4"/>
               </a:ext>
             </a:extLst>
           </a:blip>
@@ -38239,8 +40071,8 @@
         </p:blipFill>
         <p:spPr>
           <a:xfrm>
-            <a:off x="3171724" y="5334000"/>
-            <a:ext cx="914400" cy="914400"/>
+            <a:off x="1371600" y="2730490"/>
+            <a:ext cx="1412985" cy="1412985"/>
           </a:xfrm>
           <a:prstGeom prst="rect">
             <a:avLst/>
@@ -38262,13 +40094,13 @@
           <p:nvPr/>
         </p:nvPicPr>
         <p:blipFill>
-          <a:blip r:embed="rId6">
+          <a:blip r:embed="rId5">
             <a:extLst>
               <a:ext uri="{28A0092B-C50C-407E-A947-70E740481C1C}">
                 <a14:useLocalDpi xmlns:a14="http://schemas.microsoft.com/office/drawing/2010/main" val="0"/>
               </a:ext>
               <a:ext uri="{96DAC541-7B7A-43D3-8B79-37D633B846F1}">
-                <asvg:svgBlip xmlns:asvg="http://schemas.microsoft.com/office/drawing/2016/SVG/main" r:embed="rId7"/>
+                <asvg:svgBlip xmlns:asvg="http://schemas.microsoft.com/office/drawing/2016/SVG/main" r:embed="rId6"/>
               </a:ext>
             </a:extLst>
           </a:blip>
@@ -38278,8 +40110,8 @@
         </p:blipFill>
         <p:spPr>
           <a:xfrm>
-            <a:off x="6934200" y="2660430"/>
-            <a:ext cx="914400" cy="914400"/>
+            <a:off x="6740415" y="2218995"/>
+            <a:ext cx="1301970" cy="1301970"/>
           </a:xfrm>
           <a:prstGeom prst="rect">
             <a:avLst/>
@@ -38301,13 +40133,13 @@
           <p:nvPr/>
         </p:nvPicPr>
         <p:blipFill>
-          <a:blip r:embed="rId8">
+          <a:blip r:embed="rId7">
             <a:extLst>
               <a:ext uri="{28A0092B-C50C-407E-A947-70E740481C1C}">
                 <a14:useLocalDpi xmlns:a14="http://schemas.microsoft.com/office/drawing/2010/main" val="0"/>
               </a:ext>
               <a:ext uri="{96DAC541-7B7A-43D3-8B79-37D633B846F1}">
-                <asvg:svgBlip xmlns:asvg="http://schemas.microsoft.com/office/drawing/2016/SVG/main" r:embed="rId9"/>
+                <asvg:svgBlip xmlns:asvg="http://schemas.microsoft.com/office/drawing/2016/SVG/main" r:embed="rId8"/>
               </a:ext>
             </a:extLst>
           </a:blip>
@@ -38317,8 +40149,8 @@
         </p:blipFill>
         <p:spPr>
           <a:xfrm>
-            <a:off x="1752600" y="3312299"/>
-            <a:ext cx="914400" cy="914400"/>
+            <a:off x="3448050" y="3200400"/>
+            <a:ext cx="2362200" cy="2362200"/>
           </a:xfrm>
           <a:prstGeom prst="rect">
             <a:avLst/>
@@ -38340,13 +40172,13 @@
           <p:nvPr/>
         </p:nvPicPr>
         <p:blipFill>
-          <a:blip r:embed="rId10">
+          <a:blip r:embed="rId9">
             <a:extLst>
               <a:ext uri="{28A0092B-C50C-407E-A947-70E740481C1C}">
                 <a14:useLocalDpi xmlns:a14="http://schemas.microsoft.com/office/drawing/2010/main" val="0"/>
               </a:ext>
               <a:ext uri="{96DAC541-7B7A-43D3-8B79-37D633B846F1}">
-                <asvg:svgBlip xmlns:asvg="http://schemas.microsoft.com/office/drawing/2016/SVG/main" r:embed="rId11"/>
+                <asvg:svgBlip xmlns:asvg="http://schemas.microsoft.com/office/drawing/2016/SVG/main" r:embed="rId10"/>
               </a:ext>
             </a:extLst>
           </a:blip>
@@ -38356,8 +40188,8 @@
         </p:blipFill>
         <p:spPr>
           <a:xfrm>
-            <a:off x="6781800" y="5143499"/>
-            <a:ext cx="914400" cy="914400"/>
+            <a:off x="6477000" y="5105400"/>
+            <a:ext cx="1606770" cy="1606770"/>
           </a:xfrm>
           <a:prstGeom prst="rect">
             <a:avLst/>

</xml_diff>

<commit_message>
Makes small correction to summary for Sean's q2 related to confusion matricies
</commit_message>
<xml_diff>
--- a/presentation/gtdb-final-presentation.pptx
+++ b/presentation/gtdb-final-presentation.pptx
@@ -660,7 +660,15 @@
             </a:pPr>
             <a:r>
               <a:rPr lang="en-US" dirty="0"/>
-              <a:t>Middle East &amp; North Africa (most incidents) followed closely by Southeast Asia (over half of all incidents combined)</a:t>
+              <a:t>Middle East &amp; North Africa (most incidents) followed closely </a:t>
+            </a:r>
+            <a:r>
+              <a:rPr lang="en-US"/>
+              <a:t>by South </a:t>
+            </a:r>
+            <a:r>
+              <a:rPr lang="en-US" dirty="0"/>
+              <a:t>Asia (over half of all incidents combined)</a:t>
             </a:r>
           </a:p>
           <a:p>
@@ -8479,7 +8487,7 @@
           <a:graphicData uri="http://schemas.openxmlformats.org/presentationml/2006/ole">
             <mc:AlternateContent xmlns:mc="http://schemas.openxmlformats.org/markup-compatibility/2006">
               <mc:Choice xmlns:v="urn:schemas-microsoft-com:vml" Requires="v">
-                <p:oleObj spid="_x0000_s2381" name="Worksheet" r:id="rId4" imgW="1923884" imgH="933476" progId="Excel.Sheet.12">
+                <p:oleObj spid="_x0000_s2384" name="Worksheet" r:id="rId4" imgW="1923884" imgH="933476" progId="Excel.Sheet.12">
                   <p:embed/>
                 </p:oleObj>
               </mc:Choice>
@@ -8903,7 +8911,7 @@
           <a:graphicData uri="http://schemas.openxmlformats.org/presentationml/2006/ole">
             <mc:AlternateContent xmlns:mc="http://schemas.openxmlformats.org/markup-compatibility/2006">
               <mc:Choice xmlns:v="urn:schemas-microsoft-com:vml" Requires="v">
-                <p:oleObj spid="_x0000_s1694" name="Worksheet" r:id="rId3" imgW="1466857" imgH="771525" progId="Excel.Sheet.12">
+                <p:oleObj spid="_x0000_s1700" name="Worksheet" r:id="rId3" imgW="1466857" imgH="771525" progId="Excel.Sheet.12">
                   <p:embed/>
                 </p:oleObj>
               </mc:Choice>
@@ -8966,7 +8974,7 @@
           <a:graphicData uri="http://schemas.openxmlformats.org/presentationml/2006/ole">
             <mc:AlternateContent xmlns:mc="http://schemas.openxmlformats.org/markup-compatibility/2006">
               <mc:Choice xmlns:v="urn:schemas-microsoft-com:vml" Requires="v">
-                <p:oleObj spid="_x0000_s1695" name="Worksheet" r:id="rId5" imgW="1466857" imgH="771525" progId="Excel.Sheet.12">
+                <p:oleObj spid="_x0000_s1701" name="Worksheet" r:id="rId5" imgW="1466857" imgH="771525" progId="Excel.Sheet.12">
                   <p:embed/>
                 </p:oleObj>
               </mc:Choice>
@@ -9666,7 +9674,7 @@
           <a:graphicData uri="http://schemas.openxmlformats.org/presentationml/2006/ole">
             <mc:AlternateContent xmlns:mc="http://schemas.openxmlformats.org/markup-compatibility/2006">
               <mc:Choice xmlns:v="urn:schemas-microsoft-com:vml" Requires="v">
-                <p:oleObj spid="_x0000_s3402" name="Worksheet" r:id="rId5" imgW="1923884" imgH="933476" progId="Excel.Sheet.12">
+                <p:oleObj spid="_x0000_s3405" name="Worksheet" r:id="rId5" imgW="1923884" imgH="933476" progId="Excel.Sheet.12">
                   <p:embed/>
                 </p:oleObj>
               </mc:Choice>
@@ -14538,7 +14546,7 @@
           <a:graphicData uri="http://schemas.openxmlformats.org/presentationml/2006/ole">
             <mc:AlternateContent xmlns:mc="http://schemas.openxmlformats.org/markup-compatibility/2006">
               <mc:Choice xmlns:v="urn:schemas-microsoft-com:vml" Requires="v">
-                <p:oleObj spid="_x0000_s5330" name="Worksheet" r:id="rId3" imgW="2505144" imgH="1219149" progId="Excel.Sheet.12">
+                <p:oleObj spid="_x0000_s5333" name="Worksheet" r:id="rId3" imgW="2505144" imgH="1219149" progId="Excel.Sheet.12">
                   <p:embed/>
                 </p:oleObj>
               </mc:Choice>
@@ -38809,7 +38817,7 @@
         <p:spPr>
           <a:xfrm>
             <a:off x="1028700" y="2286000"/>
-            <a:ext cx="7200900" cy="3242310"/>
+            <a:ext cx="7200900" cy="2286000"/>
           </a:xfrm>
         </p:spPr>
         <p:txBody>
@@ -38843,15 +38851,6 @@
               <a:rPr lang="en-US" dirty="0"/>
               <a:t>Most algorithms performed well (other than QDA), but Random Forest was the winner based on AUC</a:t>
             </a:r>
-          </a:p>
-          <a:p>
-            <a:r>
-              <a:rPr lang="en-US" dirty="0"/>
-              <a:t>Confusion matrices for Random Forest vs SVM suggest that SVM may be superior if we want to minimize misclassification of high-risk as low-risk</a:t>
-            </a:r>
-          </a:p>
-          <a:p>
-            <a:endParaRPr lang="en-US" dirty="0"/>
           </a:p>
           <a:p>
             <a:endParaRPr lang="en-US" dirty="0"/>

</xml_diff>